<commit_message>
Finalized Activity 02 code
</commit_message>
<xml_diff>
--- a/01 Color Segmentation/Activity 1 - Color Segmentation.pptx
+++ b/01 Color Segmentation/Activity 1 - Color Segmentation.pptx
@@ -8,6 +8,14 @@
     <p:sldId id="256" r:id="rId2"/>
     <p:sldId id="257" r:id="rId3"/>
     <p:sldId id="258" r:id="rId4"/>
+    <p:sldId id="259" r:id="rId5"/>
+    <p:sldId id="260" r:id="rId6"/>
+    <p:sldId id="265" r:id="rId7"/>
+    <p:sldId id="266" r:id="rId8"/>
+    <p:sldId id="262" r:id="rId9"/>
+    <p:sldId id="263" r:id="rId10"/>
+    <p:sldId id="261" r:id="rId11"/>
+    <p:sldId id="264" r:id="rId12"/>
   </p:sldIdLst>
   <p:sldSz cx="9144000" cy="6858000" type="screen4x3"/>
   <p:notesSz cx="6858000" cy="9144000"/>
@@ -934,7 +942,7 @@
           <a:p>
             <a:fld id="{76261330-66C9-4AE9-83ED-F8EC794E6FBE}" type="datetimeFigureOut">
               <a:rPr lang="en-US" smtClean="0"/>
-              <a:t>5/28/2022</a:t>
+              <a:t>5/31/2022</a:t>
             </a:fld>
             <a:endParaRPr lang="en-US"/>
           </a:p>
@@ -1112,7 +1120,7 @@
           <a:p>
             <a:fld id="{76261330-66C9-4AE9-83ED-F8EC794E6FBE}" type="datetimeFigureOut">
               <a:rPr lang="en-US" smtClean="0"/>
-              <a:t>5/28/2022</a:t>
+              <a:t>5/31/2022</a:t>
             </a:fld>
             <a:endParaRPr lang="en-US"/>
           </a:p>
@@ -1300,7 +1308,7 @@
           <a:p>
             <a:fld id="{76261330-66C9-4AE9-83ED-F8EC794E6FBE}" type="datetimeFigureOut">
               <a:rPr lang="en-US" smtClean="0"/>
-              <a:t>5/28/2022</a:t>
+              <a:t>5/31/2022</a:t>
             </a:fld>
             <a:endParaRPr lang="en-US"/>
           </a:p>
@@ -2397,7 +2405,7 @@
         <p:fade/>
       </p:transition>
     </mc:Choice>
-    <mc:Fallback xmlns:ahyp="http://schemas.microsoft.com/office/drawing/2018/hyperlinkcolor" xmlns:p15="http://schemas.microsoft.com/office/powerpoint/2012/main" xmlns:com="http://schemas.openxmlformats.org/drawingml/2006/compatibility" xmlns:pvml="urn:schemas-microsoft-com:office:powerpoint" xmlns:v="urn:schemas-microsoft-com:vml" xmlns:o="urn:schemas-microsoft-com:office:office" xmlns:dgm="http://schemas.openxmlformats.org/drawingml/2006/diagram" xmlns:c="http://schemas.openxmlformats.org/drawingml/2006/chart" xmlns:mv="urn:schemas-microsoft-com:mac:vml" xmlns="">
+    <mc:Fallback xmlns="" xmlns:mv="urn:schemas-microsoft-com:mac:vml" xmlns:c="http://schemas.openxmlformats.org/drawingml/2006/chart" xmlns:dgm="http://schemas.openxmlformats.org/drawingml/2006/diagram" xmlns:o="urn:schemas-microsoft-com:office:office" xmlns:v="urn:schemas-microsoft-com:vml" xmlns:pvml="urn:schemas-microsoft-com:office:powerpoint" xmlns:com="http://schemas.openxmlformats.org/drawingml/2006/compatibility" xmlns:p15="http://schemas.microsoft.com/office/powerpoint/2012/main" xmlns:ahyp="http://schemas.microsoft.com/office/drawing/2018/hyperlinkcolor">
       <p:transition>
         <p:fade/>
       </p:transition>
@@ -2744,7 +2752,7 @@
           <a:p>
             <a:fld id="{76261330-66C9-4AE9-83ED-F8EC794E6FBE}" type="datetimeFigureOut">
               <a:rPr lang="en-US" smtClean="0"/>
-              <a:t>5/28/2022</a:t>
+              <a:t>5/31/2022</a:t>
             </a:fld>
             <a:endParaRPr lang="en-US"/>
           </a:p>
@@ -2984,7 +2992,7 @@
           <a:p>
             <a:fld id="{76261330-66C9-4AE9-83ED-F8EC794E6FBE}" type="datetimeFigureOut">
               <a:rPr lang="en-US" smtClean="0"/>
-              <a:t>5/28/2022</a:t>
+              <a:t>5/31/2022</a:t>
             </a:fld>
             <a:endParaRPr lang="en-US"/>
           </a:p>
@@ -3359,7 +3367,7 @@
           <a:p>
             <a:fld id="{76261330-66C9-4AE9-83ED-F8EC794E6FBE}" type="datetimeFigureOut">
               <a:rPr lang="en-US" smtClean="0"/>
-              <a:t>5/28/2022</a:t>
+              <a:t>5/31/2022</a:t>
             </a:fld>
             <a:endParaRPr lang="en-US"/>
           </a:p>
@@ -3485,7 +3493,7 @@
           <a:p>
             <a:fld id="{76261330-66C9-4AE9-83ED-F8EC794E6FBE}" type="datetimeFigureOut">
               <a:rPr lang="en-US" smtClean="0"/>
-              <a:t>5/28/2022</a:t>
+              <a:t>5/31/2022</a:t>
             </a:fld>
             <a:endParaRPr lang="en-US"/>
           </a:p>
@@ -3588,7 +3596,7 @@
           <a:p>
             <a:fld id="{76261330-66C9-4AE9-83ED-F8EC794E6FBE}" type="datetimeFigureOut">
               <a:rPr lang="en-US" smtClean="0"/>
-              <a:t>5/28/2022</a:t>
+              <a:t>5/31/2022</a:t>
             </a:fld>
             <a:endParaRPr lang="en-US"/>
           </a:p>
@@ -3873,7 +3881,7 @@
           <a:p>
             <a:fld id="{76261330-66C9-4AE9-83ED-F8EC794E6FBE}" type="datetimeFigureOut">
               <a:rPr lang="en-US" smtClean="0"/>
-              <a:t>5/28/2022</a:t>
+              <a:t>5/31/2022</a:t>
             </a:fld>
             <a:endParaRPr lang="en-US"/>
           </a:p>
@@ -4629,6 +4637,313 @@
 </p:sld>
 </file>
 
+<file path=ppt/slides/slide10.xml><?xml version="1.0" encoding="utf-8"?>
+<p:sld xmlns:a="http://schemas.openxmlformats.org/drawingml/2006/main" xmlns:r="http://schemas.openxmlformats.org/officeDocument/2006/relationships" xmlns:p="http://schemas.openxmlformats.org/presentationml/2006/main">
+  <p:cSld>
+    <p:spTree>
+      <p:nvGrpSpPr>
+        <p:cNvPr id="1" name=""/>
+        <p:cNvGrpSpPr/>
+        <p:nvPr/>
+      </p:nvGrpSpPr>
+      <p:grpSpPr>
+        <a:xfrm>
+          <a:off x="0" y="0"/>
+          <a:ext cx="0" cy="0"/>
+          <a:chOff x="0" y="0"/>
+          <a:chExt cx="0" cy="0"/>
+        </a:xfrm>
+      </p:grpSpPr>
+      <p:sp>
+        <p:nvSpPr>
+          <p:cNvPr id="2" name="Title 1">
+            <a:extLst>
+              <a:ext uri="{FF2B5EF4-FFF2-40B4-BE49-F238E27FC236}">
+                <a16:creationId xmlns:a16="http://schemas.microsoft.com/office/drawing/2014/main" id="{54DF997A-0943-5724-B779-53D802D39CC5}"/>
+              </a:ext>
+            </a:extLst>
+          </p:cNvPr>
+          <p:cNvSpPr>
+            <a:spLocks noGrp="1"/>
+          </p:cNvSpPr>
+          <p:nvPr>
+            <p:ph type="title"/>
+          </p:nvPr>
+        </p:nvSpPr>
+        <p:spPr/>
+        <p:txBody>
+          <a:bodyPr/>
+          <a:lstStyle/>
+          <a:p>
+            <a:r>
+              <a:rPr lang="en-US" dirty="0"/>
+              <a:t>Art Applications</a:t>
+            </a:r>
+          </a:p>
+        </p:txBody>
+      </p:sp>
+      <p:sp>
+        <p:nvSpPr>
+          <p:cNvPr id="3" name="Content Placeholder 2">
+            <a:extLst>
+              <a:ext uri="{FF2B5EF4-FFF2-40B4-BE49-F238E27FC236}">
+                <a16:creationId xmlns:a16="http://schemas.microsoft.com/office/drawing/2014/main" id="{2CF544B8-A12B-ACFE-D97C-9761D6C48177}"/>
+              </a:ext>
+            </a:extLst>
+          </p:cNvPr>
+          <p:cNvSpPr>
+            <a:spLocks noGrp="1"/>
+          </p:cNvSpPr>
+          <p:nvPr>
+            <p:ph idx="1"/>
+          </p:nvPr>
+        </p:nvSpPr>
+        <p:spPr/>
+        <p:txBody>
+          <a:bodyPr/>
+          <a:lstStyle/>
+          <a:p>
+            <a:endParaRPr lang="en-US" dirty="0"/>
+          </a:p>
+        </p:txBody>
+      </p:sp>
+      <p:pic>
+        <p:nvPicPr>
+          <p:cNvPr id="2056" name="Picture 8">
+            <a:extLst>
+              <a:ext uri="{FF2B5EF4-FFF2-40B4-BE49-F238E27FC236}">
+                <a16:creationId xmlns:a16="http://schemas.microsoft.com/office/drawing/2014/main" id="{BE8BAF98-9069-8198-C36F-C0D08D4592C8}"/>
+              </a:ext>
+            </a:extLst>
+          </p:cNvPr>
+          <p:cNvPicPr>
+            <a:picLocks noChangeAspect="1" noChangeArrowheads="1"/>
+          </p:cNvPicPr>
+          <p:nvPr/>
+        </p:nvPicPr>
+        <p:blipFill>
+          <a:blip r:embed="rId2">
+            <a:extLst>
+              <a:ext uri="{28A0092B-C50C-407E-A947-70E740481C1C}">
+                <a14:useLocalDpi xmlns:a14="http://schemas.microsoft.com/office/drawing/2010/main" val="0"/>
+              </a:ext>
+            </a:extLst>
+          </a:blip>
+          <a:srcRect/>
+          <a:stretch>
+            <a:fillRect/>
+          </a:stretch>
+        </p:blipFill>
+        <p:spPr bwMode="auto">
+          <a:xfrm>
+            <a:off x="1200150" y="1131216"/>
+            <a:ext cx="7315200" cy="3093720"/>
+          </a:xfrm>
+          <a:prstGeom prst="rect">
+            <a:avLst/>
+          </a:prstGeom>
+          <a:noFill/>
+          <a:extLst>
+            <a:ext uri="{909E8E84-426E-40DD-AFC4-6F175D3DCCD1}">
+              <a14:hiddenFill xmlns:a14="http://schemas.microsoft.com/office/drawing/2010/main">
+                <a:solidFill>
+                  <a:srgbClr val="FFFFFF"/>
+                </a:solidFill>
+              </a14:hiddenFill>
+            </a:ext>
+          </a:extLst>
+        </p:spPr>
+      </p:pic>
+      <p:pic>
+        <p:nvPicPr>
+          <p:cNvPr id="2058" name="Picture 10">
+            <a:extLst>
+              <a:ext uri="{FF2B5EF4-FFF2-40B4-BE49-F238E27FC236}">
+                <a16:creationId xmlns:a16="http://schemas.microsoft.com/office/drawing/2014/main" id="{873CEC5B-B8C7-1734-164F-0705B17049D7}"/>
+              </a:ext>
+            </a:extLst>
+          </p:cNvPr>
+          <p:cNvPicPr>
+            <a:picLocks noChangeAspect="1" noChangeArrowheads="1"/>
+          </p:cNvPicPr>
+          <p:nvPr/>
+        </p:nvPicPr>
+        <p:blipFill>
+          <a:blip r:embed="rId3">
+            <a:extLst>
+              <a:ext uri="{28A0092B-C50C-407E-A947-70E740481C1C}">
+                <a14:useLocalDpi xmlns:a14="http://schemas.microsoft.com/office/drawing/2010/main" val="0"/>
+              </a:ext>
+            </a:extLst>
+          </a:blip>
+          <a:srcRect/>
+          <a:stretch>
+            <a:fillRect/>
+          </a:stretch>
+        </p:blipFill>
+        <p:spPr bwMode="auto">
+          <a:xfrm>
+            <a:off x="1200150" y="4224936"/>
+            <a:ext cx="7315200" cy="1450340"/>
+          </a:xfrm>
+          <a:prstGeom prst="rect">
+            <a:avLst/>
+          </a:prstGeom>
+          <a:noFill/>
+          <a:extLst>
+            <a:ext uri="{909E8E84-426E-40DD-AFC4-6F175D3DCCD1}">
+              <a14:hiddenFill xmlns:a14="http://schemas.microsoft.com/office/drawing/2010/main">
+                <a:solidFill>
+                  <a:srgbClr val="FFFFFF"/>
+                </a:solidFill>
+              </a14:hiddenFill>
+            </a:ext>
+          </a:extLst>
+        </p:spPr>
+      </p:pic>
+    </p:spTree>
+    <p:extLst>
+      <p:ext uri="{BB962C8B-B14F-4D97-AF65-F5344CB8AC3E}">
+        <p14:creationId xmlns:p14="http://schemas.microsoft.com/office/powerpoint/2010/main" val="2796932802"/>
+      </p:ext>
+    </p:extLst>
+  </p:cSld>
+  <p:clrMapOvr>
+    <a:masterClrMapping/>
+  </p:clrMapOvr>
+</p:sld>
+</file>
+
+<file path=ppt/slides/slide11.xml><?xml version="1.0" encoding="utf-8"?>
+<p:sld xmlns:a="http://schemas.openxmlformats.org/drawingml/2006/main" xmlns:r="http://schemas.openxmlformats.org/officeDocument/2006/relationships" xmlns:p="http://schemas.openxmlformats.org/presentationml/2006/main">
+  <p:cSld>
+    <p:spTree>
+      <p:nvGrpSpPr>
+        <p:cNvPr id="1" name=""/>
+        <p:cNvGrpSpPr/>
+        <p:nvPr/>
+      </p:nvGrpSpPr>
+      <p:grpSpPr>
+        <a:xfrm>
+          <a:off x="0" y="0"/>
+          <a:ext cx="0" cy="0"/>
+          <a:chOff x="0" y="0"/>
+          <a:chExt cx="0" cy="0"/>
+        </a:xfrm>
+      </p:grpSpPr>
+      <p:sp>
+        <p:nvSpPr>
+          <p:cNvPr id="2" name="Title 1">
+            <a:extLst>
+              <a:ext uri="{FF2B5EF4-FFF2-40B4-BE49-F238E27FC236}">
+                <a16:creationId xmlns:a16="http://schemas.microsoft.com/office/drawing/2014/main" id="{154EBBAE-1DBB-8279-FFA2-CA06F1145E66}"/>
+              </a:ext>
+            </a:extLst>
+          </p:cNvPr>
+          <p:cNvSpPr>
+            <a:spLocks noGrp="1"/>
+          </p:cNvSpPr>
+          <p:nvPr>
+            <p:ph type="title"/>
+          </p:nvPr>
+        </p:nvSpPr>
+        <p:spPr/>
+        <p:txBody>
+          <a:bodyPr/>
+          <a:lstStyle/>
+          <a:p>
+            <a:r>
+              <a:rPr lang="en-US" dirty="0"/>
+              <a:t>In motion</a:t>
+            </a:r>
+          </a:p>
+        </p:txBody>
+      </p:sp>
+      <p:sp>
+        <p:nvSpPr>
+          <p:cNvPr id="3" name="Content Placeholder 2">
+            <a:extLst>
+              <a:ext uri="{FF2B5EF4-FFF2-40B4-BE49-F238E27FC236}">
+                <a16:creationId xmlns:a16="http://schemas.microsoft.com/office/drawing/2014/main" id="{86D6855E-5268-41A1-B682-64EB3C2D3F6D}"/>
+              </a:ext>
+            </a:extLst>
+          </p:cNvPr>
+          <p:cNvSpPr>
+            <a:spLocks noGrp="1"/>
+          </p:cNvSpPr>
+          <p:nvPr>
+            <p:ph idx="1"/>
+          </p:nvPr>
+        </p:nvSpPr>
+        <p:spPr/>
+        <p:txBody>
+          <a:bodyPr/>
+          <a:lstStyle/>
+          <a:p>
+            <a:endParaRPr lang="en-US"/>
+          </a:p>
+        </p:txBody>
+      </p:sp>
+      <p:pic>
+        <p:nvPicPr>
+          <p:cNvPr id="6146" name="Picture 2">
+            <a:extLst>
+              <a:ext uri="{FF2B5EF4-FFF2-40B4-BE49-F238E27FC236}">
+                <a16:creationId xmlns:a16="http://schemas.microsoft.com/office/drawing/2014/main" id="{A6B6FA39-F6D5-B05B-3160-CE9453FD0408}"/>
+              </a:ext>
+            </a:extLst>
+          </p:cNvPr>
+          <p:cNvPicPr>
+            <a:picLocks noChangeAspect="1" noChangeArrowheads="1"/>
+          </p:cNvPicPr>
+          <p:nvPr/>
+        </p:nvPicPr>
+        <p:blipFill>
+          <a:blip r:embed="rId2">
+            <a:extLst>
+              <a:ext uri="{28A0092B-C50C-407E-A947-70E740481C1C}">
+                <a14:useLocalDpi xmlns:a14="http://schemas.microsoft.com/office/drawing/2010/main" val="0"/>
+              </a:ext>
+            </a:extLst>
+          </a:blip>
+          <a:srcRect/>
+          <a:stretch>
+            <a:fillRect/>
+          </a:stretch>
+        </p:blipFill>
+        <p:spPr bwMode="auto">
+          <a:xfrm>
+            <a:off x="285750" y="1131216"/>
+            <a:ext cx="8229600" cy="1870241"/>
+          </a:xfrm>
+          <a:prstGeom prst="rect">
+            <a:avLst/>
+          </a:prstGeom>
+          <a:noFill/>
+          <a:extLst>
+            <a:ext uri="{909E8E84-426E-40DD-AFC4-6F175D3DCCD1}">
+              <a14:hiddenFill xmlns:a14="http://schemas.microsoft.com/office/drawing/2010/main">
+                <a:solidFill>
+                  <a:srgbClr val="FFFFFF"/>
+                </a:solidFill>
+              </a14:hiddenFill>
+            </a:ext>
+          </a:extLst>
+        </p:spPr>
+      </p:pic>
+    </p:spTree>
+    <p:extLst>
+      <p:ext uri="{BB962C8B-B14F-4D97-AF65-F5344CB8AC3E}">
+        <p14:creationId xmlns:p14="http://schemas.microsoft.com/office/powerpoint/2010/main" val="2633458347"/>
+      </p:ext>
+    </p:extLst>
+  </p:cSld>
+  <p:clrMapOvr>
+    <a:masterClrMapping/>
+  </p:clrMapOvr>
+</p:sld>
+</file>
+
 <file path=ppt/slides/slide2.xml><?xml version="1.0" encoding="utf-8"?>
 <p:sld xmlns:a="http://schemas.openxmlformats.org/drawingml/2006/main" xmlns:r="http://schemas.openxmlformats.org/officeDocument/2006/relationships" xmlns:p="http://schemas.openxmlformats.org/presentationml/2006/main">
   <p:cSld>
@@ -4740,7 +5055,7 @@
         <p:fade/>
       </p:transition>
     </mc:Choice>
-    <mc:Fallback xmlns:ahyp="http://schemas.microsoft.com/office/drawing/2018/hyperlinkcolor" xmlns:p15="http://schemas.microsoft.com/office/powerpoint/2012/main" xmlns:com="http://schemas.openxmlformats.org/drawingml/2006/compatibility" xmlns:pvml="urn:schemas-microsoft-com:office:powerpoint" xmlns:v="urn:schemas-microsoft-com:vml" xmlns:o="urn:schemas-microsoft-com:office:office" xmlns:dgm="http://schemas.openxmlformats.org/drawingml/2006/diagram" xmlns:c="http://schemas.openxmlformats.org/drawingml/2006/chart" xmlns:mv="urn:schemas-microsoft-com:mac:vml" xmlns="">
+    <mc:Fallback xmlns="" xmlns:mv="urn:schemas-microsoft-com:mac:vml" xmlns:c="http://schemas.openxmlformats.org/drawingml/2006/chart" xmlns:dgm="http://schemas.openxmlformats.org/drawingml/2006/diagram" xmlns:o="urn:schemas-microsoft-com:office:office" xmlns:v="urn:schemas-microsoft-com:vml" xmlns:pvml="urn:schemas-microsoft-com:office:powerpoint" xmlns:com="http://schemas.openxmlformats.org/drawingml/2006/compatibility" xmlns:p15="http://schemas.microsoft.com/office/powerpoint/2012/main" xmlns:ahyp="http://schemas.microsoft.com/office/drawing/2018/hyperlinkcolor">
       <p:transition>
         <p:fade/>
       </p:transition>
@@ -4823,6 +5138,802 @@
     <p:extLst>
       <p:ext uri="{BB962C8B-B14F-4D97-AF65-F5344CB8AC3E}">
         <p14:creationId xmlns:p14="http://schemas.microsoft.com/office/powerpoint/2010/main" val="1971012692"/>
+      </p:ext>
+    </p:extLst>
+  </p:cSld>
+  <p:clrMapOvr>
+    <a:masterClrMapping/>
+  </p:clrMapOvr>
+</p:sld>
+</file>
+
+<file path=ppt/slides/slide4.xml><?xml version="1.0" encoding="utf-8"?>
+<p:sld xmlns:a="http://schemas.openxmlformats.org/drawingml/2006/main" xmlns:r="http://schemas.openxmlformats.org/officeDocument/2006/relationships" xmlns:p="http://schemas.openxmlformats.org/presentationml/2006/main">
+  <p:cSld>
+    <p:spTree>
+      <p:nvGrpSpPr>
+        <p:cNvPr id="1" name=""/>
+        <p:cNvGrpSpPr/>
+        <p:nvPr/>
+      </p:nvGrpSpPr>
+      <p:grpSpPr>
+        <a:xfrm>
+          <a:off x="0" y="0"/>
+          <a:ext cx="0" cy="0"/>
+          <a:chOff x="0" y="0"/>
+          <a:chExt cx="0" cy="0"/>
+        </a:xfrm>
+      </p:grpSpPr>
+      <p:sp>
+        <p:nvSpPr>
+          <p:cNvPr id="2" name="Title 1">
+            <a:extLst>
+              <a:ext uri="{FF2B5EF4-FFF2-40B4-BE49-F238E27FC236}">
+                <a16:creationId xmlns:a16="http://schemas.microsoft.com/office/drawing/2014/main" id="{70A46B2B-0DE5-A5DD-727F-E86453D90217}"/>
+              </a:ext>
+            </a:extLst>
+          </p:cNvPr>
+          <p:cNvSpPr>
+            <a:spLocks noGrp="1"/>
+          </p:cNvSpPr>
+          <p:nvPr>
+            <p:ph type="title"/>
+          </p:nvPr>
+        </p:nvSpPr>
+        <p:spPr/>
+        <p:txBody>
+          <a:bodyPr/>
+          <a:lstStyle/>
+          <a:p>
+            <a:r>
+              <a:rPr lang="en-US" dirty="0"/>
+              <a:t>Thresholding</a:t>
+            </a:r>
+          </a:p>
+        </p:txBody>
+      </p:sp>
+      <p:pic>
+        <p:nvPicPr>
+          <p:cNvPr id="1032" name="Picture 8">
+            <a:extLst>
+              <a:ext uri="{FF2B5EF4-FFF2-40B4-BE49-F238E27FC236}">
+                <a16:creationId xmlns:a16="http://schemas.microsoft.com/office/drawing/2014/main" id="{5E9006AC-BB3E-F658-DAB9-3630D08D3995}"/>
+              </a:ext>
+            </a:extLst>
+          </p:cNvPr>
+          <p:cNvPicPr>
+            <a:picLocks noChangeAspect="1" noChangeArrowheads="1"/>
+          </p:cNvPicPr>
+          <p:nvPr/>
+        </p:nvPicPr>
+        <p:blipFill>
+          <a:blip r:embed="rId2">
+            <a:extLst>
+              <a:ext uri="{28A0092B-C50C-407E-A947-70E740481C1C}">
+                <a14:useLocalDpi xmlns:a14="http://schemas.microsoft.com/office/drawing/2010/main" val="0"/>
+              </a:ext>
+            </a:extLst>
+          </a:blip>
+          <a:srcRect/>
+          <a:stretch>
+            <a:fillRect/>
+          </a:stretch>
+        </p:blipFill>
+        <p:spPr bwMode="auto">
+          <a:xfrm>
+            <a:off x="914400" y="1141085"/>
+            <a:ext cx="7315200" cy="1802141"/>
+          </a:xfrm>
+          <a:prstGeom prst="rect">
+            <a:avLst/>
+          </a:prstGeom>
+          <a:noFill/>
+          <a:extLst>
+            <a:ext uri="{909E8E84-426E-40DD-AFC4-6F175D3DCCD1}">
+              <a14:hiddenFill xmlns:a14="http://schemas.microsoft.com/office/drawing/2010/main">
+                <a:solidFill>
+                  <a:srgbClr val="FFFFFF"/>
+                </a:solidFill>
+              </a14:hiddenFill>
+            </a:ext>
+          </a:extLst>
+        </p:spPr>
+      </p:pic>
+      <p:pic>
+        <p:nvPicPr>
+          <p:cNvPr id="1034" name="Picture 10">
+            <a:extLst>
+              <a:ext uri="{FF2B5EF4-FFF2-40B4-BE49-F238E27FC236}">
+                <a16:creationId xmlns:a16="http://schemas.microsoft.com/office/drawing/2014/main" id="{4E4B9BA4-A711-70C7-2A3C-4135D9BC3071}"/>
+              </a:ext>
+            </a:extLst>
+          </p:cNvPr>
+          <p:cNvPicPr>
+            <a:picLocks noChangeAspect="1" noChangeArrowheads="1"/>
+          </p:cNvPicPr>
+          <p:nvPr/>
+        </p:nvPicPr>
+        <p:blipFill>
+          <a:blip r:embed="rId3">
+            <a:extLst>
+              <a:ext uri="{28A0092B-C50C-407E-A947-70E740481C1C}">
+                <a14:useLocalDpi xmlns:a14="http://schemas.microsoft.com/office/drawing/2010/main" val="0"/>
+              </a:ext>
+            </a:extLst>
+          </a:blip>
+          <a:srcRect/>
+          <a:stretch>
+            <a:fillRect/>
+          </a:stretch>
+        </p:blipFill>
+        <p:spPr bwMode="auto">
+          <a:xfrm>
+            <a:off x="914400" y="3925082"/>
+            <a:ext cx="7315200" cy="1791833"/>
+          </a:xfrm>
+          <a:prstGeom prst="rect">
+            <a:avLst/>
+          </a:prstGeom>
+          <a:noFill/>
+          <a:extLst>
+            <a:ext uri="{909E8E84-426E-40DD-AFC4-6F175D3DCCD1}">
+              <a14:hiddenFill xmlns:a14="http://schemas.microsoft.com/office/drawing/2010/main">
+                <a:solidFill>
+                  <a:srgbClr val="FFFFFF"/>
+                </a:solidFill>
+              </a14:hiddenFill>
+            </a:ext>
+          </a:extLst>
+        </p:spPr>
+      </p:pic>
+    </p:spTree>
+    <p:extLst>
+      <p:ext uri="{BB962C8B-B14F-4D97-AF65-F5344CB8AC3E}">
+        <p14:creationId xmlns:p14="http://schemas.microsoft.com/office/powerpoint/2010/main" val="341938012"/>
+      </p:ext>
+    </p:extLst>
+  </p:cSld>
+  <p:clrMapOvr>
+    <a:masterClrMapping/>
+  </p:clrMapOvr>
+</p:sld>
+</file>
+
+<file path=ppt/slides/slide5.xml><?xml version="1.0" encoding="utf-8"?>
+<p:sld xmlns:a="http://schemas.openxmlformats.org/drawingml/2006/main" xmlns:r="http://schemas.openxmlformats.org/officeDocument/2006/relationships" xmlns:p="http://schemas.openxmlformats.org/presentationml/2006/main">
+  <p:cSld>
+    <p:spTree>
+      <p:nvGrpSpPr>
+        <p:cNvPr id="1" name=""/>
+        <p:cNvGrpSpPr/>
+        <p:nvPr/>
+      </p:nvGrpSpPr>
+      <p:grpSpPr>
+        <a:xfrm>
+          <a:off x="0" y="0"/>
+          <a:ext cx="0" cy="0"/>
+          <a:chOff x="0" y="0"/>
+          <a:chExt cx="0" cy="0"/>
+        </a:xfrm>
+      </p:grpSpPr>
+      <p:sp>
+        <p:nvSpPr>
+          <p:cNvPr id="2" name="Title 1">
+            <a:extLst>
+              <a:ext uri="{FF2B5EF4-FFF2-40B4-BE49-F238E27FC236}">
+                <a16:creationId xmlns:a16="http://schemas.microsoft.com/office/drawing/2014/main" id="{CFCBA73E-D751-8CE1-6927-05259BE77DBC}"/>
+              </a:ext>
+            </a:extLst>
+          </p:cNvPr>
+          <p:cNvSpPr>
+            <a:spLocks noGrp="1"/>
+          </p:cNvSpPr>
+          <p:nvPr>
+            <p:ph type="title"/>
+          </p:nvPr>
+        </p:nvSpPr>
+        <p:spPr/>
+        <p:txBody>
+          <a:bodyPr/>
+          <a:lstStyle/>
+          <a:p>
+            <a:r>
+              <a:rPr lang="en-US" dirty="0"/>
+              <a:t>Thresholding</a:t>
+            </a:r>
+          </a:p>
+        </p:txBody>
+      </p:sp>
+      <p:sp>
+        <p:nvSpPr>
+          <p:cNvPr id="3" name="Content Placeholder 2">
+            <a:extLst>
+              <a:ext uri="{FF2B5EF4-FFF2-40B4-BE49-F238E27FC236}">
+                <a16:creationId xmlns:a16="http://schemas.microsoft.com/office/drawing/2014/main" id="{1D2F9790-6F41-2447-36C8-ECDFBD9B6C36}"/>
+              </a:ext>
+            </a:extLst>
+          </p:cNvPr>
+          <p:cNvSpPr>
+            <a:spLocks noGrp="1"/>
+          </p:cNvSpPr>
+          <p:nvPr>
+            <p:ph idx="1"/>
+          </p:nvPr>
+        </p:nvSpPr>
+        <p:spPr/>
+        <p:txBody>
+          <a:bodyPr/>
+          <a:lstStyle/>
+          <a:p>
+            <a:endParaRPr lang="en-US"/>
+          </a:p>
+        </p:txBody>
+      </p:sp>
+      <p:pic>
+        <p:nvPicPr>
+          <p:cNvPr id="4" name="Picture 12">
+            <a:extLst>
+              <a:ext uri="{FF2B5EF4-FFF2-40B4-BE49-F238E27FC236}">
+                <a16:creationId xmlns:a16="http://schemas.microsoft.com/office/drawing/2014/main" id="{FB962BC3-244E-FF9B-606C-4FF7FE70C7AA}"/>
+              </a:ext>
+            </a:extLst>
+          </p:cNvPr>
+          <p:cNvPicPr>
+            <a:picLocks noChangeAspect="1" noChangeArrowheads="1"/>
+          </p:cNvPicPr>
+          <p:nvPr/>
+        </p:nvPicPr>
+        <p:blipFill>
+          <a:blip r:embed="rId2">
+            <a:extLst>
+              <a:ext uri="{28A0092B-C50C-407E-A947-70E740481C1C}">
+                <a14:useLocalDpi xmlns:a14="http://schemas.microsoft.com/office/drawing/2010/main" val="0"/>
+              </a:ext>
+            </a:extLst>
+          </a:blip>
+          <a:srcRect/>
+          <a:stretch>
+            <a:fillRect/>
+          </a:stretch>
+        </p:blipFill>
+        <p:spPr bwMode="auto">
+          <a:xfrm>
+            <a:off x="1266507" y="1758614"/>
+            <a:ext cx="7667625" cy="1895475"/>
+          </a:xfrm>
+          <a:prstGeom prst="rect">
+            <a:avLst/>
+          </a:prstGeom>
+          <a:noFill/>
+          <a:extLst>
+            <a:ext uri="{909E8E84-426E-40DD-AFC4-6F175D3DCCD1}">
+              <a14:hiddenFill xmlns:a14="http://schemas.microsoft.com/office/drawing/2010/main">
+                <a:solidFill>
+                  <a:srgbClr val="FFFFFF"/>
+                </a:solidFill>
+              </a14:hiddenFill>
+            </a:ext>
+          </a:extLst>
+        </p:spPr>
+      </p:pic>
+    </p:spTree>
+    <p:extLst>
+      <p:ext uri="{BB962C8B-B14F-4D97-AF65-F5344CB8AC3E}">
+        <p14:creationId xmlns:p14="http://schemas.microsoft.com/office/powerpoint/2010/main" val="4024011123"/>
+      </p:ext>
+    </p:extLst>
+  </p:cSld>
+  <p:clrMapOvr>
+    <a:masterClrMapping/>
+  </p:clrMapOvr>
+</p:sld>
+</file>
+
+<file path=ppt/slides/slide6.xml><?xml version="1.0" encoding="utf-8"?>
+<p:sld xmlns:a="http://schemas.openxmlformats.org/drawingml/2006/main" xmlns:r="http://schemas.openxmlformats.org/officeDocument/2006/relationships" xmlns:p="http://schemas.openxmlformats.org/presentationml/2006/main">
+  <p:cSld>
+    <p:spTree>
+      <p:nvGrpSpPr>
+        <p:cNvPr id="1" name=""/>
+        <p:cNvGrpSpPr/>
+        <p:nvPr/>
+      </p:nvGrpSpPr>
+      <p:grpSpPr>
+        <a:xfrm>
+          <a:off x="0" y="0"/>
+          <a:ext cx="0" cy="0"/>
+          <a:chOff x="0" y="0"/>
+          <a:chExt cx="0" cy="0"/>
+        </a:xfrm>
+      </p:grpSpPr>
+      <p:sp>
+        <p:nvSpPr>
+          <p:cNvPr id="2" name="Title 1">
+            <a:extLst>
+              <a:ext uri="{FF2B5EF4-FFF2-40B4-BE49-F238E27FC236}">
+                <a16:creationId xmlns:a16="http://schemas.microsoft.com/office/drawing/2014/main" id="{8B19F19B-233D-F2F7-8213-ABA6BD16DC79}"/>
+              </a:ext>
+            </a:extLst>
+          </p:cNvPr>
+          <p:cNvSpPr>
+            <a:spLocks noGrp="1"/>
+          </p:cNvSpPr>
+          <p:nvPr>
+            <p:ph type="title"/>
+          </p:nvPr>
+        </p:nvSpPr>
+        <p:spPr/>
+        <p:txBody>
+          <a:bodyPr/>
+          <a:lstStyle/>
+          <a:p>
+            <a:r>
+              <a:rPr lang="en-US" dirty="0"/>
+              <a:t>Parametric</a:t>
+            </a:r>
+          </a:p>
+        </p:txBody>
+      </p:sp>
+      <p:sp>
+        <p:nvSpPr>
+          <p:cNvPr id="3" name="Content Placeholder 2">
+            <a:extLst>
+              <a:ext uri="{FF2B5EF4-FFF2-40B4-BE49-F238E27FC236}">
+                <a16:creationId xmlns:a16="http://schemas.microsoft.com/office/drawing/2014/main" id="{3DBDFB5B-40B4-A32B-B7D3-E5A915F12739}"/>
+              </a:ext>
+            </a:extLst>
+          </p:cNvPr>
+          <p:cNvSpPr>
+            <a:spLocks noGrp="1"/>
+          </p:cNvSpPr>
+          <p:nvPr>
+            <p:ph idx="1"/>
+          </p:nvPr>
+        </p:nvSpPr>
+        <p:spPr/>
+        <p:txBody>
+          <a:bodyPr/>
+          <a:lstStyle/>
+          <a:p>
+            <a:endParaRPr lang="en-US"/>
+          </a:p>
+        </p:txBody>
+      </p:sp>
+    </p:spTree>
+    <p:extLst>
+      <p:ext uri="{BB962C8B-B14F-4D97-AF65-F5344CB8AC3E}">
+        <p14:creationId xmlns:p14="http://schemas.microsoft.com/office/powerpoint/2010/main" val="3203095381"/>
+      </p:ext>
+    </p:extLst>
+  </p:cSld>
+  <p:clrMapOvr>
+    <a:masterClrMapping/>
+  </p:clrMapOvr>
+</p:sld>
+</file>
+
+<file path=ppt/slides/slide7.xml><?xml version="1.0" encoding="utf-8"?>
+<p:sld xmlns:a="http://schemas.openxmlformats.org/drawingml/2006/main" xmlns:r="http://schemas.openxmlformats.org/officeDocument/2006/relationships" xmlns:p="http://schemas.openxmlformats.org/presentationml/2006/main">
+  <p:cSld>
+    <p:spTree>
+      <p:nvGrpSpPr>
+        <p:cNvPr id="1" name=""/>
+        <p:cNvGrpSpPr/>
+        <p:nvPr/>
+      </p:nvGrpSpPr>
+      <p:grpSpPr>
+        <a:xfrm>
+          <a:off x="0" y="0"/>
+          <a:ext cx="0" cy="0"/>
+          <a:chOff x="0" y="0"/>
+          <a:chExt cx="0" cy="0"/>
+        </a:xfrm>
+      </p:grpSpPr>
+      <p:sp>
+        <p:nvSpPr>
+          <p:cNvPr id="2" name="Title 1">
+            <a:extLst>
+              <a:ext uri="{FF2B5EF4-FFF2-40B4-BE49-F238E27FC236}">
+                <a16:creationId xmlns:a16="http://schemas.microsoft.com/office/drawing/2014/main" id="{6869AC0C-D385-6066-9EEE-18A9C91E447E}"/>
+              </a:ext>
+            </a:extLst>
+          </p:cNvPr>
+          <p:cNvSpPr>
+            <a:spLocks noGrp="1"/>
+          </p:cNvSpPr>
+          <p:nvPr>
+            <p:ph type="title"/>
+          </p:nvPr>
+        </p:nvSpPr>
+        <p:spPr/>
+        <p:txBody>
+          <a:bodyPr/>
+          <a:lstStyle/>
+          <a:p>
+            <a:r>
+              <a:rPr lang="en-US" dirty="0"/>
+              <a:t>Non-Parametric</a:t>
+            </a:r>
+          </a:p>
+        </p:txBody>
+      </p:sp>
+      <p:sp>
+        <p:nvSpPr>
+          <p:cNvPr id="3" name="Content Placeholder 2">
+            <a:extLst>
+              <a:ext uri="{FF2B5EF4-FFF2-40B4-BE49-F238E27FC236}">
+                <a16:creationId xmlns:a16="http://schemas.microsoft.com/office/drawing/2014/main" id="{69F51AA1-2DB5-FBC8-EF32-5DAE2A2293EF}"/>
+              </a:ext>
+            </a:extLst>
+          </p:cNvPr>
+          <p:cNvSpPr>
+            <a:spLocks noGrp="1"/>
+          </p:cNvSpPr>
+          <p:nvPr>
+            <p:ph idx="1"/>
+          </p:nvPr>
+        </p:nvSpPr>
+        <p:spPr/>
+        <p:txBody>
+          <a:bodyPr/>
+          <a:lstStyle/>
+          <a:p>
+            <a:endParaRPr lang="en-US"/>
+          </a:p>
+        </p:txBody>
+      </p:sp>
+      <p:pic>
+        <p:nvPicPr>
+          <p:cNvPr id="7170" name="Picture 2">
+            <a:extLst>
+              <a:ext uri="{FF2B5EF4-FFF2-40B4-BE49-F238E27FC236}">
+                <a16:creationId xmlns:a16="http://schemas.microsoft.com/office/drawing/2014/main" id="{C8B8B5E2-51D5-5B71-887F-253D97808A61}"/>
+              </a:ext>
+            </a:extLst>
+          </p:cNvPr>
+          <p:cNvPicPr>
+            <a:picLocks noChangeAspect="1" noChangeArrowheads="1"/>
+          </p:cNvPicPr>
+          <p:nvPr/>
+        </p:nvPicPr>
+        <p:blipFill>
+          <a:blip r:embed="rId2">
+            <a:extLst>
+              <a:ext uri="{28A0092B-C50C-407E-A947-70E740481C1C}">
+                <a14:useLocalDpi xmlns:a14="http://schemas.microsoft.com/office/drawing/2010/main" val="0"/>
+              </a:ext>
+            </a:extLst>
+          </a:blip>
+          <a:srcRect/>
+          <a:stretch>
+            <a:fillRect/>
+          </a:stretch>
+        </p:blipFill>
+        <p:spPr bwMode="auto">
+          <a:xfrm>
+            <a:off x="1200150" y="1131216"/>
+            <a:ext cx="7315200" cy="2937510"/>
+          </a:xfrm>
+          <a:prstGeom prst="rect">
+            <a:avLst/>
+          </a:prstGeom>
+          <a:noFill/>
+          <a:extLst>
+            <a:ext uri="{909E8E84-426E-40DD-AFC4-6F175D3DCCD1}">
+              <a14:hiddenFill xmlns:a14="http://schemas.microsoft.com/office/drawing/2010/main">
+                <a:solidFill>
+                  <a:srgbClr val="FFFFFF"/>
+                </a:solidFill>
+              </a14:hiddenFill>
+            </a:ext>
+          </a:extLst>
+        </p:spPr>
+      </p:pic>
+    </p:spTree>
+    <p:extLst>
+      <p:ext uri="{BB962C8B-B14F-4D97-AF65-F5344CB8AC3E}">
+        <p14:creationId xmlns:p14="http://schemas.microsoft.com/office/powerpoint/2010/main" val="1420461841"/>
+      </p:ext>
+    </p:extLst>
+  </p:cSld>
+  <p:clrMapOvr>
+    <a:masterClrMapping/>
+  </p:clrMapOvr>
+</p:sld>
+</file>
+
+<file path=ppt/slides/slide8.xml><?xml version="1.0" encoding="utf-8"?>
+<p:sld xmlns:a="http://schemas.openxmlformats.org/drawingml/2006/main" xmlns:r="http://schemas.openxmlformats.org/officeDocument/2006/relationships" xmlns:p="http://schemas.openxmlformats.org/presentationml/2006/main">
+  <p:cSld>
+    <p:spTree>
+      <p:nvGrpSpPr>
+        <p:cNvPr id="1" name=""/>
+        <p:cNvGrpSpPr/>
+        <p:nvPr/>
+      </p:nvGrpSpPr>
+      <p:grpSpPr>
+        <a:xfrm>
+          <a:off x="0" y="0"/>
+          <a:ext cx="0" cy="0"/>
+          <a:chOff x="0" y="0"/>
+          <a:chExt cx="0" cy="0"/>
+        </a:xfrm>
+      </p:grpSpPr>
+      <p:sp>
+        <p:nvSpPr>
+          <p:cNvPr id="2" name="Title 1">
+            <a:extLst>
+              <a:ext uri="{FF2B5EF4-FFF2-40B4-BE49-F238E27FC236}">
+                <a16:creationId xmlns:a16="http://schemas.microsoft.com/office/drawing/2014/main" id="{BEC55787-1874-66F9-DB71-FDEE7FC23BE0}"/>
+              </a:ext>
+            </a:extLst>
+          </p:cNvPr>
+          <p:cNvSpPr>
+            <a:spLocks noGrp="1"/>
+          </p:cNvSpPr>
+          <p:nvPr>
+            <p:ph type="title"/>
+          </p:nvPr>
+        </p:nvSpPr>
+        <p:spPr/>
+        <p:txBody>
+          <a:bodyPr/>
+          <a:lstStyle/>
+          <a:p>
+            <a:endParaRPr lang="en-US"/>
+          </a:p>
+        </p:txBody>
+      </p:sp>
+      <p:sp>
+        <p:nvSpPr>
+          <p:cNvPr id="3" name="Content Placeholder 2">
+            <a:extLst>
+              <a:ext uri="{FF2B5EF4-FFF2-40B4-BE49-F238E27FC236}">
+                <a16:creationId xmlns:a16="http://schemas.microsoft.com/office/drawing/2014/main" id="{67E040F4-0EC6-15C7-6F7A-CD69AE0D3CFF}"/>
+              </a:ext>
+            </a:extLst>
+          </p:cNvPr>
+          <p:cNvSpPr>
+            <a:spLocks noGrp="1"/>
+          </p:cNvSpPr>
+          <p:nvPr>
+            <p:ph idx="1"/>
+          </p:nvPr>
+        </p:nvSpPr>
+        <p:spPr/>
+        <p:txBody>
+          <a:bodyPr/>
+          <a:lstStyle/>
+          <a:p>
+            <a:endParaRPr lang="en-US"/>
+          </a:p>
+        </p:txBody>
+      </p:sp>
+      <p:pic>
+        <p:nvPicPr>
+          <p:cNvPr id="4098" name="Picture 2">
+            <a:extLst>
+              <a:ext uri="{FF2B5EF4-FFF2-40B4-BE49-F238E27FC236}">
+                <a16:creationId xmlns:a16="http://schemas.microsoft.com/office/drawing/2014/main" id="{15C4AF63-04CA-5110-CC28-EC6929B5845B}"/>
+              </a:ext>
+            </a:extLst>
+          </p:cNvPr>
+          <p:cNvPicPr>
+            <a:picLocks noChangeAspect="1" noChangeArrowheads="1"/>
+          </p:cNvPicPr>
+          <p:nvPr/>
+        </p:nvPicPr>
+        <p:blipFill>
+          <a:blip r:embed="rId2">
+            <a:extLst>
+              <a:ext uri="{28A0092B-C50C-407E-A947-70E740481C1C}">
+                <a14:useLocalDpi xmlns:a14="http://schemas.microsoft.com/office/drawing/2010/main" val="0"/>
+              </a:ext>
+            </a:extLst>
+          </a:blip>
+          <a:srcRect/>
+          <a:stretch>
+            <a:fillRect/>
+          </a:stretch>
+        </p:blipFill>
+        <p:spPr bwMode="auto">
+          <a:xfrm>
+            <a:off x="0" y="2220913"/>
+            <a:ext cx="9144000" cy="2414587"/>
+          </a:xfrm>
+          <a:prstGeom prst="rect">
+            <a:avLst/>
+          </a:prstGeom>
+          <a:noFill/>
+          <a:extLst>
+            <a:ext uri="{909E8E84-426E-40DD-AFC4-6F175D3DCCD1}">
+              <a14:hiddenFill xmlns:a14="http://schemas.microsoft.com/office/drawing/2010/main">
+                <a:solidFill>
+                  <a:srgbClr val="FFFFFF"/>
+                </a:solidFill>
+              </a14:hiddenFill>
+            </a:ext>
+          </a:extLst>
+        </p:spPr>
+      </p:pic>
+    </p:spTree>
+    <p:extLst>
+      <p:ext uri="{BB962C8B-B14F-4D97-AF65-F5344CB8AC3E}">
+        <p14:creationId xmlns:p14="http://schemas.microsoft.com/office/powerpoint/2010/main" val="878438591"/>
+      </p:ext>
+    </p:extLst>
+  </p:cSld>
+  <p:clrMapOvr>
+    <a:masterClrMapping/>
+  </p:clrMapOvr>
+</p:sld>
+</file>
+
+<file path=ppt/slides/slide9.xml><?xml version="1.0" encoding="utf-8"?>
+<p:sld xmlns:a="http://schemas.openxmlformats.org/drawingml/2006/main" xmlns:r="http://schemas.openxmlformats.org/officeDocument/2006/relationships" xmlns:p="http://schemas.openxmlformats.org/presentationml/2006/main">
+  <p:cSld>
+    <p:spTree>
+      <p:nvGrpSpPr>
+        <p:cNvPr id="1" name=""/>
+        <p:cNvGrpSpPr/>
+        <p:nvPr/>
+      </p:nvGrpSpPr>
+      <p:grpSpPr>
+        <a:xfrm>
+          <a:off x="0" y="0"/>
+          <a:ext cx="0" cy="0"/>
+          <a:chOff x="0" y="0"/>
+          <a:chExt cx="0" cy="0"/>
+        </a:xfrm>
+      </p:grpSpPr>
+      <p:sp>
+        <p:nvSpPr>
+          <p:cNvPr id="2" name="Title 1">
+            <a:extLst>
+              <a:ext uri="{FF2B5EF4-FFF2-40B4-BE49-F238E27FC236}">
+                <a16:creationId xmlns:a16="http://schemas.microsoft.com/office/drawing/2014/main" id="{D6F771FB-7C7F-9F7F-3772-DC1F42D859F1}"/>
+              </a:ext>
+            </a:extLst>
+          </p:cNvPr>
+          <p:cNvSpPr>
+            <a:spLocks noGrp="1"/>
+          </p:cNvSpPr>
+          <p:nvPr>
+            <p:ph type="title"/>
+          </p:nvPr>
+        </p:nvSpPr>
+        <p:spPr/>
+        <p:txBody>
+          <a:bodyPr/>
+          <a:lstStyle/>
+          <a:p>
+            <a:endParaRPr lang="en-US"/>
+          </a:p>
+        </p:txBody>
+      </p:sp>
+      <p:sp>
+        <p:nvSpPr>
+          <p:cNvPr id="3" name="Content Placeholder 2">
+            <a:extLst>
+              <a:ext uri="{FF2B5EF4-FFF2-40B4-BE49-F238E27FC236}">
+                <a16:creationId xmlns:a16="http://schemas.microsoft.com/office/drawing/2014/main" id="{ACAAB099-102F-2574-8A7D-C87175B8395A}"/>
+              </a:ext>
+            </a:extLst>
+          </p:cNvPr>
+          <p:cNvSpPr>
+            <a:spLocks noGrp="1"/>
+          </p:cNvSpPr>
+          <p:nvPr>
+            <p:ph idx="1"/>
+          </p:nvPr>
+        </p:nvSpPr>
+        <p:spPr/>
+        <p:txBody>
+          <a:bodyPr/>
+          <a:lstStyle/>
+          <a:p>
+            <a:endParaRPr lang="en-US"/>
+          </a:p>
+        </p:txBody>
+      </p:sp>
+      <p:pic>
+        <p:nvPicPr>
+          <p:cNvPr id="5122" name="Picture 2">
+            <a:extLst>
+              <a:ext uri="{FF2B5EF4-FFF2-40B4-BE49-F238E27FC236}">
+                <a16:creationId xmlns:a16="http://schemas.microsoft.com/office/drawing/2014/main" id="{12462F82-74BA-2273-D003-57E6C0FEC06D}"/>
+              </a:ext>
+            </a:extLst>
+          </p:cNvPr>
+          <p:cNvPicPr>
+            <a:picLocks noChangeAspect="1" noChangeArrowheads="1"/>
+          </p:cNvPicPr>
+          <p:nvPr/>
+        </p:nvPicPr>
+        <p:blipFill>
+          <a:blip r:embed="rId2">
+            <a:extLst>
+              <a:ext uri="{28A0092B-C50C-407E-A947-70E740481C1C}">
+                <a14:useLocalDpi xmlns:a14="http://schemas.microsoft.com/office/drawing/2010/main" val="0"/>
+              </a:ext>
+            </a:extLst>
+          </a:blip>
+          <a:srcRect/>
+          <a:stretch>
+            <a:fillRect/>
+          </a:stretch>
+        </p:blipFill>
+        <p:spPr bwMode="auto">
+          <a:xfrm>
+            <a:off x="354075" y="1738143"/>
+            <a:ext cx="8173411" cy="2286000"/>
+          </a:xfrm>
+          <a:prstGeom prst="rect">
+            <a:avLst/>
+          </a:prstGeom>
+          <a:noFill/>
+          <a:extLst>
+            <a:ext uri="{909E8E84-426E-40DD-AFC4-6F175D3DCCD1}">
+              <a14:hiddenFill xmlns:a14="http://schemas.microsoft.com/office/drawing/2010/main">
+                <a:solidFill>
+                  <a:srgbClr val="FFFFFF"/>
+                </a:solidFill>
+              </a14:hiddenFill>
+            </a:ext>
+          </a:extLst>
+        </p:spPr>
+      </p:pic>
+      <p:pic>
+        <p:nvPicPr>
+          <p:cNvPr id="5124" name="Picture 4">
+            <a:extLst>
+              <a:ext uri="{FF2B5EF4-FFF2-40B4-BE49-F238E27FC236}">
+                <a16:creationId xmlns:a16="http://schemas.microsoft.com/office/drawing/2014/main" id="{50DF4945-4466-A1C6-CD37-BC0B613AB725}"/>
+              </a:ext>
+            </a:extLst>
+          </p:cNvPr>
+          <p:cNvPicPr>
+            <a:picLocks noChangeAspect="1" noChangeArrowheads="1"/>
+          </p:cNvPicPr>
+          <p:nvPr/>
+        </p:nvPicPr>
+        <p:blipFill>
+          <a:blip r:embed="rId3">
+            <a:extLst>
+              <a:ext uri="{28A0092B-C50C-407E-A947-70E740481C1C}">
+                <a14:useLocalDpi xmlns:a14="http://schemas.microsoft.com/office/drawing/2010/main" val="0"/>
+              </a:ext>
+            </a:extLst>
+          </a:blip>
+          <a:srcRect/>
+          <a:stretch>
+            <a:fillRect/>
+          </a:stretch>
+        </p:blipFill>
+        <p:spPr bwMode="auto">
+          <a:xfrm>
+            <a:off x="628650" y="4127836"/>
+            <a:ext cx="7898836" cy="2286000"/>
+          </a:xfrm>
+          <a:prstGeom prst="rect">
+            <a:avLst/>
+          </a:prstGeom>
+          <a:noFill/>
+          <a:extLst>
+            <a:ext uri="{909E8E84-426E-40DD-AFC4-6F175D3DCCD1}">
+              <a14:hiddenFill xmlns:a14="http://schemas.microsoft.com/office/drawing/2010/main">
+                <a:solidFill>
+                  <a:srgbClr val="FFFFFF"/>
+                </a:solidFill>
+              </a14:hiddenFill>
+            </a:ext>
+          </a:extLst>
+        </p:spPr>
+      </p:pic>
+    </p:spTree>
+    <p:extLst>
+      <p:ext uri="{BB962C8B-B14F-4D97-AF65-F5344CB8AC3E}">
+        <p14:creationId xmlns:p14="http://schemas.microsoft.com/office/powerpoint/2010/main" val="3561003786"/>
       </p:ext>
     </p:extLst>
   </p:cSld>

</xml_diff>

<commit_message>
Finished the Reports for Act 2/3/4
</commit_message>
<xml_diff>
--- a/01 Color Segmentation/Activity 1 - Color Segmentation.pptx
+++ b/01 Color Segmentation/Activity 1 - Color Segmentation.pptx
@@ -10,12 +10,14 @@
     <p:sldId id="258" r:id="rId4"/>
     <p:sldId id="259" r:id="rId5"/>
     <p:sldId id="260" r:id="rId6"/>
-    <p:sldId id="265" r:id="rId7"/>
-    <p:sldId id="266" r:id="rId8"/>
-    <p:sldId id="262" r:id="rId9"/>
-    <p:sldId id="263" r:id="rId10"/>
-    <p:sldId id="261" r:id="rId11"/>
-    <p:sldId id="264" r:id="rId12"/>
+    <p:sldId id="267" r:id="rId7"/>
+    <p:sldId id="268" r:id="rId8"/>
+    <p:sldId id="265" r:id="rId9"/>
+    <p:sldId id="266" r:id="rId10"/>
+    <p:sldId id="262" r:id="rId11"/>
+    <p:sldId id="263" r:id="rId12"/>
+    <p:sldId id="261" r:id="rId13"/>
+    <p:sldId id="264" r:id="rId14"/>
   </p:sldIdLst>
   <p:sldSz cx="9144000" cy="6858000" type="screen4x3"/>
   <p:notesSz cx="6858000" cy="9144000"/>
@@ -133,6 +135,2316 @@
 </p:presentation>
 </file>
 
+<file path=ppt/diagrams/colors1.xml><?xml version="1.0" encoding="utf-8"?>
+<dgm:colorsDef xmlns:dgm="http://schemas.openxmlformats.org/drawingml/2006/diagram" xmlns:a="http://schemas.openxmlformats.org/drawingml/2006/main" uniqueId="urn:microsoft.com/office/officeart/2005/8/colors/accent1_2">
+  <dgm:title val=""/>
+  <dgm:desc val=""/>
+  <dgm:catLst>
+    <dgm:cat type="accent1" pri="11200"/>
+  </dgm:catLst>
+  <dgm:styleLbl name="node0">
+    <dgm:fillClrLst meth="repeat">
+      <a:schemeClr val="accent1"/>
+    </dgm:fillClrLst>
+    <dgm:linClrLst meth="repeat">
+      <a:schemeClr val="lt1"/>
+    </dgm:linClrLst>
+    <dgm:effectClrLst/>
+    <dgm:txLinClrLst/>
+    <dgm:txFillClrLst/>
+    <dgm:txEffectClrLst/>
+  </dgm:styleLbl>
+  <dgm:styleLbl name="alignNode1">
+    <dgm:fillClrLst meth="repeat">
+      <a:schemeClr val="accent1"/>
+    </dgm:fillClrLst>
+    <dgm:linClrLst meth="repeat">
+      <a:schemeClr val="accent1"/>
+    </dgm:linClrLst>
+    <dgm:effectClrLst/>
+    <dgm:txLinClrLst/>
+    <dgm:txFillClrLst/>
+    <dgm:txEffectClrLst/>
+  </dgm:styleLbl>
+  <dgm:styleLbl name="node1">
+    <dgm:fillClrLst meth="repeat">
+      <a:schemeClr val="accent1"/>
+    </dgm:fillClrLst>
+    <dgm:linClrLst meth="repeat">
+      <a:schemeClr val="lt1"/>
+    </dgm:linClrLst>
+    <dgm:effectClrLst/>
+    <dgm:txLinClrLst/>
+    <dgm:txFillClrLst/>
+    <dgm:txEffectClrLst/>
+  </dgm:styleLbl>
+  <dgm:styleLbl name="lnNode1">
+    <dgm:fillClrLst meth="repeat">
+      <a:schemeClr val="accent1"/>
+    </dgm:fillClrLst>
+    <dgm:linClrLst meth="repeat">
+      <a:schemeClr val="lt1"/>
+    </dgm:linClrLst>
+    <dgm:effectClrLst/>
+    <dgm:txLinClrLst/>
+    <dgm:txFillClrLst/>
+    <dgm:txEffectClrLst/>
+  </dgm:styleLbl>
+  <dgm:styleLbl name="vennNode1">
+    <dgm:fillClrLst meth="repeat">
+      <a:schemeClr val="accent1">
+        <a:alpha val="50000"/>
+      </a:schemeClr>
+    </dgm:fillClrLst>
+    <dgm:linClrLst meth="repeat">
+      <a:schemeClr val="lt1"/>
+    </dgm:linClrLst>
+    <dgm:effectClrLst/>
+    <dgm:txLinClrLst/>
+    <dgm:txFillClrLst/>
+    <dgm:txEffectClrLst/>
+  </dgm:styleLbl>
+  <dgm:styleLbl name="node2">
+    <dgm:fillClrLst meth="repeat">
+      <a:schemeClr val="accent1"/>
+    </dgm:fillClrLst>
+    <dgm:linClrLst meth="repeat">
+      <a:schemeClr val="lt1"/>
+    </dgm:linClrLst>
+    <dgm:effectClrLst/>
+    <dgm:txLinClrLst/>
+    <dgm:txFillClrLst/>
+    <dgm:txEffectClrLst/>
+  </dgm:styleLbl>
+  <dgm:styleLbl name="node3">
+    <dgm:fillClrLst meth="repeat">
+      <a:schemeClr val="accent1"/>
+    </dgm:fillClrLst>
+    <dgm:linClrLst meth="repeat">
+      <a:schemeClr val="lt1"/>
+    </dgm:linClrLst>
+    <dgm:effectClrLst/>
+    <dgm:txLinClrLst/>
+    <dgm:txFillClrLst/>
+    <dgm:txEffectClrLst/>
+  </dgm:styleLbl>
+  <dgm:styleLbl name="node4">
+    <dgm:fillClrLst meth="repeat">
+      <a:schemeClr val="accent1"/>
+    </dgm:fillClrLst>
+    <dgm:linClrLst meth="repeat">
+      <a:schemeClr val="lt1"/>
+    </dgm:linClrLst>
+    <dgm:effectClrLst/>
+    <dgm:txLinClrLst/>
+    <dgm:txFillClrLst/>
+    <dgm:txEffectClrLst/>
+  </dgm:styleLbl>
+  <dgm:styleLbl name="fgImgPlace1">
+    <dgm:fillClrLst meth="repeat">
+      <a:schemeClr val="accent1">
+        <a:tint val="50000"/>
+      </a:schemeClr>
+    </dgm:fillClrLst>
+    <dgm:linClrLst meth="repeat">
+      <a:schemeClr val="lt1"/>
+    </dgm:linClrLst>
+    <dgm:effectClrLst/>
+    <dgm:txLinClrLst/>
+    <dgm:txFillClrLst meth="repeat">
+      <a:schemeClr val="lt1"/>
+    </dgm:txFillClrLst>
+    <dgm:txEffectClrLst/>
+  </dgm:styleLbl>
+  <dgm:styleLbl name="alignImgPlace1">
+    <dgm:fillClrLst meth="repeat">
+      <a:schemeClr val="accent1">
+        <a:tint val="50000"/>
+      </a:schemeClr>
+    </dgm:fillClrLst>
+    <dgm:linClrLst meth="repeat">
+      <a:schemeClr val="lt1"/>
+    </dgm:linClrLst>
+    <dgm:effectClrLst/>
+    <dgm:txLinClrLst/>
+    <dgm:txFillClrLst meth="repeat">
+      <a:schemeClr val="lt1"/>
+    </dgm:txFillClrLst>
+    <dgm:txEffectClrLst/>
+  </dgm:styleLbl>
+  <dgm:styleLbl name="bgImgPlace1">
+    <dgm:fillClrLst meth="repeat">
+      <a:schemeClr val="accent1">
+        <a:tint val="50000"/>
+      </a:schemeClr>
+    </dgm:fillClrLst>
+    <dgm:linClrLst meth="repeat">
+      <a:schemeClr val="lt1"/>
+    </dgm:linClrLst>
+    <dgm:effectClrLst/>
+    <dgm:txLinClrLst/>
+    <dgm:txFillClrLst meth="repeat">
+      <a:schemeClr val="lt1"/>
+    </dgm:txFillClrLst>
+    <dgm:txEffectClrLst/>
+  </dgm:styleLbl>
+  <dgm:styleLbl name="sibTrans2D1">
+    <dgm:fillClrLst meth="repeat">
+      <a:schemeClr val="accent1">
+        <a:tint val="60000"/>
+      </a:schemeClr>
+    </dgm:fillClrLst>
+    <dgm:linClrLst meth="repeat">
+      <a:schemeClr val="accent1">
+        <a:tint val="60000"/>
+      </a:schemeClr>
+    </dgm:linClrLst>
+    <dgm:effectClrLst/>
+    <dgm:txLinClrLst/>
+    <dgm:txFillClrLst/>
+    <dgm:txEffectClrLst/>
+  </dgm:styleLbl>
+  <dgm:styleLbl name="fgSibTrans2D1">
+    <dgm:fillClrLst meth="repeat">
+      <a:schemeClr val="accent1">
+        <a:tint val="60000"/>
+      </a:schemeClr>
+    </dgm:fillClrLst>
+    <dgm:linClrLst meth="repeat">
+      <a:schemeClr val="accent1">
+        <a:tint val="60000"/>
+      </a:schemeClr>
+    </dgm:linClrLst>
+    <dgm:effectClrLst/>
+    <dgm:txLinClrLst/>
+    <dgm:txFillClrLst/>
+    <dgm:txEffectClrLst/>
+  </dgm:styleLbl>
+  <dgm:styleLbl name="bgSibTrans2D1">
+    <dgm:fillClrLst meth="repeat">
+      <a:schemeClr val="accent1">
+        <a:tint val="60000"/>
+      </a:schemeClr>
+    </dgm:fillClrLst>
+    <dgm:linClrLst meth="repeat">
+      <a:schemeClr val="accent1">
+        <a:tint val="60000"/>
+      </a:schemeClr>
+    </dgm:linClrLst>
+    <dgm:effectClrLst/>
+    <dgm:txLinClrLst/>
+    <dgm:txFillClrLst/>
+    <dgm:txEffectClrLst/>
+  </dgm:styleLbl>
+  <dgm:styleLbl name="sibTrans1D1">
+    <dgm:fillClrLst meth="repeat">
+      <a:schemeClr val="accent1"/>
+    </dgm:fillClrLst>
+    <dgm:linClrLst meth="repeat">
+      <a:schemeClr val="accent1"/>
+    </dgm:linClrLst>
+    <dgm:effectClrLst/>
+    <dgm:txLinClrLst/>
+    <dgm:txFillClrLst meth="repeat">
+      <a:schemeClr val="tx1"/>
+    </dgm:txFillClrLst>
+    <dgm:txEffectClrLst/>
+  </dgm:styleLbl>
+  <dgm:styleLbl name="callout">
+    <dgm:fillClrLst meth="repeat">
+      <a:schemeClr val="accent1"/>
+    </dgm:fillClrLst>
+    <dgm:linClrLst meth="repeat">
+      <a:schemeClr val="accent1">
+        <a:tint val="50000"/>
+      </a:schemeClr>
+    </dgm:linClrLst>
+    <dgm:effectClrLst/>
+    <dgm:txLinClrLst/>
+    <dgm:txFillClrLst meth="repeat">
+      <a:schemeClr val="tx1"/>
+    </dgm:txFillClrLst>
+    <dgm:txEffectClrLst/>
+  </dgm:styleLbl>
+  <dgm:styleLbl name="asst0">
+    <dgm:fillClrLst meth="repeat">
+      <a:schemeClr val="accent1"/>
+    </dgm:fillClrLst>
+    <dgm:linClrLst meth="repeat">
+      <a:schemeClr val="lt1"/>
+    </dgm:linClrLst>
+    <dgm:effectClrLst/>
+    <dgm:txLinClrLst/>
+    <dgm:txFillClrLst/>
+    <dgm:txEffectClrLst/>
+  </dgm:styleLbl>
+  <dgm:styleLbl name="asst1">
+    <dgm:fillClrLst meth="repeat">
+      <a:schemeClr val="accent1"/>
+    </dgm:fillClrLst>
+    <dgm:linClrLst meth="repeat">
+      <a:schemeClr val="lt1"/>
+    </dgm:linClrLst>
+    <dgm:effectClrLst/>
+    <dgm:txLinClrLst/>
+    <dgm:txFillClrLst/>
+    <dgm:txEffectClrLst/>
+  </dgm:styleLbl>
+  <dgm:styleLbl name="asst2">
+    <dgm:fillClrLst meth="repeat">
+      <a:schemeClr val="accent1"/>
+    </dgm:fillClrLst>
+    <dgm:linClrLst meth="repeat">
+      <a:schemeClr val="lt1"/>
+    </dgm:linClrLst>
+    <dgm:effectClrLst/>
+    <dgm:txLinClrLst/>
+    <dgm:txFillClrLst/>
+    <dgm:txEffectClrLst/>
+  </dgm:styleLbl>
+  <dgm:styleLbl name="asst3">
+    <dgm:fillClrLst meth="repeat">
+      <a:schemeClr val="accent1"/>
+    </dgm:fillClrLst>
+    <dgm:linClrLst meth="repeat">
+      <a:schemeClr val="lt1"/>
+    </dgm:linClrLst>
+    <dgm:effectClrLst/>
+    <dgm:txLinClrLst/>
+    <dgm:txFillClrLst/>
+    <dgm:txEffectClrLst/>
+  </dgm:styleLbl>
+  <dgm:styleLbl name="asst4">
+    <dgm:fillClrLst meth="repeat">
+      <a:schemeClr val="accent1"/>
+    </dgm:fillClrLst>
+    <dgm:linClrLst meth="repeat">
+      <a:schemeClr val="lt1"/>
+    </dgm:linClrLst>
+    <dgm:effectClrLst/>
+    <dgm:txLinClrLst/>
+    <dgm:txFillClrLst/>
+    <dgm:txEffectClrLst/>
+  </dgm:styleLbl>
+  <dgm:styleLbl name="parChTrans2D1">
+    <dgm:fillClrLst meth="repeat">
+      <a:schemeClr val="accent1">
+        <a:tint val="60000"/>
+      </a:schemeClr>
+    </dgm:fillClrLst>
+    <dgm:linClrLst meth="repeat">
+      <a:schemeClr val="accent1">
+        <a:tint val="60000"/>
+      </a:schemeClr>
+    </dgm:linClrLst>
+    <dgm:effectClrLst/>
+    <dgm:txLinClrLst/>
+    <dgm:txFillClrLst meth="repeat">
+      <a:schemeClr val="lt1"/>
+    </dgm:txFillClrLst>
+    <dgm:txEffectClrLst/>
+  </dgm:styleLbl>
+  <dgm:styleLbl name="parChTrans2D2">
+    <dgm:fillClrLst meth="repeat">
+      <a:schemeClr val="accent1"/>
+    </dgm:fillClrLst>
+    <dgm:linClrLst meth="repeat">
+      <a:schemeClr val="accent1"/>
+    </dgm:linClrLst>
+    <dgm:effectClrLst/>
+    <dgm:txLinClrLst/>
+    <dgm:txFillClrLst meth="repeat">
+      <a:schemeClr val="lt1"/>
+    </dgm:txFillClrLst>
+    <dgm:txEffectClrLst/>
+  </dgm:styleLbl>
+  <dgm:styleLbl name="parChTrans2D3">
+    <dgm:fillClrLst meth="repeat">
+      <a:schemeClr val="accent1"/>
+    </dgm:fillClrLst>
+    <dgm:linClrLst meth="repeat">
+      <a:schemeClr val="accent1"/>
+    </dgm:linClrLst>
+    <dgm:effectClrLst/>
+    <dgm:txLinClrLst/>
+    <dgm:txFillClrLst meth="repeat">
+      <a:schemeClr val="lt1"/>
+    </dgm:txFillClrLst>
+    <dgm:txEffectClrLst/>
+  </dgm:styleLbl>
+  <dgm:styleLbl name="parChTrans2D4">
+    <dgm:fillClrLst meth="repeat">
+      <a:schemeClr val="accent1"/>
+    </dgm:fillClrLst>
+    <dgm:linClrLst meth="repeat">
+      <a:schemeClr val="accent1"/>
+    </dgm:linClrLst>
+    <dgm:effectClrLst/>
+    <dgm:txLinClrLst/>
+    <dgm:txFillClrLst meth="repeat">
+      <a:schemeClr val="lt1"/>
+    </dgm:txFillClrLst>
+    <dgm:txEffectClrLst/>
+  </dgm:styleLbl>
+  <dgm:styleLbl name="parChTrans1D1">
+    <dgm:fillClrLst meth="repeat">
+      <a:schemeClr val="accent1"/>
+    </dgm:fillClrLst>
+    <dgm:linClrLst meth="repeat">
+      <a:schemeClr val="accent1">
+        <a:shade val="60000"/>
+      </a:schemeClr>
+    </dgm:linClrLst>
+    <dgm:effectClrLst/>
+    <dgm:txLinClrLst/>
+    <dgm:txFillClrLst meth="repeat">
+      <a:schemeClr val="tx1"/>
+    </dgm:txFillClrLst>
+    <dgm:txEffectClrLst/>
+  </dgm:styleLbl>
+  <dgm:styleLbl name="parChTrans1D2">
+    <dgm:fillClrLst meth="repeat">
+      <a:schemeClr val="accent1"/>
+    </dgm:fillClrLst>
+    <dgm:linClrLst meth="repeat">
+      <a:schemeClr val="accent1">
+        <a:shade val="60000"/>
+      </a:schemeClr>
+    </dgm:linClrLst>
+    <dgm:effectClrLst/>
+    <dgm:txLinClrLst/>
+    <dgm:txFillClrLst meth="repeat">
+      <a:schemeClr val="tx1"/>
+    </dgm:txFillClrLst>
+    <dgm:txEffectClrLst/>
+  </dgm:styleLbl>
+  <dgm:styleLbl name="parChTrans1D3">
+    <dgm:fillClrLst meth="repeat">
+      <a:schemeClr val="accent1"/>
+    </dgm:fillClrLst>
+    <dgm:linClrLst meth="repeat">
+      <a:schemeClr val="accent1">
+        <a:shade val="80000"/>
+      </a:schemeClr>
+    </dgm:linClrLst>
+    <dgm:effectClrLst/>
+    <dgm:txLinClrLst/>
+    <dgm:txFillClrLst meth="repeat">
+      <a:schemeClr val="tx1"/>
+    </dgm:txFillClrLst>
+    <dgm:txEffectClrLst/>
+  </dgm:styleLbl>
+  <dgm:styleLbl name="parChTrans1D4">
+    <dgm:fillClrLst meth="repeat">
+      <a:schemeClr val="accent1"/>
+    </dgm:fillClrLst>
+    <dgm:linClrLst meth="repeat">
+      <a:schemeClr val="accent1">
+        <a:shade val="80000"/>
+      </a:schemeClr>
+    </dgm:linClrLst>
+    <dgm:effectClrLst/>
+    <dgm:txLinClrLst/>
+    <dgm:txFillClrLst meth="repeat">
+      <a:schemeClr val="tx1"/>
+    </dgm:txFillClrLst>
+    <dgm:txEffectClrLst/>
+  </dgm:styleLbl>
+  <dgm:styleLbl name="fgAcc1">
+    <dgm:fillClrLst meth="repeat">
+      <a:schemeClr val="lt1">
+        <a:alpha val="90000"/>
+      </a:schemeClr>
+    </dgm:fillClrLst>
+    <dgm:linClrLst meth="repeat">
+      <a:schemeClr val="accent1"/>
+    </dgm:linClrLst>
+    <dgm:effectClrLst/>
+    <dgm:txLinClrLst/>
+    <dgm:txFillClrLst meth="repeat">
+      <a:schemeClr val="dk1"/>
+    </dgm:txFillClrLst>
+    <dgm:txEffectClrLst/>
+  </dgm:styleLbl>
+  <dgm:styleLbl name="conFgAcc1">
+    <dgm:fillClrLst meth="repeat">
+      <a:schemeClr val="lt1">
+        <a:alpha val="90000"/>
+      </a:schemeClr>
+    </dgm:fillClrLst>
+    <dgm:linClrLst meth="repeat">
+      <a:schemeClr val="accent1"/>
+    </dgm:linClrLst>
+    <dgm:effectClrLst/>
+    <dgm:txLinClrLst/>
+    <dgm:txFillClrLst meth="repeat">
+      <a:schemeClr val="dk1"/>
+    </dgm:txFillClrLst>
+    <dgm:txEffectClrLst/>
+  </dgm:styleLbl>
+  <dgm:styleLbl name="alignAcc1">
+    <dgm:fillClrLst meth="repeat">
+      <a:schemeClr val="lt1">
+        <a:alpha val="90000"/>
+      </a:schemeClr>
+    </dgm:fillClrLst>
+    <dgm:linClrLst meth="repeat">
+      <a:schemeClr val="accent1"/>
+    </dgm:linClrLst>
+    <dgm:effectClrLst/>
+    <dgm:txLinClrLst/>
+    <dgm:txFillClrLst meth="repeat">
+      <a:schemeClr val="dk1"/>
+    </dgm:txFillClrLst>
+    <dgm:txEffectClrLst/>
+  </dgm:styleLbl>
+  <dgm:styleLbl name="trAlignAcc1">
+    <dgm:fillClrLst meth="repeat">
+      <a:schemeClr val="lt1">
+        <a:alpha val="40000"/>
+      </a:schemeClr>
+    </dgm:fillClrLst>
+    <dgm:linClrLst meth="repeat">
+      <a:schemeClr val="accent1"/>
+    </dgm:linClrLst>
+    <dgm:effectClrLst/>
+    <dgm:txLinClrLst/>
+    <dgm:txFillClrLst meth="repeat">
+      <a:schemeClr val="dk1"/>
+    </dgm:txFillClrLst>
+    <dgm:txEffectClrLst/>
+  </dgm:styleLbl>
+  <dgm:styleLbl name="bgAcc1">
+    <dgm:fillClrLst meth="repeat">
+      <a:schemeClr val="lt1">
+        <a:alpha val="90000"/>
+      </a:schemeClr>
+    </dgm:fillClrLst>
+    <dgm:linClrLst meth="repeat">
+      <a:schemeClr val="accent1"/>
+    </dgm:linClrLst>
+    <dgm:effectClrLst/>
+    <dgm:txLinClrLst/>
+    <dgm:txFillClrLst meth="repeat">
+      <a:schemeClr val="dk1"/>
+    </dgm:txFillClrLst>
+    <dgm:txEffectClrLst/>
+  </dgm:styleLbl>
+  <dgm:styleLbl name="solidFgAcc1">
+    <dgm:fillClrLst meth="repeat">
+      <a:schemeClr val="lt1"/>
+    </dgm:fillClrLst>
+    <dgm:linClrLst meth="repeat">
+      <a:schemeClr val="accent1"/>
+    </dgm:linClrLst>
+    <dgm:effectClrLst/>
+    <dgm:txLinClrLst/>
+    <dgm:txFillClrLst meth="repeat">
+      <a:schemeClr val="dk1"/>
+    </dgm:txFillClrLst>
+    <dgm:txEffectClrLst/>
+  </dgm:styleLbl>
+  <dgm:styleLbl name="solidAlignAcc1">
+    <dgm:fillClrLst meth="repeat">
+      <a:schemeClr val="lt1"/>
+    </dgm:fillClrLst>
+    <dgm:linClrLst meth="repeat">
+      <a:schemeClr val="accent1"/>
+    </dgm:linClrLst>
+    <dgm:effectClrLst/>
+    <dgm:txLinClrLst/>
+    <dgm:txFillClrLst meth="repeat">
+      <a:schemeClr val="dk1"/>
+    </dgm:txFillClrLst>
+    <dgm:txEffectClrLst/>
+  </dgm:styleLbl>
+  <dgm:styleLbl name="solidBgAcc1">
+    <dgm:fillClrLst meth="repeat">
+      <a:schemeClr val="lt1"/>
+    </dgm:fillClrLst>
+    <dgm:linClrLst meth="repeat">
+      <a:schemeClr val="accent1"/>
+    </dgm:linClrLst>
+    <dgm:effectClrLst/>
+    <dgm:txLinClrLst/>
+    <dgm:txFillClrLst meth="repeat">
+      <a:schemeClr val="dk1"/>
+    </dgm:txFillClrLst>
+    <dgm:txEffectClrLst/>
+  </dgm:styleLbl>
+  <dgm:styleLbl name="fgAccFollowNode1">
+    <dgm:fillClrLst meth="repeat">
+      <a:schemeClr val="accent1">
+        <a:alpha val="90000"/>
+        <a:tint val="40000"/>
+      </a:schemeClr>
+    </dgm:fillClrLst>
+    <dgm:linClrLst meth="repeat">
+      <a:schemeClr val="accent1">
+        <a:alpha val="90000"/>
+        <a:tint val="40000"/>
+      </a:schemeClr>
+    </dgm:linClrLst>
+    <dgm:effectClrLst/>
+    <dgm:txLinClrLst/>
+    <dgm:txFillClrLst meth="repeat">
+      <a:schemeClr val="dk1"/>
+    </dgm:txFillClrLst>
+    <dgm:txEffectClrLst/>
+  </dgm:styleLbl>
+  <dgm:styleLbl name="alignAccFollowNode1">
+    <dgm:fillClrLst meth="repeat">
+      <a:schemeClr val="accent1">
+        <a:alpha val="90000"/>
+        <a:tint val="40000"/>
+      </a:schemeClr>
+    </dgm:fillClrLst>
+    <dgm:linClrLst meth="repeat">
+      <a:schemeClr val="accent1">
+        <a:alpha val="90000"/>
+        <a:tint val="40000"/>
+      </a:schemeClr>
+    </dgm:linClrLst>
+    <dgm:effectClrLst/>
+    <dgm:txLinClrLst/>
+    <dgm:txFillClrLst meth="repeat">
+      <a:schemeClr val="dk1"/>
+    </dgm:txFillClrLst>
+    <dgm:txEffectClrLst/>
+  </dgm:styleLbl>
+  <dgm:styleLbl name="bgAccFollowNode1">
+    <dgm:fillClrLst meth="repeat">
+      <a:schemeClr val="accent1">
+        <a:alpha val="90000"/>
+        <a:tint val="40000"/>
+      </a:schemeClr>
+    </dgm:fillClrLst>
+    <dgm:linClrLst meth="repeat">
+      <a:schemeClr val="accent1">
+        <a:alpha val="90000"/>
+        <a:tint val="40000"/>
+      </a:schemeClr>
+    </dgm:linClrLst>
+    <dgm:effectClrLst/>
+    <dgm:txLinClrLst/>
+    <dgm:txFillClrLst meth="repeat">
+      <a:schemeClr val="dk1"/>
+    </dgm:txFillClrLst>
+    <dgm:txEffectClrLst/>
+  </dgm:styleLbl>
+  <dgm:styleLbl name="fgAcc0">
+    <dgm:fillClrLst meth="repeat">
+      <a:schemeClr val="lt1">
+        <a:alpha val="90000"/>
+      </a:schemeClr>
+    </dgm:fillClrLst>
+    <dgm:linClrLst meth="repeat">
+      <a:schemeClr val="accent1"/>
+    </dgm:linClrLst>
+    <dgm:effectClrLst/>
+    <dgm:txLinClrLst/>
+    <dgm:txFillClrLst meth="repeat">
+      <a:schemeClr val="dk1"/>
+    </dgm:txFillClrLst>
+    <dgm:txEffectClrLst/>
+  </dgm:styleLbl>
+  <dgm:styleLbl name="fgAcc2">
+    <dgm:fillClrLst meth="repeat">
+      <a:schemeClr val="lt1">
+        <a:alpha val="90000"/>
+      </a:schemeClr>
+    </dgm:fillClrLst>
+    <dgm:linClrLst meth="repeat">
+      <a:schemeClr val="accent1"/>
+    </dgm:linClrLst>
+    <dgm:effectClrLst/>
+    <dgm:txLinClrLst/>
+    <dgm:txFillClrLst meth="repeat">
+      <a:schemeClr val="dk1"/>
+    </dgm:txFillClrLst>
+    <dgm:txEffectClrLst/>
+  </dgm:styleLbl>
+  <dgm:styleLbl name="fgAcc3">
+    <dgm:fillClrLst meth="repeat">
+      <a:schemeClr val="lt1">
+        <a:alpha val="90000"/>
+      </a:schemeClr>
+    </dgm:fillClrLst>
+    <dgm:linClrLst meth="repeat">
+      <a:schemeClr val="accent1"/>
+    </dgm:linClrLst>
+    <dgm:effectClrLst/>
+    <dgm:txLinClrLst/>
+    <dgm:txFillClrLst meth="repeat">
+      <a:schemeClr val="dk1"/>
+    </dgm:txFillClrLst>
+    <dgm:txEffectClrLst/>
+  </dgm:styleLbl>
+  <dgm:styleLbl name="fgAcc4">
+    <dgm:fillClrLst meth="repeat">
+      <a:schemeClr val="lt1">
+        <a:alpha val="90000"/>
+      </a:schemeClr>
+    </dgm:fillClrLst>
+    <dgm:linClrLst meth="repeat">
+      <a:schemeClr val="accent1"/>
+    </dgm:linClrLst>
+    <dgm:effectClrLst/>
+    <dgm:txLinClrLst/>
+    <dgm:txFillClrLst meth="repeat">
+      <a:schemeClr val="dk1"/>
+    </dgm:txFillClrLst>
+    <dgm:txEffectClrLst/>
+  </dgm:styleLbl>
+  <dgm:styleLbl name="bgShp">
+    <dgm:fillClrLst meth="repeat">
+      <a:schemeClr val="accent1">
+        <a:tint val="40000"/>
+      </a:schemeClr>
+    </dgm:fillClrLst>
+    <dgm:linClrLst meth="repeat">
+      <a:schemeClr val="accent1"/>
+    </dgm:linClrLst>
+    <dgm:effectClrLst/>
+    <dgm:txLinClrLst/>
+    <dgm:txFillClrLst meth="repeat">
+      <a:schemeClr val="dk1"/>
+    </dgm:txFillClrLst>
+    <dgm:txEffectClrLst/>
+  </dgm:styleLbl>
+  <dgm:styleLbl name="dkBgShp">
+    <dgm:fillClrLst meth="repeat">
+      <a:schemeClr val="accent1">
+        <a:shade val="80000"/>
+      </a:schemeClr>
+    </dgm:fillClrLst>
+    <dgm:linClrLst meth="repeat">
+      <a:schemeClr val="accent1"/>
+    </dgm:linClrLst>
+    <dgm:effectClrLst/>
+    <dgm:txLinClrLst/>
+    <dgm:txFillClrLst meth="repeat">
+      <a:schemeClr val="lt1"/>
+    </dgm:txFillClrLst>
+    <dgm:txEffectClrLst/>
+  </dgm:styleLbl>
+  <dgm:styleLbl name="trBgShp">
+    <dgm:fillClrLst meth="repeat">
+      <a:schemeClr val="accent1">
+        <a:tint val="50000"/>
+        <a:alpha val="40000"/>
+      </a:schemeClr>
+    </dgm:fillClrLst>
+    <dgm:linClrLst meth="repeat">
+      <a:schemeClr val="accent1"/>
+    </dgm:linClrLst>
+    <dgm:effectClrLst/>
+    <dgm:txLinClrLst/>
+    <dgm:txFillClrLst meth="repeat">
+      <a:schemeClr val="lt1"/>
+    </dgm:txFillClrLst>
+    <dgm:txEffectClrLst/>
+  </dgm:styleLbl>
+  <dgm:styleLbl name="fgShp">
+    <dgm:fillClrLst meth="repeat">
+      <a:schemeClr val="accent1">
+        <a:tint val="60000"/>
+      </a:schemeClr>
+    </dgm:fillClrLst>
+    <dgm:linClrLst meth="repeat">
+      <a:schemeClr val="lt1"/>
+    </dgm:linClrLst>
+    <dgm:effectClrLst/>
+    <dgm:txLinClrLst/>
+    <dgm:txFillClrLst meth="repeat">
+      <a:schemeClr val="dk1"/>
+    </dgm:txFillClrLst>
+    <dgm:txEffectClrLst/>
+  </dgm:styleLbl>
+  <dgm:styleLbl name="revTx">
+    <dgm:fillClrLst meth="repeat">
+      <a:schemeClr val="lt1">
+        <a:alpha val="0"/>
+      </a:schemeClr>
+    </dgm:fillClrLst>
+    <dgm:linClrLst meth="repeat">
+      <a:schemeClr val="dk1">
+        <a:alpha val="0"/>
+      </a:schemeClr>
+    </dgm:linClrLst>
+    <dgm:effectClrLst/>
+    <dgm:txLinClrLst/>
+    <dgm:txFillClrLst meth="repeat">
+      <a:schemeClr val="tx1"/>
+    </dgm:txFillClrLst>
+    <dgm:txEffectClrLst/>
+  </dgm:styleLbl>
+</dgm:colorsDef>
+</file>
+
+<file path=ppt/diagrams/data1.xml><?xml version="1.0" encoding="utf-8"?>
+<dgm:dataModel xmlns:dgm="http://schemas.openxmlformats.org/drawingml/2006/diagram" xmlns:a="http://schemas.openxmlformats.org/drawingml/2006/main">
+  <dgm:ptLst>
+    <dgm:pt modelId="{51CC4933-CF4A-4002-B801-7796356061A7}" type="doc">
+      <dgm:prSet loTypeId="urn:microsoft.com/office/officeart/2018/2/layout/IconCircleList" loCatId="icon" qsTypeId="urn:microsoft.com/office/officeart/2005/8/quickstyle/simple1" qsCatId="simple" csTypeId="urn:microsoft.com/office/officeart/2005/8/colors/accent1_2" csCatId="accent1" phldr="1"/>
+      <dgm:spPr/>
+      <dgm:t>
+        <a:bodyPr/>
+        <a:lstStyle/>
+        <a:p>
+          <a:endParaRPr lang="en-US"/>
+        </a:p>
+      </dgm:t>
+    </dgm:pt>
+    <dgm:pt modelId="{AC11749E-DFC5-4C25-89F5-8F8F8943BBEF}">
+      <dgm:prSet custT="1"/>
+      <dgm:spPr/>
+      <dgm:t>
+        <a:bodyPr/>
+        <a:lstStyle/>
+        <a:p>
+          <a:pPr>
+            <a:lnSpc>
+              <a:spcPct val="100000"/>
+            </a:lnSpc>
+          </a:pPr>
+          <a:r>
+            <a:rPr lang="en-US" sz="1400" dirty="0">
+              <a:latin typeface="Bahnschrift Light" panose="020B0502040204020203" pitchFamily="34" charset="0"/>
+            </a:rPr>
+            <a:t>Use digital color histograms to segment regions of interest in an image.</a:t>
+          </a:r>
+        </a:p>
+      </dgm:t>
+    </dgm:pt>
+    <dgm:pt modelId="{E28BA7AA-496D-4FC4-90CD-E0CC115D9517}" type="parTrans" cxnId="{254C3BFE-1CEE-428D-9EE8-611E71783EF7}">
+      <dgm:prSet/>
+      <dgm:spPr/>
+      <dgm:t>
+        <a:bodyPr/>
+        <a:lstStyle/>
+        <a:p>
+          <a:endParaRPr lang="en-US" sz="2000">
+            <a:latin typeface="Bahnschrift Light" panose="020B0502040204020203" pitchFamily="34" charset="0"/>
+          </a:endParaRPr>
+        </a:p>
+      </dgm:t>
+    </dgm:pt>
+    <dgm:pt modelId="{DD2FEAB1-5F6F-410E-9AB3-C1B602FAB8FF}" type="sibTrans" cxnId="{254C3BFE-1CEE-428D-9EE8-611E71783EF7}">
+      <dgm:prSet/>
+      <dgm:spPr/>
+      <dgm:t>
+        <a:bodyPr/>
+        <a:lstStyle/>
+        <a:p>
+          <a:pPr>
+            <a:lnSpc>
+              <a:spcPct val="100000"/>
+            </a:lnSpc>
+          </a:pPr>
+          <a:endParaRPr lang="en-US" sz="2000">
+            <a:latin typeface="Bahnschrift Light" panose="020B0502040204020203" pitchFamily="34" charset="0"/>
+          </a:endParaRPr>
+        </a:p>
+      </dgm:t>
+    </dgm:pt>
+    <dgm:pt modelId="{745D4B58-A246-4302-940E-DDE989239F1B}" type="pres">
+      <dgm:prSet presAssocID="{51CC4933-CF4A-4002-B801-7796356061A7}" presName="root" presStyleCnt="0">
+        <dgm:presLayoutVars>
+          <dgm:dir/>
+          <dgm:resizeHandles val="exact"/>
+        </dgm:presLayoutVars>
+      </dgm:prSet>
+      <dgm:spPr/>
+    </dgm:pt>
+    <dgm:pt modelId="{B329C662-D9B8-4415-A9C8-CABB02D5EE1D}" type="pres">
+      <dgm:prSet presAssocID="{51CC4933-CF4A-4002-B801-7796356061A7}" presName="container" presStyleCnt="0">
+        <dgm:presLayoutVars>
+          <dgm:dir/>
+          <dgm:resizeHandles val="exact"/>
+        </dgm:presLayoutVars>
+      </dgm:prSet>
+      <dgm:spPr/>
+    </dgm:pt>
+    <dgm:pt modelId="{FC2108D5-0690-4805-90D4-9873824CE4EC}" type="pres">
+      <dgm:prSet presAssocID="{AC11749E-DFC5-4C25-89F5-8F8F8943BBEF}" presName="compNode" presStyleCnt="0"/>
+      <dgm:spPr/>
+    </dgm:pt>
+    <dgm:pt modelId="{20123FB0-AC33-43B8-8F90-34FCF5C4BA59}" type="pres">
+      <dgm:prSet presAssocID="{AC11749E-DFC5-4C25-89F5-8F8F8943BBEF}" presName="iconBgRect" presStyleLbl="bgShp" presStyleIdx="0" presStyleCnt="1"/>
+      <dgm:spPr>
+        <a:solidFill>
+          <a:srgbClr val="467599"/>
+        </a:solidFill>
+      </dgm:spPr>
+    </dgm:pt>
+    <dgm:pt modelId="{83F23582-A5D4-46FC-AFC4-93D1C27C657F}" type="pres">
+      <dgm:prSet presAssocID="{AC11749E-DFC5-4C25-89F5-8F8F8943BBEF}" presName="iconRect" presStyleLbl="node1" presStyleIdx="0" presStyleCnt="1"/>
+      <dgm:spPr>
+        <a:blipFill>
+          <a:blip xmlns:r="http://schemas.openxmlformats.org/officeDocument/2006/relationships" r:embed="rId1">
+            <a:extLst>
+              <a:ext uri="{28A0092B-C50C-407E-A947-70E740481C1C}">
+                <a14:useLocalDpi xmlns:a14="http://schemas.microsoft.com/office/drawing/2010/main" val="0"/>
+              </a:ext>
+              <a:ext uri="{96DAC541-7B7A-43D3-8B79-37D633B846F1}">
+                <asvg:svgBlip xmlns:asvg="http://schemas.microsoft.com/office/drawing/2016/SVG/main" r:embed="rId2"/>
+              </a:ext>
+            </a:extLst>
+          </a:blip>
+          <a:stretch>
+            <a:fillRect/>
+          </a:stretch>
+        </a:blipFill>
+        <a:ln>
+          <a:noFill/>
+        </a:ln>
+      </dgm:spPr>
+      <dgm:extLst>
+        <a:ext uri="{E40237B7-FDA0-4F09-8148-C483321AD2D9}">
+          <dgm14:cNvPr xmlns:dgm14="http://schemas.microsoft.com/office/drawing/2010/diagram" id="0" name="" descr="Pencil"/>
+        </a:ext>
+      </dgm:extLst>
+    </dgm:pt>
+    <dgm:pt modelId="{DBA4E431-0CEA-4587-A5AF-604E52610392}" type="pres">
+      <dgm:prSet presAssocID="{AC11749E-DFC5-4C25-89F5-8F8F8943BBEF}" presName="spaceRect" presStyleCnt="0"/>
+      <dgm:spPr/>
+    </dgm:pt>
+    <dgm:pt modelId="{FDD5F411-AEE6-475E-9D34-E04012D9A1F7}" type="pres">
+      <dgm:prSet presAssocID="{AC11749E-DFC5-4C25-89F5-8F8F8943BBEF}" presName="textRect" presStyleLbl="revTx" presStyleIdx="0" presStyleCnt="1">
+        <dgm:presLayoutVars>
+          <dgm:chMax val="1"/>
+          <dgm:chPref val="1"/>
+        </dgm:presLayoutVars>
+      </dgm:prSet>
+      <dgm:spPr/>
+    </dgm:pt>
+  </dgm:ptLst>
+  <dgm:cxnLst>
+    <dgm:cxn modelId="{2C967C8F-38E7-4664-9492-9F68BAEF9A17}" type="presOf" srcId="{51CC4933-CF4A-4002-B801-7796356061A7}" destId="{745D4B58-A246-4302-940E-DDE989239F1B}" srcOrd="0" destOrd="0" presId="urn:microsoft.com/office/officeart/2018/2/layout/IconCircleList"/>
+    <dgm:cxn modelId="{C0B0369C-1EAC-4640-99F0-9CAA5EB9FE64}" type="presOf" srcId="{AC11749E-DFC5-4C25-89F5-8F8F8943BBEF}" destId="{FDD5F411-AEE6-475E-9D34-E04012D9A1F7}" srcOrd="0" destOrd="0" presId="urn:microsoft.com/office/officeart/2018/2/layout/IconCircleList"/>
+    <dgm:cxn modelId="{254C3BFE-1CEE-428D-9EE8-611E71783EF7}" srcId="{51CC4933-CF4A-4002-B801-7796356061A7}" destId="{AC11749E-DFC5-4C25-89F5-8F8F8943BBEF}" srcOrd="0" destOrd="0" parTransId="{E28BA7AA-496D-4FC4-90CD-E0CC115D9517}" sibTransId="{DD2FEAB1-5F6F-410E-9AB3-C1B602FAB8FF}"/>
+    <dgm:cxn modelId="{1AD8700B-9DB1-4304-B71F-8335460A6987}" type="presParOf" srcId="{745D4B58-A246-4302-940E-DDE989239F1B}" destId="{B329C662-D9B8-4415-A9C8-CABB02D5EE1D}" srcOrd="0" destOrd="0" presId="urn:microsoft.com/office/officeart/2018/2/layout/IconCircleList"/>
+    <dgm:cxn modelId="{54621141-F2C6-4153-A0E0-09098E07A57A}" type="presParOf" srcId="{B329C662-D9B8-4415-A9C8-CABB02D5EE1D}" destId="{FC2108D5-0690-4805-90D4-9873824CE4EC}" srcOrd="0" destOrd="0" presId="urn:microsoft.com/office/officeart/2018/2/layout/IconCircleList"/>
+    <dgm:cxn modelId="{D2CEF47F-1ED2-4CF1-8128-6D60071039C1}" type="presParOf" srcId="{FC2108D5-0690-4805-90D4-9873824CE4EC}" destId="{20123FB0-AC33-43B8-8F90-34FCF5C4BA59}" srcOrd="0" destOrd="0" presId="urn:microsoft.com/office/officeart/2018/2/layout/IconCircleList"/>
+    <dgm:cxn modelId="{FC4A5AA1-7FA7-4658-94FF-98F252756ED4}" type="presParOf" srcId="{FC2108D5-0690-4805-90D4-9873824CE4EC}" destId="{83F23582-A5D4-46FC-AFC4-93D1C27C657F}" srcOrd="1" destOrd="0" presId="urn:microsoft.com/office/officeart/2018/2/layout/IconCircleList"/>
+    <dgm:cxn modelId="{9B723E9A-3A43-46FF-8544-7CD6F19A01EB}" type="presParOf" srcId="{FC2108D5-0690-4805-90D4-9873824CE4EC}" destId="{DBA4E431-0CEA-4587-A5AF-604E52610392}" srcOrd="2" destOrd="0" presId="urn:microsoft.com/office/officeart/2018/2/layout/IconCircleList"/>
+    <dgm:cxn modelId="{9ED8437D-6BCC-444B-9373-E22B52D55329}" type="presParOf" srcId="{FC2108D5-0690-4805-90D4-9873824CE4EC}" destId="{FDD5F411-AEE6-475E-9D34-E04012D9A1F7}" srcOrd="3" destOrd="0" presId="urn:microsoft.com/office/officeart/2018/2/layout/IconCircleList"/>
+  </dgm:cxnLst>
+  <dgm:bg/>
+  <dgm:whole/>
+  <dgm:extLst>
+    <a:ext uri="http://schemas.microsoft.com/office/drawing/2008/diagram">
+      <dsp:dataModelExt xmlns:dsp="http://schemas.microsoft.com/office/drawing/2008/diagram" relId="rId6" minVer="http://schemas.openxmlformats.org/drawingml/2006/diagram"/>
+    </a:ext>
+  </dgm:extLst>
+</dgm:dataModel>
+</file>
+
+<file path=ppt/diagrams/drawing1.xml><?xml version="1.0" encoding="utf-8"?>
+<dsp:drawing xmlns:dgm="http://schemas.openxmlformats.org/drawingml/2006/diagram" xmlns:dsp="http://schemas.microsoft.com/office/drawing/2008/diagram" xmlns:a="http://schemas.openxmlformats.org/drawingml/2006/main">
+  <dsp:spTree>
+    <dsp:nvGrpSpPr>
+      <dsp:cNvPr id="0" name=""/>
+      <dsp:cNvGrpSpPr/>
+    </dsp:nvGrpSpPr>
+    <dsp:grpSpPr/>
+    <dsp:sp modelId="{20123FB0-AC33-43B8-8F90-34FCF5C4BA59}">
+      <dsp:nvSpPr>
+        <dsp:cNvPr id="0" name=""/>
+        <dsp:cNvSpPr/>
+      </dsp:nvSpPr>
+      <dsp:spPr>
+        <a:xfrm>
+          <a:off x="2580441" y="663232"/>
+          <a:ext cx="811235" cy="811235"/>
+        </a:xfrm>
+        <a:prstGeom prst="ellipse">
+          <a:avLst/>
+        </a:prstGeom>
+        <a:solidFill>
+          <a:srgbClr val="467599"/>
+        </a:solidFill>
+        <a:ln>
+          <a:noFill/>
+        </a:ln>
+        <a:effectLst/>
+      </dsp:spPr>
+      <dsp:style>
+        <a:lnRef idx="0">
+          <a:scrgbClr r="0" g="0" b="0"/>
+        </a:lnRef>
+        <a:fillRef idx="1">
+          <a:scrgbClr r="0" g="0" b="0"/>
+        </a:fillRef>
+        <a:effectRef idx="0">
+          <a:scrgbClr r="0" g="0" b="0"/>
+        </a:effectRef>
+        <a:fontRef idx="minor"/>
+      </dsp:style>
+    </dsp:sp>
+    <dsp:sp modelId="{83F23582-A5D4-46FC-AFC4-93D1C27C657F}">
+      <dsp:nvSpPr>
+        <dsp:cNvPr id="0" name=""/>
+        <dsp:cNvSpPr/>
+      </dsp:nvSpPr>
+      <dsp:spPr>
+        <a:xfrm>
+          <a:off x="2750800" y="833592"/>
+          <a:ext cx="470516" cy="470516"/>
+        </a:xfrm>
+        <a:prstGeom prst="rect">
+          <a:avLst/>
+        </a:prstGeom>
+        <a:blipFill>
+          <a:blip xmlns:r="http://schemas.openxmlformats.org/officeDocument/2006/relationships" r:embed="rId1">
+            <a:extLst>
+              <a:ext uri="{28A0092B-C50C-407E-A947-70E740481C1C}">
+                <a14:useLocalDpi xmlns:a14="http://schemas.microsoft.com/office/drawing/2010/main" val="0"/>
+              </a:ext>
+              <a:ext uri="{96DAC541-7B7A-43D3-8B79-37D633B846F1}">
+                <asvg:svgBlip xmlns:asvg="http://schemas.microsoft.com/office/drawing/2016/SVG/main" r:embed="rId2"/>
+              </a:ext>
+            </a:extLst>
+          </a:blip>
+          <a:stretch>
+            <a:fillRect/>
+          </a:stretch>
+        </a:blipFill>
+        <a:ln w="12700" cap="flat" cmpd="sng" algn="ctr">
+          <a:noFill/>
+          <a:prstDash val="solid"/>
+          <a:miter lim="800000"/>
+        </a:ln>
+        <a:effectLst/>
+      </dsp:spPr>
+      <dsp:style>
+        <a:lnRef idx="2">
+          <a:scrgbClr r="0" g="0" b="0"/>
+        </a:lnRef>
+        <a:fillRef idx="1">
+          <a:scrgbClr r="0" g="0" b="0"/>
+        </a:fillRef>
+        <a:effectRef idx="0">
+          <a:scrgbClr r="0" g="0" b="0"/>
+        </a:effectRef>
+        <a:fontRef idx="minor">
+          <a:schemeClr val="lt1"/>
+        </a:fontRef>
+      </dsp:style>
+    </dsp:sp>
+    <dsp:sp modelId="{FDD5F411-AEE6-475E-9D34-E04012D9A1F7}">
+      <dsp:nvSpPr>
+        <dsp:cNvPr id="0" name=""/>
+        <dsp:cNvSpPr/>
+      </dsp:nvSpPr>
+      <dsp:spPr>
+        <a:xfrm>
+          <a:off x="3565512" y="663232"/>
+          <a:ext cx="1912197" cy="811235"/>
+        </a:xfrm>
+        <a:prstGeom prst="rect">
+          <a:avLst/>
+        </a:prstGeom>
+        <a:noFill/>
+        <a:ln>
+          <a:noFill/>
+        </a:ln>
+        <a:effectLst/>
+      </dsp:spPr>
+      <dsp:style>
+        <a:lnRef idx="0">
+          <a:scrgbClr r="0" g="0" b="0"/>
+        </a:lnRef>
+        <a:fillRef idx="0">
+          <a:scrgbClr r="0" g="0" b="0"/>
+        </a:fillRef>
+        <a:effectRef idx="0">
+          <a:scrgbClr r="0" g="0" b="0"/>
+        </a:effectRef>
+        <a:fontRef idx="minor"/>
+      </dsp:style>
+      <dsp:txBody>
+        <a:bodyPr spcFirstLastPara="0" vert="horz" wrap="square" lIns="0" tIns="0" rIns="0" bIns="0" numCol="1" spcCol="1270" anchor="ctr" anchorCtr="0">
+          <a:noAutofit/>
+        </a:bodyPr>
+        <a:lstStyle/>
+        <a:p>
+          <a:pPr marL="0" lvl="0" indent="0" algn="l" defTabSz="622300">
+            <a:lnSpc>
+              <a:spcPct val="100000"/>
+            </a:lnSpc>
+            <a:spcBef>
+              <a:spcPct val="0"/>
+            </a:spcBef>
+            <a:spcAft>
+              <a:spcPct val="35000"/>
+            </a:spcAft>
+            <a:buNone/>
+          </a:pPr>
+          <a:r>
+            <a:rPr lang="en-US" sz="1400" kern="1200" dirty="0">
+              <a:latin typeface="Bahnschrift Light" panose="020B0502040204020203" pitchFamily="34" charset="0"/>
+            </a:rPr>
+            <a:t>Use digital color histograms to segment regions of interest in an image.</a:t>
+          </a:r>
+        </a:p>
+      </dsp:txBody>
+      <dsp:txXfrm>
+        <a:off x="3565512" y="663232"/>
+        <a:ext cx="1912197" cy="811235"/>
+      </dsp:txXfrm>
+    </dsp:sp>
+  </dsp:spTree>
+</dsp:drawing>
+</file>
+
+<file path=ppt/diagrams/layout1.xml><?xml version="1.0" encoding="utf-8"?>
+<dgm:layoutDef xmlns:dgm="http://schemas.openxmlformats.org/drawingml/2006/diagram" xmlns:a="http://schemas.openxmlformats.org/drawingml/2006/main" uniqueId="urn:microsoft.com/office/officeart/2018/2/layout/IconCircleList">
+  <dgm:title val="Icon Circle List"/>
+  <dgm:desc val="Use to show non-sequential or grouped chunks of information accompanied by related visuals. Circular shapes can hold an icon or small picture and corresponding text box shows Level 1 text. Works best for icons or small pictures with medium-length descriptions."/>
+  <dgm:catLst>
+    <dgm:cat type="icon" pri="500"/>
+  </dgm:catLst>
+  <dgm:sampData useDef="1">
+    <dgm:dataModel>
+      <dgm:ptLst/>
+      <dgm:bg/>
+      <dgm:whole/>
+    </dgm:dataModel>
+  </dgm:sampData>
+  <dgm:styleData useDef="1">
+    <dgm:dataModel>
+      <dgm:ptLst/>
+      <dgm:bg/>
+      <dgm:whole/>
+    </dgm:dataModel>
+  </dgm:styleData>
+  <dgm:clrData useDef="1">
+    <dgm:dataModel>
+      <dgm:ptLst/>
+      <dgm:bg/>
+      <dgm:whole/>
+    </dgm:dataModel>
+  </dgm:clrData>
+  <dgm:layoutNode name="root">
+    <dgm:varLst>
+      <dgm:dir/>
+      <dgm:resizeHandles val="exact"/>
+    </dgm:varLst>
+    <dgm:alg type="sp"/>
+    <dgm:shape xmlns:r="http://schemas.openxmlformats.org/officeDocument/2006/relationships" r:blip="">
+      <dgm:adjLst/>
+    </dgm:shape>
+    <dgm:presOf/>
+    <dgm:choose name="Name0">
+      <dgm:if name="Name1" axis="ch" ptType="node" func="cnt" op="lte" val="3">
+        <dgm:constrLst>
+          <dgm:constr type="w" for="ch" forName="container" refType="w"/>
+          <dgm:constr type="h" for="ch" forName="container" refType="h" fact="0.4"/>
+        </dgm:constrLst>
+      </dgm:if>
+      <dgm:else name="Name2">
+        <dgm:constrLst>
+          <dgm:constr type="w" for="ch" forName="container" refType="w"/>
+          <dgm:constr type="h" for="ch" forName="container" refType="h"/>
+        </dgm:constrLst>
+      </dgm:else>
+    </dgm:choose>
+    <dgm:ruleLst>
+      <dgm:rule type="h" for="ch" forName="container" val="INF" fact="NaN" max="NaN"/>
+    </dgm:ruleLst>
+    <dgm:layoutNode name="container">
+      <dgm:varLst>
+        <dgm:dir/>
+        <dgm:resizeHandles val="exact"/>
+      </dgm:varLst>
+      <dgm:choose name="Name3">
+        <dgm:if name="Name4" axis="self" func="var" arg="dir" op="equ" val="norm">
+          <dgm:alg type="snake">
+            <dgm:param type="grDir" val="tL"/>
+            <dgm:param type="flowDir" val="row"/>
+            <dgm:param type="contDir" val="sameDir"/>
+          </dgm:alg>
+        </dgm:if>
+        <dgm:else name="Name5">
+          <dgm:alg type="snake">
+            <dgm:param type="grDir" val="tR"/>
+            <dgm:param type="flowDir" val="row"/>
+            <dgm:param type="contDir" val="sameDir"/>
+          </dgm:alg>
+        </dgm:else>
+      </dgm:choose>
+      <dgm:shape xmlns:r="http://schemas.openxmlformats.org/officeDocument/2006/relationships" r:blip="">
+        <dgm:adjLst/>
+      </dgm:shape>
+      <dgm:presOf/>
+      <dgm:constrLst>
+        <dgm:constr type="w" for="ch" forName="compNode" refType="w"/>
+        <dgm:constr type="h" for="ch" forName="compNode" refType="w" fact="0.28"/>
+        <dgm:constr type="w" for="ch" forName="sibTrans" refType="w" refFor="ch" refForName="compNode" fact="0.115"/>
+        <dgm:constr type="sp" refType="h" op="equ" fact="0.17"/>
+        <dgm:constr type="primFontSz" for="des" ptType="node" op="equ" val="24"/>
+        <dgm:constr type="h" for="des" forName="compNode" op="equ"/>
+        <dgm:constr type="h" for="des" forName="iconBgRect" op="equ"/>
+      </dgm:constrLst>
+      <dgm:ruleLst>
+        <dgm:rule type="w" for="ch" forName="compNode" val="60" fact="NaN" max="NaN"/>
+      </dgm:ruleLst>
+      <dgm:forEach name="Name6" axis="ch" ptType="node">
+        <dgm:layoutNode name="compNode">
+          <dgm:alg type="composite"/>
+          <dgm:shape xmlns:r="http://schemas.openxmlformats.org/officeDocument/2006/relationships" r:blip="">
+            <dgm:adjLst/>
+          </dgm:shape>
+          <dgm:presOf axis="self"/>
+          <dgm:constrLst>
+            <dgm:constr type="w" for="ch" forName="iconBgRect" refType="w" fact="0.28"/>
+            <dgm:constr type="h" for="ch" forName="iconBgRect" refType="w" refFor="ch" refForName="iconBgRect"/>
+            <dgm:constr type="t" for="ch" forName="iconBgRect"/>
+            <dgm:constr type="l" for="ch" forName="iconBgRect"/>
+            <dgm:constr type="w" for="ch" forName="iconRect" refType="w" refFor="ch" refForName="iconBgRect" fact="0.58"/>
+            <dgm:constr type="h" for="ch" forName="iconRect" refType="w" refFor="ch" refForName="iconRect"/>
+            <dgm:constr type="ctrX" for="ch" forName="iconRect" refType="ctrX" refFor="ch" refForName="iconBgRect"/>
+            <dgm:constr type="ctrY" for="ch" forName="iconRect" refType="ctrY" refFor="ch" refForName="iconBgRect"/>
+            <dgm:constr type="w" for="ch" forName="spaceRect" refType="w" fact="0.06"/>
+            <dgm:constr type="h" for="ch" forName="spaceRect" refType="h" refFor="ch" refForName="iconBgRect"/>
+            <dgm:constr type="t" for="ch" forName="spaceRect" refType="t" refFor="ch" refForName="iconBgRect"/>
+            <dgm:constr type="l" for="ch" forName="spaceRect" refType="r" refFor="ch" refForName="iconBgRect"/>
+            <dgm:constr type="h" for="ch" forName="textRect" refType="h" refFor="ch" refForName="iconBgRect"/>
+            <dgm:constr type="t" for="ch" forName="textRect" refType="t" refFor="ch" refForName="iconBgRect"/>
+            <dgm:constr type="l" for="ch" forName="textRect" refType="r" refFor="ch" refForName="spaceRect"/>
+          </dgm:constrLst>
+          <dgm:ruleLst/>
+          <dgm:layoutNode name="iconBgRect" styleLbl="bgShp">
+            <dgm:alg type="sp"/>
+            <dgm:shape xmlns:r="http://schemas.openxmlformats.org/officeDocument/2006/relationships" type="ellipse" r:blip="">
+              <dgm:adjLst/>
+            </dgm:shape>
+            <dgm:presOf/>
+            <dgm:constrLst/>
+            <dgm:ruleLst/>
+          </dgm:layoutNode>
+          <dgm:layoutNode name="iconRect" styleLbl="node1">
+            <dgm:alg type="sp"/>
+            <dgm:shape xmlns:r="http://schemas.openxmlformats.org/officeDocument/2006/relationships" type="rect" r:blip="" blipPhldr="1">
+              <dgm:adjLst/>
+            </dgm:shape>
+            <dgm:presOf/>
+            <dgm:constrLst/>
+            <dgm:ruleLst/>
+          </dgm:layoutNode>
+          <dgm:layoutNode name="spaceRect">
+            <dgm:alg type="sp"/>
+            <dgm:shape xmlns:r="http://schemas.openxmlformats.org/officeDocument/2006/relationships" r:blip="">
+              <dgm:adjLst/>
+            </dgm:shape>
+            <dgm:presOf/>
+            <dgm:constrLst/>
+            <dgm:ruleLst/>
+          </dgm:layoutNode>
+          <dgm:layoutNode name="textRect" styleLbl="revTx">
+            <dgm:varLst>
+              <dgm:chMax val="1"/>
+              <dgm:chPref val="1"/>
+            </dgm:varLst>
+            <dgm:choose name="Name7">
+              <dgm:if name="Name8" func="var" arg="dir" op="equ" val="norm">
+                <dgm:alg type="tx">
+                  <dgm:param type="txAnchorVert" val="mid"/>
+                  <dgm:param type="parTxLTRAlign" val="l"/>
+                  <dgm:param type="shpTxLTRAlignCh" val="l"/>
+                  <dgm:param type="parTxRTLAlign" val="l"/>
+                  <dgm:param type="shpTxRTLAlignCh" val="l"/>
+                </dgm:alg>
+              </dgm:if>
+              <dgm:else name="Name9">
+                <dgm:alg type="tx">
+                  <dgm:param type="txAnchorVert" val="mid"/>
+                  <dgm:param type="parTxLTRAlign" val="r"/>
+                  <dgm:param type="shpTxLTRAlignCh" val="r"/>
+                  <dgm:param type="parTxRTLAlign" val="r"/>
+                  <dgm:param type="shpTxRTLAlignCh" val="r"/>
+                </dgm:alg>
+              </dgm:else>
+            </dgm:choose>
+            <dgm:shape xmlns:r="http://schemas.openxmlformats.org/officeDocument/2006/relationships" type="rect" r:blip="">
+              <dgm:adjLst/>
+            </dgm:shape>
+            <dgm:presOf axis="self" ptType="node"/>
+            <dgm:constrLst>
+              <dgm:constr type="lMarg"/>
+              <dgm:constr type="rMarg"/>
+              <dgm:constr type="tMarg"/>
+              <dgm:constr type="bMarg"/>
+            </dgm:constrLst>
+            <dgm:ruleLst>
+              <dgm:rule type="primFontSz" val="11" fact="NaN" max="NaN"/>
+            </dgm:ruleLst>
+          </dgm:layoutNode>
+        </dgm:layoutNode>
+        <dgm:forEach name="Name10" axis="followSib" ptType="sibTrans" cnt="1">
+          <dgm:layoutNode name="sibTrans">
+            <dgm:alg type="sp"/>
+            <dgm:shape xmlns:r="http://schemas.openxmlformats.org/officeDocument/2006/relationships" type="rect" r:blip="" hideGeom="1">
+              <dgm:adjLst/>
+            </dgm:shape>
+            <dgm:presOf axis="self"/>
+            <dgm:constrLst/>
+            <dgm:ruleLst/>
+          </dgm:layoutNode>
+        </dgm:forEach>
+      </dgm:forEach>
+    </dgm:layoutNode>
+  </dgm:layoutNode>
+  <dgm:extLst>
+    <a:ext uri="{68A01E43-0DF5-4B5B-8FA6-DAF915123BFB}">
+      <dgm1612:lstStyle xmlns:dgm1612="http://schemas.microsoft.com/office/drawing/2016/12/diagram">
+        <a:lvl1pPr>
+          <a:lnSpc>
+            <a:spcPct val="100000"/>
+          </a:lnSpc>
+        </a:lvl1pPr>
+      </dgm1612:lstStyle>
+    </a:ext>
+  </dgm:extLst>
+</dgm:layoutDef>
+</file>
+
+<file path=ppt/diagrams/quickStyle1.xml><?xml version="1.0" encoding="utf-8"?>
+<dgm:styleDef xmlns:dgm="http://schemas.openxmlformats.org/drawingml/2006/diagram" xmlns:a="http://schemas.openxmlformats.org/drawingml/2006/main" uniqueId="urn:microsoft.com/office/officeart/2005/8/quickstyle/simple1">
+  <dgm:title val=""/>
+  <dgm:desc val=""/>
+  <dgm:catLst>
+    <dgm:cat type="simple" pri="10100"/>
+  </dgm:catLst>
+  <dgm:scene3d>
+    <a:camera prst="orthographicFront"/>
+    <a:lightRig rig="threePt" dir="t"/>
+  </dgm:scene3d>
+  <dgm:styleLbl name="node0">
+    <dgm:scene3d>
+      <a:camera prst="orthographicFront"/>
+      <a:lightRig rig="threePt" dir="t"/>
+    </dgm:scene3d>
+    <dgm:sp3d/>
+    <dgm:txPr/>
+    <dgm:style>
+      <a:lnRef idx="2">
+        <a:scrgbClr r="0" g="0" b="0"/>
+      </a:lnRef>
+      <a:fillRef idx="1">
+        <a:scrgbClr r="0" g="0" b="0"/>
+      </a:fillRef>
+      <a:effectRef idx="0">
+        <a:scrgbClr r="0" g="0" b="0"/>
+      </a:effectRef>
+      <a:fontRef idx="minor">
+        <a:schemeClr val="lt1"/>
+      </a:fontRef>
+    </dgm:style>
+  </dgm:styleLbl>
+  <dgm:styleLbl name="lnNode1">
+    <dgm:scene3d>
+      <a:camera prst="orthographicFront"/>
+      <a:lightRig rig="threePt" dir="t"/>
+    </dgm:scene3d>
+    <dgm:sp3d/>
+    <dgm:txPr/>
+    <dgm:style>
+      <a:lnRef idx="2">
+        <a:scrgbClr r="0" g="0" b="0"/>
+      </a:lnRef>
+      <a:fillRef idx="1">
+        <a:scrgbClr r="0" g="0" b="0"/>
+      </a:fillRef>
+      <a:effectRef idx="0">
+        <a:scrgbClr r="0" g="0" b="0"/>
+      </a:effectRef>
+      <a:fontRef idx="minor">
+        <a:schemeClr val="lt1"/>
+      </a:fontRef>
+    </dgm:style>
+  </dgm:styleLbl>
+  <dgm:styleLbl name="vennNode1">
+    <dgm:scene3d>
+      <a:camera prst="orthographicFront"/>
+      <a:lightRig rig="threePt" dir="t"/>
+    </dgm:scene3d>
+    <dgm:sp3d/>
+    <dgm:txPr/>
+    <dgm:style>
+      <a:lnRef idx="2">
+        <a:scrgbClr r="0" g="0" b="0"/>
+      </a:lnRef>
+      <a:fillRef idx="1">
+        <a:scrgbClr r="0" g="0" b="0"/>
+      </a:fillRef>
+      <a:effectRef idx="0">
+        <a:scrgbClr r="0" g="0" b="0"/>
+      </a:effectRef>
+      <a:fontRef idx="minor">
+        <a:schemeClr val="tx1"/>
+      </a:fontRef>
+    </dgm:style>
+  </dgm:styleLbl>
+  <dgm:styleLbl name="alignNode1">
+    <dgm:scene3d>
+      <a:camera prst="orthographicFront"/>
+      <a:lightRig rig="threePt" dir="t"/>
+    </dgm:scene3d>
+    <dgm:sp3d/>
+    <dgm:txPr/>
+    <dgm:style>
+      <a:lnRef idx="2">
+        <a:scrgbClr r="0" g="0" b="0"/>
+      </a:lnRef>
+      <a:fillRef idx="1">
+        <a:scrgbClr r="0" g="0" b="0"/>
+      </a:fillRef>
+      <a:effectRef idx="0">
+        <a:scrgbClr r="0" g="0" b="0"/>
+      </a:effectRef>
+      <a:fontRef idx="minor">
+        <a:schemeClr val="lt1"/>
+      </a:fontRef>
+    </dgm:style>
+  </dgm:styleLbl>
+  <dgm:styleLbl name="node1">
+    <dgm:scene3d>
+      <a:camera prst="orthographicFront"/>
+      <a:lightRig rig="threePt" dir="t"/>
+    </dgm:scene3d>
+    <dgm:sp3d/>
+    <dgm:txPr/>
+    <dgm:style>
+      <a:lnRef idx="2">
+        <a:scrgbClr r="0" g="0" b="0"/>
+      </a:lnRef>
+      <a:fillRef idx="1">
+        <a:scrgbClr r="0" g="0" b="0"/>
+      </a:fillRef>
+      <a:effectRef idx="0">
+        <a:scrgbClr r="0" g="0" b="0"/>
+      </a:effectRef>
+      <a:fontRef idx="minor">
+        <a:schemeClr val="lt1"/>
+      </a:fontRef>
+    </dgm:style>
+  </dgm:styleLbl>
+  <dgm:styleLbl name="node2">
+    <dgm:scene3d>
+      <a:camera prst="orthographicFront"/>
+      <a:lightRig rig="threePt" dir="t"/>
+    </dgm:scene3d>
+    <dgm:sp3d/>
+    <dgm:txPr/>
+    <dgm:style>
+      <a:lnRef idx="2">
+        <a:scrgbClr r="0" g="0" b="0"/>
+      </a:lnRef>
+      <a:fillRef idx="1">
+        <a:scrgbClr r="0" g="0" b="0"/>
+      </a:fillRef>
+      <a:effectRef idx="0">
+        <a:scrgbClr r="0" g="0" b="0"/>
+      </a:effectRef>
+      <a:fontRef idx="minor">
+        <a:schemeClr val="lt1"/>
+      </a:fontRef>
+    </dgm:style>
+  </dgm:styleLbl>
+  <dgm:styleLbl name="node3">
+    <dgm:scene3d>
+      <a:camera prst="orthographicFront"/>
+      <a:lightRig rig="threePt" dir="t"/>
+    </dgm:scene3d>
+    <dgm:sp3d/>
+    <dgm:txPr/>
+    <dgm:style>
+      <a:lnRef idx="2">
+        <a:scrgbClr r="0" g="0" b="0"/>
+      </a:lnRef>
+      <a:fillRef idx="1">
+        <a:scrgbClr r="0" g="0" b="0"/>
+      </a:fillRef>
+      <a:effectRef idx="0">
+        <a:scrgbClr r="0" g="0" b="0"/>
+      </a:effectRef>
+      <a:fontRef idx="minor">
+        <a:schemeClr val="lt1"/>
+      </a:fontRef>
+    </dgm:style>
+  </dgm:styleLbl>
+  <dgm:styleLbl name="node4">
+    <dgm:scene3d>
+      <a:camera prst="orthographicFront"/>
+      <a:lightRig rig="threePt" dir="t"/>
+    </dgm:scene3d>
+    <dgm:sp3d/>
+    <dgm:txPr/>
+    <dgm:style>
+      <a:lnRef idx="2">
+        <a:scrgbClr r="0" g="0" b="0"/>
+      </a:lnRef>
+      <a:fillRef idx="1">
+        <a:scrgbClr r="0" g="0" b="0"/>
+      </a:fillRef>
+      <a:effectRef idx="0">
+        <a:scrgbClr r="0" g="0" b="0"/>
+      </a:effectRef>
+      <a:fontRef idx="minor">
+        <a:schemeClr val="lt1"/>
+      </a:fontRef>
+    </dgm:style>
+  </dgm:styleLbl>
+  <dgm:styleLbl name="fgImgPlace1">
+    <dgm:scene3d>
+      <a:camera prst="orthographicFront"/>
+      <a:lightRig rig="threePt" dir="t"/>
+    </dgm:scene3d>
+    <dgm:sp3d/>
+    <dgm:txPr/>
+    <dgm:style>
+      <a:lnRef idx="2">
+        <a:scrgbClr r="0" g="0" b="0"/>
+      </a:lnRef>
+      <a:fillRef idx="1">
+        <a:scrgbClr r="0" g="0" b="0"/>
+      </a:fillRef>
+      <a:effectRef idx="0">
+        <a:scrgbClr r="0" g="0" b="0"/>
+      </a:effectRef>
+      <a:fontRef idx="minor"/>
+    </dgm:style>
+  </dgm:styleLbl>
+  <dgm:styleLbl name="alignImgPlace1">
+    <dgm:scene3d>
+      <a:camera prst="orthographicFront"/>
+      <a:lightRig rig="threePt" dir="t"/>
+    </dgm:scene3d>
+    <dgm:sp3d/>
+    <dgm:txPr/>
+    <dgm:style>
+      <a:lnRef idx="2">
+        <a:scrgbClr r="0" g="0" b="0"/>
+      </a:lnRef>
+      <a:fillRef idx="1">
+        <a:scrgbClr r="0" g="0" b="0"/>
+      </a:fillRef>
+      <a:effectRef idx="0">
+        <a:scrgbClr r="0" g="0" b="0"/>
+      </a:effectRef>
+      <a:fontRef idx="minor"/>
+    </dgm:style>
+  </dgm:styleLbl>
+  <dgm:styleLbl name="bgImgPlace1">
+    <dgm:scene3d>
+      <a:camera prst="orthographicFront"/>
+      <a:lightRig rig="threePt" dir="t"/>
+    </dgm:scene3d>
+    <dgm:sp3d/>
+    <dgm:txPr/>
+    <dgm:style>
+      <a:lnRef idx="2">
+        <a:scrgbClr r="0" g="0" b="0"/>
+      </a:lnRef>
+      <a:fillRef idx="1">
+        <a:scrgbClr r="0" g="0" b="0"/>
+      </a:fillRef>
+      <a:effectRef idx="0">
+        <a:scrgbClr r="0" g="0" b="0"/>
+      </a:effectRef>
+      <a:fontRef idx="minor"/>
+    </dgm:style>
+  </dgm:styleLbl>
+  <dgm:styleLbl name="sibTrans2D1">
+    <dgm:scene3d>
+      <a:camera prst="orthographicFront"/>
+      <a:lightRig rig="threePt" dir="t"/>
+    </dgm:scene3d>
+    <dgm:sp3d/>
+    <dgm:txPr/>
+    <dgm:style>
+      <a:lnRef idx="0">
+        <a:scrgbClr r="0" g="0" b="0"/>
+      </a:lnRef>
+      <a:fillRef idx="1">
+        <a:scrgbClr r="0" g="0" b="0"/>
+      </a:fillRef>
+      <a:effectRef idx="0">
+        <a:scrgbClr r="0" g="0" b="0"/>
+      </a:effectRef>
+      <a:fontRef idx="minor">
+        <a:schemeClr val="lt1"/>
+      </a:fontRef>
+    </dgm:style>
+  </dgm:styleLbl>
+  <dgm:styleLbl name="fgSibTrans2D1">
+    <dgm:scene3d>
+      <a:camera prst="orthographicFront"/>
+      <a:lightRig rig="threePt" dir="t"/>
+    </dgm:scene3d>
+    <dgm:sp3d/>
+    <dgm:txPr/>
+    <dgm:style>
+      <a:lnRef idx="0">
+        <a:scrgbClr r="0" g="0" b="0"/>
+      </a:lnRef>
+      <a:fillRef idx="1">
+        <a:scrgbClr r="0" g="0" b="0"/>
+      </a:fillRef>
+      <a:effectRef idx="0">
+        <a:scrgbClr r="0" g="0" b="0"/>
+      </a:effectRef>
+      <a:fontRef idx="minor">
+        <a:schemeClr val="lt1"/>
+      </a:fontRef>
+    </dgm:style>
+  </dgm:styleLbl>
+  <dgm:styleLbl name="bgSibTrans2D1">
+    <dgm:scene3d>
+      <a:camera prst="orthographicFront"/>
+      <a:lightRig rig="threePt" dir="t"/>
+    </dgm:scene3d>
+    <dgm:sp3d/>
+    <dgm:txPr/>
+    <dgm:style>
+      <a:lnRef idx="0">
+        <a:scrgbClr r="0" g="0" b="0"/>
+      </a:lnRef>
+      <a:fillRef idx="1">
+        <a:scrgbClr r="0" g="0" b="0"/>
+      </a:fillRef>
+      <a:effectRef idx="0">
+        <a:scrgbClr r="0" g="0" b="0"/>
+      </a:effectRef>
+      <a:fontRef idx="minor">
+        <a:schemeClr val="lt1"/>
+      </a:fontRef>
+    </dgm:style>
+  </dgm:styleLbl>
+  <dgm:styleLbl name="sibTrans1D1">
+    <dgm:scene3d>
+      <a:camera prst="orthographicFront"/>
+      <a:lightRig rig="threePt" dir="t"/>
+    </dgm:scene3d>
+    <dgm:sp3d/>
+    <dgm:txPr/>
+    <dgm:style>
+      <a:lnRef idx="1">
+        <a:scrgbClr r="0" g="0" b="0"/>
+      </a:lnRef>
+      <a:fillRef idx="0">
+        <a:scrgbClr r="0" g="0" b="0"/>
+      </a:fillRef>
+      <a:effectRef idx="0">
+        <a:scrgbClr r="0" g="0" b="0"/>
+      </a:effectRef>
+      <a:fontRef idx="minor"/>
+    </dgm:style>
+  </dgm:styleLbl>
+  <dgm:styleLbl name="callout">
+    <dgm:scene3d>
+      <a:camera prst="orthographicFront"/>
+      <a:lightRig rig="threePt" dir="t"/>
+    </dgm:scene3d>
+    <dgm:sp3d/>
+    <dgm:txPr/>
+    <dgm:style>
+      <a:lnRef idx="2">
+        <a:scrgbClr r="0" g="0" b="0"/>
+      </a:lnRef>
+      <a:fillRef idx="1">
+        <a:scrgbClr r="0" g="0" b="0"/>
+      </a:fillRef>
+      <a:effectRef idx="0">
+        <a:scrgbClr r="0" g="0" b="0"/>
+      </a:effectRef>
+      <a:fontRef idx="minor"/>
+    </dgm:style>
+  </dgm:styleLbl>
+  <dgm:styleLbl name="asst0">
+    <dgm:scene3d>
+      <a:camera prst="orthographicFront"/>
+      <a:lightRig rig="threePt" dir="t"/>
+    </dgm:scene3d>
+    <dgm:sp3d/>
+    <dgm:txPr/>
+    <dgm:style>
+      <a:lnRef idx="2">
+        <a:scrgbClr r="0" g="0" b="0"/>
+      </a:lnRef>
+      <a:fillRef idx="1">
+        <a:scrgbClr r="0" g="0" b="0"/>
+      </a:fillRef>
+      <a:effectRef idx="0">
+        <a:scrgbClr r="0" g="0" b="0"/>
+      </a:effectRef>
+      <a:fontRef idx="minor">
+        <a:schemeClr val="lt1"/>
+      </a:fontRef>
+    </dgm:style>
+  </dgm:styleLbl>
+  <dgm:styleLbl name="asst1">
+    <dgm:scene3d>
+      <a:camera prst="orthographicFront"/>
+      <a:lightRig rig="threePt" dir="t"/>
+    </dgm:scene3d>
+    <dgm:sp3d/>
+    <dgm:txPr/>
+    <dgm:style>
+      <a:lnRef idx="2">
+        <a:scrgbClr r="0" g="0" b="0"/>
+      </a:lnRef>
+      <a:fillRef idx="1">
+        <a:scrgbClr r="0" g="0" b="0"/>
+      </a:fillRef>
+      <a:effectRef idx="0">
+        <a:scrgbClr r="0" g="0" b="0"/>
+      </a:effectRef>
+      <a:fontRef idx="minor">
+        <a:schemeClr val="lt1"/>
+      </a:fontRef>
+    </dgm:style>
+  </dgm:styleLbl>
+  <dgm:styleLbl name="asst2">
+    <dgm:scene3d>
+      <a:camera prst="orthographicFront"/>
+      <a:lightRig rig="threePt" dir="t"/>
+    </dgm:scene3d>
+    <dgm:sp3d/>
+    <dgm:txPr/>
+    <dgm:style>
+      <a:lnRef idx="2">
+        <a:scrgbClr r="0" g="0" b="0"/>
+      </a:lnRef>
+      <a:fillRef idx="1">
+        <a:scrgbClr r="0" g="0" b="0"/>
+      </a:fillRef>
+      <a:effectRef idx="0">
+        <a:scrgbClr r="0" g="0" b="0"/>
+      </a:effectRef>
+      <a:fontRef idx="minor">
+        <a:schemeClr val="lt1"/>
+      </a:fontRef>
+    </dgm:style>
+  </dgm:styleLbl>
+  <dgm:styleLbl name="asst3">
+    <dgm:scene3d>
+      <a:camera prst="orthographicFront"/>
+      <a:lightRig rig="threePt" dir="t"/>
+    </dgm:scene3d>
+    <dgm:sp3d/>
+    <dgm:txPr/>
+    <dgm:style>
+      <a:lnRef idx="2">
+        <a:scrgbClr r="0" g="0" b="0"/>
+      </a:lnRef>
+      <a:fillRef idx="1">
+        <a:scrgbClr r="0" g="0" b="0"/>
+      </a:fillRef>
+      <a:effectRef idx="0">
+        <a:scrgbClr r="0" g="0" b="0"/>
+      </a:effectRef>
+      <a:fontRef idx="minor">
+        <a:schemeClr val="lt1"/>
+      </a:fontRef>
+    </dgm:style>
+  </dgm:styleLbl>
+  <dgm:styleLbl name="asst4">
+    <dgm:scene3d>
+      <a:camera prst="orthographicFront"/>
+      <a:lightRig rig="threePt" dir="t"/>
+    </dgm:scene3d>
+    <dgm:sp3d/>
+    <dgm:txPr/>
+    <dgm:style>
+      <a:lnRef idx="2">
+        <a:scrgbClr r="0" g="0" b="0"/>
+      </a:lnRef>
+      <a:fillRef idx="1">
+        <a:scrgbClr r="0" g="0" b="0"/>
+      </a:fillRef>
+      <a:effectRef idx="0">
+        <a:scrgbClr r="0" g="0" b="0"/>
+      </a:effectRef>
+      <a:fontRef idx="minor">
+        <a:schemeClr val="lt1"/>
+      </a:fontRef>
+    </dgm:style>
+  </dgm:styleLbl>
+  <dgm:styleLbl name="parChTrans2D1">
+    <dgm:scene3d>
+      <a:camera prst="orthographicFront"/>
+      <a:lightRig rig="threePt" dir="t"/>
+    </dgm:scene3d>
+    <dgm:sp3d/>
+    <dgm:txPr/>
+    <dgm:style>
+      <a:lnRef idx="2">
+        <a:scrgbClr r="0" g="0" b="0"/>
+      </a:lnRef>
+      <a:fillRef idx="1">
+        <a:scrgbClr r="0" g="0" b="0"/>
+      </a:fillRef>
+      <a:effectRef idx="0">
+        <a:scrgbClr r="0" g="0" b="0"/>
+      </a:effectRef>
+      <a:fontRef idx="minor">
+        <a:schemeClr val="lt1"/>
+      </a:fontRef>
+    </dgm:style>
+  </dgm:styleLbl>
+  <dgm:styleLbl name="parChTrans2D2">
+    <dgm:scene3d>
+      <a:camera prst="orthographicFront"/>
+      <a:lightRig rig="threePt" dir="t"/>
+    </dgm:scene3d>
+    <dgm:sp3d/>
+    <dgm:txPr/>
+    <dgm:style>
+      <a:lnRef idx="2">
+        <a:scrgbClr r="0" g="0" b="0"/>
+      </a:lnRef>
+      <a:fillRef idx="1">
+        <a:scrgbClr r="0" g="0" b="0"/>
+      </a:fillRef>
+      <a:effectRef idx="0">
+        <a:scrgbClr r="0" g="0" b="0"/>
+      </a:effectRef>
+      <a:fontRef idx="minor">
+        <a:schemeClr val="lt1"/>
+      </a:fontRef>
+    </dgm:style>
+  </dgm:styleLbl>
+  <dgm:styleLbl name="parChTrans2D3">
+    <dgm:scene3d>
+      <a:camera prst="orthographicFront"/>
+      <a:lightRig rig="threePt" dir="t"/>
+    </dgm:scene3d>
+    <dgm:sp3d/>
+    <dgm:txPr/>
+    <dgm:style>
+      <a:lnRef idx="2">
+        <a:scrgbClr r="0" g="0" b="0"/>
+      </a:lnRef>
+      <a:fillRef idx="1">
+        <a:scrgbClr r="0" g="0" b="0"/>
+      </a:fillRef>
+      <a:effectRef idx="0">
+        <a:scrgbClr r="0" g="0" b="0"/>
+      </a:effectRef>
+      <a:fontRef idx="minor">
+        <a:schemeClr val="lt1"/>
+      </a:fontRef>
+    </dgm:style>
+  </dgm:styleLbl>
+  <dgm:styleLbl name="parChTrans2D4">
+    <dgm:scene3d>
+      <a:camera prst="orthographicFront"/>
+      <a:lightRig rig="threePt" dir="t"/>
+    </dgm:scene3d>
+    <dgm:sp3d/>
+    <dgm:txPr/>
+    <dgm:style>
+      <a:lnRef idx="2">
+        <a:scrgbClr r="0" g="0" b="0"/>
+      </a:lnRef>
+      <a:fillRef idx="1">
+        <a:scrgbClr r="0" g="0" b="0"/>
+      </a:fillRef>
+      <a:effectRef idx="0">
+        <a:scrgbClr r="0" g="0" b="0"/>
+      </a:effectRef>
+      <a:fontRef idx="minor">
+        <a:schemeClr val="lt1"/>
+      </a:fontRef>
+    </dgm:style>
+  </dgm:styleLbl>
+  <dgm:styleLbl name="parChTrans1D1">
+    <dgm:scene3d>
+      <a:camera prst="orthographicFront"/>
+      <a:lightRig rig="threePt" dir="t"/>
+    </dgm:scene3d>
+    <dgm:sp3d/>
+    <dgm:txPr/>
+    <dgm:style>
+      <a:lnRef idx="2">
+        <a:scrgbClr r="0" g="0" b="0"/>
+      </a:lnRef>
+      <a:fillRef idx="0">
+        <a:scrgbClr r="0" g="0" b="0"/>
+      </a:fillRef>
+      <a:effectRef idx="0">
+        <a:scrgbClr r="0" g="0" b="0"/>
+      </a:effectRef>
+      <a:fontRef idx="minor"/>
+    </dgm:style>
+  </dgm:styleLbl>
+  <dgm:styleLbl name="parChTrans1D2">
+    <dgm:scene3d>
+      <a:camera prst="orthographicFront"/>
+      <a:lightRig rig="threePt" dir="t"/>
+    </dgm:scene3d>
+    <dgm:sp3d/>
+    <dgm:txPr/>
+    <dgm:style>
+      <a:lnRef idx="2">
+        <a:scrgbClr r="0" g="0" b="0"/>
+      </a:lnRef>
+      <a:fillRef idx="0">
+        <a:scrgbClr r="0" g="0" b="0"/>
+      </a:fillRef>
+      <a:effectRef idx="0">
+        <a:scrgbClr r="0" g="0" b="0"/>
+      </a:effectRef>
+      <a:fontRef idx="minor"/>
+    </dgm:style>
+  </dgm:styleLbl>
+  <dgm:styleLbl name="parChTrans1D3">
+    <dgm:scene3d>
+      <a:camera prst="orthographicFront"/>
+      <a:lightRig rig="threePt" dir="t"/>
+    </dgm:scene3d>
+    <dgm:sp3d/>
+    <dgm:txPr/>
+    <dgm:style>
+      <a:lnRef idx="2">
+        <a:scrgbClr r="0" g="0" b="0"/>
+      </a:lnRef>
+      <a:fillRef idx="0">
+        <a:scrgbClr r="0" g="0" b="0"/>
+      </a:fillRef>
+      <a:effectRef idx="0">
+        <a:scrgbClr r="0" g="0" b="0"/>
+      </a:effectRef>
+      <a:fontRef idx="minor"/>
+    </dgm:style>
+  </dgm:styleLbl>
+  <dgm:styleLbl name="parChTrans1D4">
+    <dgm:scene3d>
+      <a:camera prst="orthographicFront"/>
+      <a:lightRig rig="threePt" dir="t"/>
+    </dgm:scene3d>
+    <dgm:sp3d/>
+    <dgm:txPr/>
+    <dgm:style>
+      <a:lnRef idx="2">
+        <a:scrgbClr r="0" g="0" b="0"/>
+      </a:lnRef>
+      <a:fillRef idx="0">
+        <a:scrgbClr r="0" g="0" b="0"/>
+      </a:fillRef>
+      <a:effectRef idx="0">
+        <a:scrgbClr r="0" g="0" b="0"/>
+      </a:effectRef>
+      <a:fontRef idx="minor"/>
+    </dgm:style>
+  </dgm:styleLbl>
+  <dgm:styleLbl name="fgAcc1">
+    <dgm:scene3d>
+      <a:camera prst="orthographicFront"/>
+      <a:lightRig rig="threePt" dir="t"/>
+    </dgm:scene3d>
+    <dgm:sp3d/>
+    <dgm:txPr/>
+    <dgm:style>
+      <a:lnRef idx="2">
+        <a:scrgbClr r="0" g="0" b="0"/>
+      </a:lnRef>
+      <a:fillRef idx="1">
+        <a:scrgbClr r="0" g="0" b="0"/>
+      </a:fillRef>
+      <a:effectRef idx="0">
+        <a:scrgbClr r="0" g="0" b="0"/>
+      </a:effectRef>
+      <a:fontRef idx="minor"/>
+    </dgm:style>
+  </dgm:styleLbl>
+  <dgm:styleLbl name="conFgAcc1">
+    <dgm:scene3d>
+      <a:camera prst="orthographicFront"/>
+      <a:lightRig rig="threePt" dir="t"/>
+    </dgm:scene3d>
+    <dgm:sp3d/>
+    <dgm:txPr/>
+    <dgm:style>
+      <a:lnRef idx="2">
+        <a:scrgbClr r="0" g="0" b="0"/>
+      </a:lnRef>
+      <a:fillRef idx="1">
+        <a:scrgbClr r="0" g="0" b="0"/>
+      </a:fillRef>
+      <a:effectRef idx="0">
+        <a:scrgbClr r="0" g="0" b="0"/>
+      </a:effectRef>
+      <a:fontRef idx="minor"/>
+    </dgm:style>
+  </dgm:styleLbl>
+  <dgm:styleLbl name="alignAcc1">
+    <dgm:scene3d>
+      <a:camera prst="orthographicFront"/>
+      <a:lightRig rig="threePt" dir="t"/>
+    </dgm:scene3d>
+    <dgm:sp3d/>
+    <dgm:txPr/>
+    <dgm:style>
+      <a:lnRef idx="2">
+        <a:scrgbClr r="0" g="0" b="0"/>
+      </a:lnRef>
+      <a:fillRef idx="1">
+        <a:scrgbClr r="0" g="0" b="0"/>
+      </a:fillRef>
+      <a:effectRef idx="0">
+        <a:scrgbClr r="0" g="0" b="0"/>
+      </a:effectRef>
+      <a:fontRef idx="minor"/>
+    </dgm:style>
+  </dgm:styleLbl>
+  <dgm:styleLbl name="trAlignAcc1">
+    <dgm:scene3d>
+      <a:camera prst="orthographicFront"/>
+      <a:lightRig rig="threePt" dir="t"/>
+    </dgm:scene3d>
+    <dgm:sp3d/>
+    <dgm:txPr/>
+    <dgm:style>
+      <a:lnRef idx="1">
+        <a:scrgbClr r="0" g="0" b="0"/>
+      </a:lnRef>
+      <a:fillRef idx="1">
+        <a:scrgbClr r="0" g="0" b="0"/>
+      </a:fillRef>
+      <a:effectRef idx="0">
+        <a:scrgbClr r="0" g="0" b="0"/>
+      </a:effectRef>
+      <a:fontRef idx="minor"/>
+    </dgm:style>
+  </dgm:styleLbl>
+  <dgm:styleLbl name="bgAcc1">
+    <dgm:scene3d>
+      <a:camera prst="orthographicFront"/>
+      <a:lightRig rig="threePt" dir="t"/>
+    </dgm:scene3d>
+    <dgm:sp3d/>
+    <dgm:txPr/>
+    <dgm:style>
+      <a:lnRef idx="2">
+        <a:scrgbClr r="0" g="0" b="0"/>
+      </a:lnRef>
+      <a:fillRef idx="1">
+        <a:scrgbClr r="0" g="0" b="0"/>
+      </a:fillRef>
+      <a:effectRef idx="0">
+        <a:scrgbClr r="0" g="0" b="0"/>
+      </a:effectRef>
+      <a:fontRef idx="minor"/>
+    </dgm:style>
+  </dgm:styleLbl>
+  <dgm:styleLbl name="solidFgAcc1">
+    <dgm:scene3d>
+      <a:camera prst="orthographicFront"/>
+      <a:lightRig rig="threePt" dir="t"/>
+    </dgm:scene3d>
+    <dgm:sp3d/>
+    <dgm:txPr/>
+    <dgm:style>
+      <a:lnRef idx="2">
+        <a:scrgbClr r="0" g="0" b="0"/>
+      </a:lnRef>
+      <a:fillRef idx="1">
+        <a:scrgbClr r="0" g="0" b="0"/>
+      </a:fillRef>
+      <a:effectRef idx="0">
+        <a:scrgbClr r="0" g="0" b="0"/>
+      </a:effectRef>
+      <a:fontRef idx="minor"/>
+    </dgm:style>
+  </dgm:styleLbl>
+  <dgm:styleLbl name="solidAlignAcc1">
+    <dgm:scene3d>
+      <a:camera prst="orthographicFront"/>
+      <a:lightRig rig="threePt" dir="t"/>
+    </dgm:scene3d>
+    <dgm:sp3d/>
+    <dgm:txPr/>
+    <dgm:style>
+      <a:lnRef idx="2">
+        <a:scrgbClr r="0" g="0" b="0"/>
+      </a:lnRef>
+      <a:fillRef idx="1">
+        <a:scrgbClr r="0" g="0" b="0"/>
+      </a:fillRef>
+      <a:effectRef idx="0">
+        <a:scrgbClr r="0" g="0" b="0"/>
+      </a:effectRef>
+      <a:fontRef idx="minor"/>
+    </dgm:style>
+  </dgm:styleLbl>
+  <dgm:styleLbl name="solidBgAcc1">
+    <dgm:scene3d>
+      <a:camera prst="orthographicFront"/>
+      <a:lightRig rig="threePt" dir="t"/>
+    </dgm:scene3d>
+    <dgm:sp3d/>
+    <dgm:txPr/>
+    <dgm:style>
+      <a:lnRef idx="2">
+        <a:scrgbClr r="0" g="0" b="0"/>
+      </a:lnRef>
+      <a:fillRef idx="1">
+        <a:scrgbClr r="0" g="0" b="0"/>
+      </a:fillRef>
+      <a:effectRef idx="0">
+        <a:scrgbClr r="0" g="0" b="0"/>
+      </a:effectRef>
+      <a:fontRef idx="minor"/>
+    </dgm:style>
+  </dgm:styleLbl>
+  <dgm:styleLbl name="fgAccFollowNode1">
+    <dgm:scene3d>
+      <a:camera prst="orthographicFront"/>
+      <a:lightRig rig="threePt" dir="t"/>
+    </dgm:scene3d>
+    <dgm:sp3d/>
+    <dgm:txPr/>
+    <dgm:style>
+      <a:lnRef idx="2">
+        <a:scrgbClr r="0" g="0" b="0"/>
+      </a:lnRef>
+      <a:fillRef idx="1">
+        <a:scrgbClr r="0" g="0" b="0"/>
+      </a:fillRef>
+      <a:effectRef idx="0">
+        <a:scrgbClr r="0" g="0" b="0"/>
+      </a:effectRef>
+      <a:fontRef idx="minor"/>
+    </dgm:style>
+  </dgm:styleLbl>
+  <dgm:styleLbl name="alignAccFollowNode1">
+    <dgm:scene3d>
+      <a:camera prst="orthographicFront"/>
+      <a:lightRig rig="threePt" dir="t"/>
+    </dgm:scene3d>
+    <dgm:sp3d/>
+    <dgm:txPr/>
+    <dgm:style>
+      <a:lnRef idx="2">
+        <a:scrgbClr r="0" g="0" b="0"/>
+      </a:lnRef>
+      <a:fillRef idx="1">
+        <a:scrgbClr r="0" g="0" b="0"/>
+      </a:fillRef>
+      <a:effectRef idx="0">
+        <a:scrgbClr r="0" g="0" b="0"/>
+      </a:effectRef>
+      <a:fontRef idx="minor"/>
+    </dgm:style>
+  </dgm:styleLbl>
+  <dgm:styleLbl name="bgAccFollowNode1">
+    <dgm:scene3d>
+      <a:camera prst="orthographicFront"/>
+      <a:lightRig rig="threePt" dir="t"/>
+    </dgm:scene3d>
+    <dgm:sp3d/>
+    <dgm:txPr/>
+    <dgm:style>
+      <a:lnRef idx="2">
+        <a:scrgbClr r="0" g="0" b="0"/>
+      </a:lnRef>
+      <a:fillRef idx="1">
+        <a:scrgbClr r="0" g="0" b="0"/>
+      </a:fillRef>
+      <a:effectRef idx="0">
+        <a:scrgbClr r="0" g="0" b="0"/>
+      </a:effectRef>
+      <a:fontRef idx="minor"/>
+    </dgm:style>
+  </dgm:styleLbl>
+  <dgm:styleLbl name="fgAcc0">
+    <dgm:scene3d>
+      <a:camera prst="orthographicFront"/>
+      <a:lightRig rig="threePt" dir="t"/>
+    </dgm:scene3d>
+    <dgm:sp3d/>
+    <dgm:txPr/>
+    <dgm:style>
+      <a:lnRef idx="2">
+        <a:scrgbClr r="0" g="0" b="0"/>
+      </a:lnRef>
+      <a:fillRef idx="1">
+        <a:scrgbClr r="0" g="0" b="0"/>
+      </a:fillRef>
+      <a:effectRef idx="0">
+        <a:scrgbClr r="0" g="0" b="0"/>
+      </a:effectRef>
+      <a:fontRef idx="minor"/>
+    </dgm:style>
+  </dgm:styleLbl>
+  <dgm:styleLbl name="fgAcc2">
+    <dgm:scene3d>
+      <a:camera prst="orthographicFront"/>
+      <a:lightRig rig="threePt" dir="t"/>
+    </dgm:scene3d>
+    <dgm:sp3d/>
+    <dgm:txPr/>
+    <dgm:style>
+      <a:lnRef idx="2">
+        <a:scrgbClr r="0" g="0" b="0"/>
+      </a:lnRef>
+      <a:fillRef idx="1">
+        <a:scrgbClr r="0" g="0" b="0"/>
+      </a:fillRef>
+      <a:effectRef idx="0">
+        <a:scrgbClr r="0" g="0" b="0"/>
+      </a:effectRef>
+      <a:fontRef idx="minor"/>
+    </dgm:style>
+  </dgm:styleLbl>
+  <dgm:styleLbl name="fgAcc3">
+    <dgm:scene3d>
+      <a:camera prst="orthographicFront"/>
+      <a:lightRig rig="threePt" dir="t"/>
+    </dgm:scene3d>
+    <dgm:sp3d/>
+    <dgm:txPr/>
+    <dgm:style>
+      <a:lnRef idx="2">
+        <a:scrgbClr r="0" g="0" b="0"/>
+      </a:lnRef>
+      <a:fillRef idx="1">
+        <a:scrgbClr r="0" g="0" b="0"/>
+      </a:fillRef>
+      <a:effectRef idx="0">
+        <a:scrgbClr r="0" g="0" b="0"/>
+      </a:effectRef>
+      <a:fontRef idx="minor"/>
+    </dgm:style>
+  </dgm:styleLbl>
+  <dgm:styleLbl name="fgAcc4">
+    <dgm:scene3d>
+      <a:camera prst="orthographicFront"/>
+      <a:lightRig rig="threePt" dir="t"/>
+    </dgm:scene3d>
+    <dgm:sp3d/>
+    <dgm:txPr/>
+    <dgm:style>
+      <a:lnRef idx="2">
+        <a:scrgbClr r="0" g="0" b="0"/>
+      </a:lnRef>
+      <a:fillRef idx="1">
+        <a:scrgbClr r="0" g="0" b="0"/>
+      </a:fillRef>
+      <a:effectRef idx="0">
+        <a:scrgbClr r="0" g="0" b="0"/>
+      </a:effectRef>
+      <a:fontRef idx="minor"/>
+    </dgm:style>
+  </dgm:styleLbl>
+  <dgm:styleLbl name="bgShp">
+    <dgm:scene3d>
+      <a:camera prst="orthographicFront"/>
+      <a:lightRig rig="threePt" dir="t"/>
+    </dgm:scene3d>
+    <dgm:sp3d/>
+    <dgm:txPr/>
+    <dgm:style>
+      <a:lnRef idx="0">
+        <a:scrgbClr r="0" g="0" b="0"/>
+      </a:lnRef>
+      <a:fillRef idx="1">
+        <a:scrgbClr r="0" g="0" b="0"/>
+      </a:fillRef>
+      <a:effectRef idx="0">
+        <a:scrgbClr r="0" g="0" b="0"/>
+      </a:effectRef>
+      <a:fontRef idx="minor"/>
+    </dgm:style>
+  </dgm:styleLbl>
+  <dgm:styleLbl name="dkBgShp">
+    <dgm:scene3d>
+      <a:camera prst="orthographicFront"/>
+      <a:lightRig rig="threePt" dir="t"/>
+    </dgm:scene3d>
+    <dgm:sp3d/>
+    <dgm:txPr/>
+    <dgm:style>
+      <a:lnRef idx="0">
+        <a:scrgbClr r="0" g="0" b="0"/>
+      </a:lnRef>
+      <a:fillRef idx="1">
+        <a:scrgbClr r="0" g="0" b="0"/>
+      </a:fillRef>
+      <a:effectRef idx="0">
+        <a:scrgbClr r="0" g="0" b="0"/>
+      </a:effectRef>
+      <a:fontRef idx="minor"/>
+    </dgm:style>
+  </dgm:styleLbl>
+  <dgm:styleLbl name="trBgShp">
+    <dgm:scene3d>
+      <a:camera prst="orthographicFront"/>
+      <a:lightRig rig="threePt" dir="t"/>
+    </dgm:scene3d>
+    <dgm:sp3d/>
+    <dgm:txPr/>
+    <dgm:style>
+      <a:lnRef idx="0">
+        <a:scrgbClr r="0" g="0" b="0"/>
+      </a:lnRef>
+      <a:fillRef idx="1">
+        <a:scrgbClr r="0" g="0" b="0"/>
+      </a:fillRef>
+      <a:effectRef idx="0">
+        <a:scrgbClr r="0" g="0" b="0"/>
+      </a:effectRef>
+      <a:fontRef idx="minor"/>
+    </dgm:style>
+  </dgm:styleLbl>
+  <dgm:styleLbl name="fgShp">
+    <dgm:scene3d>
+      <a:camera prst="orthographicFront"/>
+      <a:lightRig rig="threePt" dir="t"/>
+    </dgm:scene3d>
+    <dgm:sp3d/>
+    <dgm:txPr/>
+    <dgm:style>
+      <a:lnRef idx="2">
+        <a:scrgbClr r="0" g="0" b="0"/>
+      </a:lnRef>
+      <a:fillRef idx="1">
+        <a:scrgbClr r="0" g="0" b="0"/>
+      </a:fillRef>
+      <a:effectRef idx="0">
+        <a:scrgbClr r="0" g="0" b="0"/>
+      </a:effectRef>
+      <a:fontRef idx="minor"/>
+    </dgm:style>
+  </dgm:styleLbl>
+  <dgm:styleLbl name="revTx">
+    <dgm:scene3d>
+      <a:camera prst="orthographicFront"/>
+      <a:lightRig rig="threePt" dir="t"/>
+    </dgm:scene3d>
+    <dgm:sp3d/>
+    <dgm:txPr/>
+    <dgm:style>
+      <a:lnRef idx="0">
+        <a:scrgbClr r="0" g="0" b="0"/>
+      </a:lnRef>
+      <a:fillRef idx="0">
+        <a:scrgbClr r="0" g="0" b="0"/>
+      </a:fillRef>
+      <a:effectRef idx="0">
+        <a:scrgbClr r="0" g="0" b="0"/>
+      </a:effectRef>
+      <a:fontRef idx="minor"/>
+    </dgm:style>
+  </dgm:styleLbl>
+</dgm:styleDef>
+</file>
+
 <file path=ppt/slideLayouts/slideLayout1.xml><?xml version="1.0" encoding="utf-8"?>
 <p:sldLayout xmlns:a="http://schemas.openxmlformats.org/drawingml/2006/main" xmlns:r="http://schemas.openxmlformats.org/officeDocument/2006/relationships" xmlns:p="http://schemas.openxmlformats.org/presentationml/2006/main" preserve="1" userDrawn="1">
   <p:cSld name="Title Slide">
@@ -942,7 +3254,7 @@
           <a:p>
             <a:fld id="{76261330-66C9-4AE9-83ED-F8EC794E6FBE}" type="datetimeFigureOut">
               <a:rPr lang="en-US" smtClean="0"/>
-              <a:t>5/31/2022</a:t>
+              <a:t>6/5/2022</a:t>
             </a:fld>
             <a:endParaRPr lang="en-US"/>
           </a:p>
@@ -1120,7 +3432,7 @@
           <a:p>
             <a:fld id="{76261330-66C9-4AE9-83ED-F8EC794E6FBE}" type="datetimeFigureOut">
               <a:rPr lang="en-US" smtClean="0"/>
-              <a:t>5/31/2022</a:t>
+              <a:t>6/5/2022</a:t>
             </a:fld>
             <a:endParaRPr lang="en-US"/>
           </a:p>
@@ -1308,7 +3620,7 @@
           <a:p>
             <a:fld id="{76261330-66C9-4AE9-83ED-F8EC794E6FBE}" type="datetimeFigureOut">
               <a:rPr lang="en-US" smtClean="0"/>
-              <a:t>5/31/2022</a:t>
+              <a:t>6/5/2022</a:t>
             </a:fld>
             <a:endParaRPr lang="en-US"/>
           </a:p>
@@ -2405,7 +4717,7 @@
         <p:fade/>
       </p:transition>
     </mc:Choice>
-    <mc:Fallback xmlns="" xmlns:mv="urn:schemas-microsoft-com:mac:vml" xmlns:c="http://schemas.openxmlformats.org/drawingml/2006/chart" xmlns:dgm="http://schemas.openxmlformats.org/drawingml/2006/diagram" xmlns:o="urn:schemas-microsoft-com:office:office" xmlns:v="urn:schemas-microsoft-com:vml" xmlns:pvml="urn:schemas-microsoft-com:office:powerpoint" xmlns:com="http://schemas.openxmlformats.org/drawingml/2006/compatibility" xmlns:p15="http://schemas.microsoft.com/office/powerpoint/2012/main" xmlns:ahyp="http://schemas.microsoft.com/office/drawing/2018/hyperlinkcolor">
+    <mc:Fallback xmlns:ahyp="http://schemas.microsoft.com/office/drawing/2018/hyperlinkcolor" xmlns:p15="http://schemas.microsoft.com/office/powerpoint/2012/main" xmlns:com="http://schemas.openxmlformats.org/drawingml/2006/compatibility" xmlns:pvml="urn:schemas-microsoft-com:office:powerpoint" xmlns:v="urn:schemas-microsoft-com:vml" xmlns:o="urn:schemas-microsoft-com:office:office" xmlns:dgm="http://schemas.openxmlformats.org/drawingml/2006/diagram" xmlns:c="http://schemas.openxmlformats.org/drawingml/2006/chart" xmlns:mv="urn:schemas-microsoft-com:mac:vml" xmlns="">
       <p:transition>
         <p:fade/>
       </p:transition>
@@ -2752,7 +5064,7 @@
           <a:p>
             <a:fld id="{76261330-66C9-4AE9-83ED-F8EC794E6FBE}" type="datetimeFigureOut">
               <a:rPr lang="en-US" smtClean="0"/>
-              <a:t>5/31/2022</a:t>
+              <a:t>6/5/2022</a:t>
             </a:fld>
             <a:endParaRPr lang="en-US"/>
           </a:p>
@@ -2992,7 +5304,7 @@
           <a:p>
             <a:fld id="{76261330-66C9-4AE9-83ED-F8EC794E6FBE}" type="datetimeFigureOut">
               <a:rPr lang="en-US" smtClean="0"/>
-              <a:t>5/31/2022</a:t>
+              <a:t>6/5/2022</a:t>
             </a:fld>
             <a:endParaRPr lang="en-US"/>
           </a:p>
@@ -3367,7 +5679,7 @@
           <a:p>
             <a:fld id="{76261330-66C9-4AE9-83ED-F8EC794E6FBE}" type="datetimeFigureOut">
               <a:rPr lang="en-US" smtClean="0"/>
-              <a:t>5/31/2022</a:t>
+              <a:t>6/5/2022</a:t>
             </a:fld>
             <a:endParaRPr lang="en-US"/>
           </a:p>
@@ -3493,7 +5805,7 @@
           <a:p>
             <a:fld id="{76261330-66C9-4AE9-83ED-F8EC794E6FBE}" type="datetimeFigureOut">
               <a:rPr lang="en-US" smtClean="0"/>
-              <a:t>5/31/2022</a:t>
+              <a:t>6/5/2022</a:t>
             </a:fld>
             <a:endParaRPr lang="en-US"/>
           </a:p>
@@ -3596,7 +5908,7 @@
           <a:p>
             <a:fld id="{76261330-66C9-4AE9-83ED-F8EC794E6FBE}" type="datetimeFigureOut">
               <a:rPr lang="en-US" smtClean="0"/>
-              <a:t>5/31/2022</a:t>
+              <a:t>6/5/2022</a:t>
             </a:fld>
             <a:endParaRPr lang="en-US"/>
           </a:p>
@@ -3881,7 +6193,7 @@
           <a:p>
             <a:fld id="{76261330-66C9-4AE9-83ED-F8EC794E6FBE}" type="datetimeFigureOut">
               <a:rPr lang="en-US" smtClean="0"/>
-              <a:t>5/31/2022</a:t>
+              <a:t>6/5/2022</a:t>
             </a:fld>
             <a:endParaRPr lang="en-US"/>
           </a:p>
@@ -4263,11 +6575,14 @@
     <p:bodyStyle>
       <a:lvl1pPr marL="228600" indent="-228600" algn="l" defTabSz="914400" rtl="0" eaLnBrk="1" latinLnBrk="0" hangingPunct="1">
         <a:lnSpc>
-          <a:spcPct val="90000"/>
+          <a:spcPct val="100000"/>
         </a:lnSpc>
         <a:spcBef>
-          <a:spcPts val="1000"/>
+          <a:spcPts val="600"/>
         </a:spcBef>
+        <a:spcAft>
+          <a:spcPts val="600"/>
+        </a:spcAft>
         <a:buClr>
           <a:srgbClr val="C00000"/>
         </a:buClr>
@@ -4284,11 +6599,14 @@
       </a:lvl1pPr>
       <a:lvl2pPr marL="685800" indent="-228600" algn="l" defTabSz="914400" rtl="0" eaLnBrk="1" latinLnBrk="0" hangingPunct="1">
         <a:lnSpc>
-          <a:spcPct val="90000"/>
+          <a:spcPct val="100000"/>
         </a:lnSpc>
         <a:spcBef>
-          <a:spcPts val="500"/>
+          <a:spcPts val="600"/>
         </a:spcBef>
+        <a:spcAft>
+          <a:spcPts val="600"/>
+        </a:spcAft>
         <a:buClr>
           <a:srgbClr val="C00000"/>
         </a:buClr>
@@ -4305,11 +6623,14 @@
       </a:lvl2pPr>
       <a:lvl3pPr marL="1143000" indent="-228600" algn="l" defTabSz="914400" rtl="0" eaLnBrk="1" latinLnBrk="0" hangingPunct="1">
         <a:lnSpc>
-          <a:spcPct val="90000"/>
+          <a:spcPct val="100000"/>
         </a:lnSpc>
         <a:spcBef>
-          <a:spcPts val="500"/>
+          <a:spcPts val="600"/>
         </a:spcBef>
+        <a:spcAft>
+          <a:spcPts val="600"/>
+        </a:spcAft>
         <a:buClr>
           <a:srgbClr val="C00000"/>
         </a:buClr>
@@ -4326,11 +6647,14 @@
       </a:lvl3pPr>
       <a:lvl4pPr marL="1600200" indent="-228600" algn="l" defTabSz="914400" rtl="0" eaLnBrk="1" latinLnBrk="0" hangingPunct="1">
         <a:lnSpc>
-          <a:spcPct val="90000"/>
+          <a:spcPct val="100000"/>
         </a:lnSpc>
         <a:spcBef>
-          <a:spcPts val="500"/>
+          <a:spcPts val="600"/>
         </a:spcBef>
+        <a:spcAft>
+          <a:spcPts val="600"/>
+        </a:spcAft>
         <a:buClr>
           <a:srgbClr val="C00000"/>
         </a:buClr>
@@ -4347,11 +6671,14 @@
       </a:lvl4pPr>
       <a:lvl5pPr marL="2057400" indent="-228600" algn="l" defTabSz="914400" rtl="0" eaLnBrk="1" latinLnBrk="0" hangingPunct="1">
         <a:lnSpc>
-          <a:spcPct val="90000"/>
+          <a:spcPct val="100000"/>
         </a:lnSpc>
         <a:spcBef>
-          <a:spcPts val="500"/>
+          <a:spcPts val="600"/>
         </a:spcBef>
+        <a:spcAft>
+          <a:spcPts val="600"/>
+        </a:spcAft>
         <a:buClr>
           <a:srgbClr val="C00000"/>
         </a:buClr>
@@ -4659,6 +6986,307 @@
           <p:cNvPr id="2" name="Title 1">
             <a:extLst>
               <a:ext uri="{FF2B5EF4-FFF2-40B4-BE49-F238E27FC236}">
+                <a16:creationId xmlns:a16="http://schemas.microsoft.com/office/drawing/2014/main" id="{BEC55787-1874-66F9-DB71-FDEE7FC23BE0}"/>
+              </a:ext>
+            </a:extLst>
+          </p:cNvPr>
+          <p:cNvSpPr>
+            <a:spLocks noGrp="1"/>
+          </p:cNvSpPr>
+          <p:nvPr>
+            <p:ph type="title"/>
+          </p:nvPr>
+        </p:nvSpPr>
+        <p:spPr/>
+        <p:txBody>
+          <a:bodyPr/>
+          <a:lstStyle/>
+          <a:p>
+            <a:endParaRPr lang="en-US"/>
+          </a:p>
+        </p:txBody>
+      </p:sp>
+      <p:sp>
+        <p:nvSpPr>
+          <p:cNvPr id="3" name="Content Placeholder 2">
+            <a:extLst>
+              <a:ext uri="{FF2B5EF4-FFF2-40B4-BE49-F238E27FC236}">
+                <a16:creationId xmlns:a16="http://schemas.microsoft.com/office/drawing/2014/main" id="{67E040F4-0EC6-15C7-6F7A-CD69AE0D3CFF}"/>
+              </a:ext>
+            </a:extLst>
+          </p:cNvPr>
+          <p:cNvSpPr>
+            <a:spLocks noGrp="1"/>
+          </p:cNvSpPr>
+          <p:nvPr>
+            <p:ph idx="1"/>
+          </p:nvPr>
+        </p:nvSpPr>
+        <p:spPr/>
+        <p:txBody>
+          <a:bodyPr/>
+          <a:lstStyle/>
+          <a:p>
+            <a:endParaRPr lang="en-US"/>
+          </a:p>
+        </p:txBody>
+      </p:sp>
+      <p:pic>
+        <p:nvPicPr>
+          <p:cNvPr id="4098" name="Picture 2">
+            <a:extLst>
+              <a:ext uri="{FF2B5EF4-FFF2-40B4-BE49-F238E27FC236}">
+                <a16:creationId xmlns:a16="http://schemas.microsoft.com/office/drawing/2014/main" id="{15C4AF63-04CA-5110-CC28-EC6929B5845B}"/>
+              </a:ext>
+            </a:extLst>
+          </p:cNvPr>
+          <p:cNvPicPr>
+            <a:picLocks noChangeAspect="1" noChangeArrowheads="1"/>
+          </p:cNvPicPr>
+          <p:nvPr/>
+        </p:nvPicPr>
+        <p:blipFill>
+          <a:blip r:embed="rId2">
+            <a:extLst>
+              <a:ext uri="{28A0092B-C50C-407E-A947-70E740481C1C}">
+                <a14:useLocalDpi xmlns:a14="http://schemas.microsoft.com/office/drawing/2010/main" val="0"/>
+              </a:ext>
+            </a:extLst>
+          </a:blip>
+          <a:srcRect/>
+          <a:stretch>
+            <a:fillRect/>
+          </a:stretch>
+        </p:blipFill>
+        <p:spPr bwMode="auto">
+          <a:xfrm>
+            <a:off x="0" y="2220913"/>
+            <a:ext cx="9144000" cy="2414587"/>
+          </a:xfrm>
+          <a:prstGeom prst="rect">
+            <a:avLst/>
+          </a:prstGeom>
+          <a:noFill/>
+          <a:extLst>
+            <a:ext uri="{909E8E84-426E-40DD-AFC4-6F175D3DCCD1}">
+              <a14:hiddenFill xmlns:a14="http://schemas.microsoft.com/office/drawing/2010/main">
+                <a:solidFill>
+                  <a:srgbClr val="FFFFFF"/>
+                </a:solidFill>
+              </a14:hiddenFill>
+            </a:ext>
+          </a:extLst>
+        </p:spPr>
+      </p:pic>
+    </p:spTree>
+    <p:extLst>
+      <p:ext uri="{BB962C8B-B14F-4D97-AF65-F5344CB8AC3E}">
+        <p14:creationId xmlns:p14="http://schemas.microsoft.com/office/powerpoint/2010/main" val="878438591"/>
+      </p:ext>
+    </p:extLst>
+  </p:cSld>
+  <p:clrMapOvr>
+    <a:masterClrMapping/>
+  </p:clrMapOvr>
+</p:sld>
+</file>
+
+<file path=ppt/slides/slide11.xml><?xml version="1.0" encoding="utf-8"?>
+<p:sld xmlns:a="http://schemas.openxmlformats.org/drawingml/2006/main" xmlns:r="http://schemas.openxmlformats.org/officeDocument/2006/relationships" xmlns:p="http://schemas.openxmlformats.org/presentationml/2006/main">
+  <p:cSld>
+    <p:spTree>
+      <p:nvGrpSpPr>
+        <p:cNvPr id="1" name=""/>
+        <p:cNvGrpSpPr/>
+        <p:nvPr/>
+      </p:nvGrpSpPr>
+      <p:grpSpPr>
+        <a:xfrm>
+          <a:off x="0" y="0"/>
+          <a:ext cx="0" cy="0"/>
+          <a:chOff x="0" y="0"/>
+          <a:chExt cx="0" cy="0"/>
+        </a:xfrm>
+      </p:grpSpPr>
+      <p:sp>
+        <p:nvSpPr>
+          <p:cNvPr id="2" name="Title 1">
+            <a:extLst>
+              <a:ext uri="{FF2B5EF4-FFF2-40B4-BE49-F238E27FC236}">
+                <a16:creationId xmlns:a16="http://schemas.microsoft.com/office/drawing/2014/main" id="{D6F771FB-7C7F-9F7F-3772-DC1F42D859F1}"/>
+              </a:ext>
+            </a:extLst>
+          </p:cNvPr>
+          <p:cNvSpPr>
+            <a:spLocks noGrp="1"/>
+          </p:cNvSpPr>
+          <p:nvPr>
+            <p:ph type="title"/>
+          </p:nvPr>
+        </p:nvSpPr>
+        <p:spPr/>
+        <p:txBody>
+          <a:bodyPr/>
+          <a:lstStyle/>
+          <a:p>
+            <a:endParaRPr lang="en-US"/>
+          </a:p>
+        </p:txBody>
+      </p:sp>
+      <p:sp>
+        <p:nvSpPr>
+          <p:cNvPr id="3" name="Content Placeholder 2">
+            <a:extLst>
+              <a:ext uri="{FF2B5EF4-FFF2-40B4-BE49-F238E27FC236}">
+                <a16:creationId xmlns:a16="http://schemas.microsoft.com/office/drawing/2014/main" id="{ACAAB099-102F-2574-8A7D-C87175B8395A}"/>
+              </a:ext>
+            </a:extLst>
+          </p:cNvPr>
+          <p:cNvSpPr>
+            <a:spLocks noGrp="1"/>
+          </p:cNvSpPr>
+          <p:nvPr>
+            <p:ph idx="1"/>
+          </p:nvPr>
+        </p:nvSpPr>
+        <p:spPr/>
+        <p:txBody>
+          <a:bodyPr/>
+          <a:lstStyle/>
+          <a:p>
+            <a:endParaRPr lang="en-US"/>
+          </a:p>
+        </p:txBody>
+      </p:sp>
+      <p:pic>
+        <p:nvPicPr>
+          <p:cNvPr id="5122" name="Picture 2">
+            <a:extLst>
+              <a:ext uri="{FF2B5EF4-FFF2-40B4-BE49-F238E27FC236}">
+                <a16:creationId xmlns:a16="http://schemas.microsoft.com/office/drawing/2014/main" id="{12462F82-74BA-2273-D003-57E6C0FEC06D}"/>
+              </a:ext>
+            </a:extLst>
+          </p:cNvPr>
+          <p:cNvPicPr>
+            <a:picLocks noChangeAspect="1" noChangeArrowheads="1"/>
+          </p:cNvPicPr>
+          <p:nvPr/>
+        </p:nvPicPr>
+        <p:blipFill>
+          <a:blip r:embed="rId2">
+            <a:extLst>
+              <a:ext uri="{28A0092B-C50C-407E-A947-70E740481C1C}">
+                <a14:useLocalDpi xmlns:a14="http://schemas.microsoft.com/office/drawing/2010/main" val="0"/>
+              </a:ext>
+            </a:extLst>
+          </a:blip>
+          <a:srcRect/>
+          <a:stretch>
+            <a:fillRect/>
+          </a:stretch>
+        </p:blipFill>
+        <p:spPr bwMode="auto">
+          <a:xfrm>
+            <a:off x="354075" y="1738143"/>
+            <a:ext cx="8173411" cy="2286000"/>
+          </a:xfrm>
+          <a:prstGeom prst="rect">
+            <a:avLst/>
+          </a:prstGeom>
+          <a:noFill/>
+          <a:extLst>
+            <a:ext uri="{909E8E84-426E-40DD-AFC4-6F175D3DCCD1}">
+              <a14:hiddenFill xmlns:a14="http://schemas.microsoft.com/office/drawing/2010/main">
+                <a:solidFill>
+                  <a:srgbClr val="FFFFFF"/>
+                </a:solidFill>
+              </a14:hiddenFill>
+            </a:ext>
+          </a:extLst>
+        </p:spPr>
+      </p:pic>
+      <p:pic>
+        <p:nvPicPr>
+          <p:cNvPr id="5124" name="Picture 4">
+            <a:extLst>
+              <a:ext uri="{FF2B5EF4-FFF2-40B4-BE49-F238E27FC236}">
+                <a16:creationId xmlns:a16="http://schemas.microsoft.com/office/drawing/2014/main" id="{50DF4945-4466-A1C6-CD37-BC0B613AB725}"/>
+              </a:ext>
+            </a:extLst>
+          </p:cNvPr>
+          <p:cNvPicPr>
+            <a:picLocks noChangeAspect="1" noChangeArrowheads="1"/>
+          </p:cNvPicPr>
+          <p:nvPr/>
+        </p:nvPicPr>
+        <p:blipFill>
+          <a:blip r:embed="rId3">
+            <a:extLst>
+              <a:ext uri="{28A0092B-C50C-407E-A947-70E740481C1C}">
+                <a14:useLocalDpi xmlns:a14="http://schemas.microsoft.com/office/drawing/2010/main" val="0"/>
+              </a:ext>
+            </a:extLst>
+          </a:blip>
+          <a:srcRect/>
+          <a:stretch>
+            <a:fillRect/>
+          </a:stretch>
+        </p:blipFill>
+        <p:spPr bwMode="auto">
+          <a:xfrm>
+            <a:off x="628650" y="4127836"/>
+            <a:ext cx="7898836" cy="2286000"/>
+          </a:xfrm>
+          <a:prstGeom prst="rect">
+            <a:avLst/>
+          </a:prstGeom>
+          <a:noFill/>
+          <a:extLst>
+            <a:ext uri="{909E8E84-426E-40DD-AFC4-6F175D3DCCD1}">
+              <a14:hiddenFill xmlns:a14="http://schemas.microsoft.com/office/drawing/2010/main">
+                <a:solidFill>
+                  <a:srgbClr val="FFFFFF"/>
+                </a:solidFill>
+              </a14:hiddenFill>
+            </a:ext>
+          </a:extLst>
+        </p:spPr>
+      </p:pic>
+    </p:spTree>
+    <p:extLst>
+      <p:ext uri="{BB962C8B-B14F-4D97-AF65-F5344CB8AC3E}">
+        <p14:creationId xmlns:p14="http://schemas.microsoft.com/office/powerpoint/2010/main" val="3561003786"/>
+      </p:ext>
+    </p:extLst>
+  </p:cSld>
+  <p:clrMapOvr>
+    <a:masterClrMapping/>
+  </p:clrMapOvr>
+</p:sld>
+</file>
+
+<file path=ppt/slides/slide12.xml><?xml version="1.0" encoding="utf-8"?>
+<p:sld xmlns:a="http://schemas.openxmlformats.org/drawingml/2006/main" xmlns:r="http://schemas.openxmlformats.org/officeDocument/2006/relationships" xmlns:p="http://schemas.openxmlformats.org/presentationml/2006/main">
+  <p:cSld>
+    <p:spTree>
+      <p:nvGrpSpPr>
+        <p:cNvPr id="1" name=""/>
+        <p:cNvGrpSpPr/>
+        <p:nvPr/>
+      </p:nvGrpSpPr>
+      <p:grpSpPr>
+        <a:xfrm>
+          <a:off x="0" y="0"/>
+          <a:ext cx="0" cy="0"/>
+          <a:chOff x="0" y="0"/>
+          <a:chExt cx="0" cy="0"/>
+        </a:xfrm>
+      </p:grpSpPr>
+      <p:sp>
+        <p:nvSpPr>
+          <p:cNvPr id="2" name="Title 1">
+            <a:extLst>
+              <a:ext uri="{FF2B5EF4-FFF2-40B4-BE49-F238E27FC236}">
                 <a16:creationId xmlns:a16="http://schemas.microsoft.com/office/drawing/2014/main" id="{54DF997A-0943-5724-B779-53D802D39CC5}"/>
               </a:ext>
             </a:extLst>
@@ -4814,7 +7442,7 @@
 </p:sld>
 </file>
 
-<file path=ppt/slides/slide11.xml><?xml version="1.0" encoding="utf-8"?>
+<file path=ppt/slides/slide13.xml><?xml version="1.0" encoding="utf-8"?>
 <p:sld xmlns:a="http://schemas.openxmlformats.org/drawingml/2006/main" xmlns:r="http://schemas.openxmlformats.org/officeDocument/2006/relationships" xmlns:p="http://schemas.openxmlformats.org/presentationml/2006/main">
   <p:cSld>
     <p:spTree>
@@ -4963,31 +7591,6 @@
       </p:grpSpPr>
       <p:sp>
         <p:nvSpPr>
-          <p:cNvPr id="2" name="Text Placeholder 1">
-            <a:extLst>
-              <a:ext uri="{FF2B5EF4-FFF2-40B4-BE49-F238E27FC236}">
-                <a16:creationId xmlns:a16="http://schemas.microsoft.com/office/drawing/2014/main" id="{A4A8316A-B790-32F7-CE74-5662F3B089CD}"/>
-              </a:ext>
-            </a:extLst>
-          </p:cNvPr>
-          <p:cNvSpPr>
-            <a:spLocks noGrp="1"/>
-          </p:cNvSpPr>
-          <p:nvPr>
-            <p:ph type="body" idx="1"/>
-          </p:nvPr>
-        </p:nvSpPr>
-        <p:spPr/>
-        <p:txBody>
-          <a:bodyPr/>
-          <a:lstStyle/>
-          <a:p>
-            <a:endParaRPr lang="en-US"/>
-          </a:p>
-        </p:txBody>
-      </p:sp>
-      <p:sp>
-        <p:nvSpPr>
           <p:cNvPr id="3" name="Text Placeholder 2">
             <a:extLst>
               <a:ext uri="{FF2B5EF4-FFF2-40B4-BE49-F238E27FC236}">
@@ -5039,6 +7642,34 @@
           </a:p>
         </p:txBody>
       </p:sp>
+      <p:graphicFrame>
+        <p:nvGraphicFramePr>
+          <p:cNvPr id="5" name="Text Placeholder 1">
+            <a:extLst>
+              <a:ext uri="{FF2B5EF4-FFF2-40B4-BE49-F238E27FC236}">
+                <a16:creationId xmlns:a16="http://schemas.microsoft.com/office/drawing/2014/main" id="{3F181FA9-1069-5EAC-4FC9-369DF807D116}"/>
+              </a:ext>
+            </a:extLst>
+          </p:cNvPr>
+          <p:cNvGraphicFramePr/>
+          <p:nvPr>
+            <p:extLst>
+              <p:ext uri="{D42A27DB-BD31-4B8C-83A1-F6EECF244321}">
+                <p14:modId xmlns:p14="http://schemas.microsoft.com/office/powerpoint/2010/main" val="1072092427"/>
+              </p:ext>
+            </p:extLst>
+          </p:nvPr>
+        </p:nvGraphicFramePr>
+        <p:xfrm>
+          <a:off x="628649" y="991786"/>
+          <a:ext cx="8058151" cy="2137701"/>
+        </p:xfrm>
+        <a:graphic>
+          <a:graphicData uri="http://schemas.openxmlformats.org/drawingml/2006/diagram">
+            <dgm:relIds xmlns:dgm="http://schemas.openxmlformats.org/drawingml/2006/diagram" xmlns:r="http://schemas.openxmlformats.org/officeDocument/2006/relationships" r:dm="rId2" r:lo="rId3" r:qs="rId4" r:cs="rId5"/>
+          </a:graphicData>
+        </a:graphic>
+      </p:graphicFrame>
     </p:spTree>
     <p:extLst>
       <p:ext uri="{BB962C8B-B14F-4D97-AF65-F5344CB8AC3E}">
@@ -5055,7 +7686,7 @@
         <p:fade/>
       </p:transition>
     </mc:Choice>
-    <mc:Fallback xmlns="" xmlns:mv="urn:schemas-microsoft-com:mac:vml" xmlns:c="http://schemas.openxmlformats.org/drawingml/2006/chart" xmlns:dgm="http://schemas.openxmlformats.org/drawingml/2006/diagram" xmlns:o="urn:schemas-microsoft-com:office:office" xmlns:v="urn:schemas-microsoft-com:vml" xmlns:pvml="urn:schemas-microsoft-com:office:powerpoint" xmlns:com="http://schemas.openxmlformats.org/drawingml/2006/compatibility" xmlns:p15="http://schemas.microsoft.com/office/powerpoint/2012/main" xmlns:ahyp="http://schemas.microsoft.com/office/drawing/2018/hyperlinkcolor">
+    <mc:Fallback xmlns:ahyp="http://schemas.microsoft.com/office/drawing/2018/hyperlinkcolor" xmlns:p15="http://schemas.microsoft.com/office/powerpoint/2012/main" xmlns:com="http://schemas.openxmlformats.org/drawingml/2006/compatibility" xmlns:pvml="urn:schemas-microsoft-com:office:powerpoint" xmlns:v="urn:schemas-microsoft-com:vml" xmlns:o="urn:schemas-microsoft-com:office:office" xmlns:dgm="http://schemas.openxmlformats.org/drawingml/2006/diagram" xmlns:c="http://schemas.openxmlformats.org/drawingml/2006/chart" xmlns:mv="urn:schemas-microsoft-com:mac:vml" xmlns="">
       <p:transition>
         <p:fade/>
       </p:transition>
@@ -5104,7 +7735,7 @@
           <a:p>
             <a:r>
               <a:rPr lang="en-US" dirty="0"/>
-              <a:t>Methodology</a:t>
+              <a:t>Background</a:t>
             </a:r>
           </a:p>
         </p:txBody>
@@ -5127,13 +7758,68 @@
         </p:nvSpPr>
         <p:spPr/>
         <p:txBody>
-          <a:bodyPr/>
+          <a:bodyPr>
+            <a:normAutofit/>
+          </a:bodyPr>
           <a:lstStyle/>
           <a:p>
-            <a:endParaRPr lang="en-US" dirty="0"/>
-          </a:p>
-        </p:txBody>
-      </p:sp>
+            <a:pPr marL="0" indent="0">
+              <a:buNone/>
+            </a:pPr>
+            <a:r>
+              <a:rPr lang="en-US" sz="1800" dirty="0"/>
+              <a:t>Human eyes have cones and rods which allows depiction of trichromatic color and brightness, respectively. The same mechanism governs how digital cameras capture color and how devices display them. A colorful image shown below is a combination of three primary channels, namely Red, Green, and Blue.</a:t>
+            </a:r>
+          </a:p>
+        </p:txBody>
+      </p:sp>
+      <p:pic>
+        <p:nvPicPr>
+          <p:cNvPr id="4" name="Picture 8">
+            <a:extLst>
+              <a:ext uri="{FF2B5EF4-FFF2-40B4-BE49-F238E27FC236}">
+                <a16:creationId xmlns:a16="http://schemas.microsoft.com/office/drawing/2014/main" id="{BCFD4753-B066-77A6-14F8-83927E4DB674}"/>
+              </a:ext>
+            </a:extLst>
+          </p:cNvPr>
+          <p:cNvPicPr>
+            <a:picLocks noChangeAspect="1" noChangeArrowheads="1"/>
+          </p:cNvPicPr>
+          <p:nvPr/>
+        </p:nvPicPr>
+        <p:blipFill>
+          <a:blip r:embed="rId2">
+            <a:extLst>
+              <a:ext uri="{28A0092B-C50C-407E-A947-70E740481C1C}">
+                <a14:useLocalDpi xmlns:a14="http://schemas.microsoft.com/office/drawing/2010/main" val="0"/>
+              </a:ext>
+            </a:extLst>
+          </a:blip>
+          <a:srcRect/>
+          <a:stretch>
+            <a:fillRect/>
+          </a:stretch>
+        </p:blipFill>
+        <p:spPr bwMode="auto">
+          <a:xfrm>
+            <a:off x="457200" y="2516810"/>
+            <a:ext cx="8229600" cy="2027409"/>
+          </a:xfrm>
+          <a:prstGeom prst="rect">
+            <a:avLst/>
+          </a:prstGeom>
+          <a:noFill/>
+          <a:extLst>
+            <a:ext uri="{909E8E84-426E-40DD-AFC4-6F175D3DCCD1}">
+              <a14:hiddenFill xmlns:a14="http://schemas.microsoft.com/office/drawing/2010/main">
+                <a:solidFill>
+                  <a:srgbClr val="FFFFFF"/>
+                </a:solidFill>
+              </a14:hiddenFill>
+            </a:ext>
+          </a:extLst>
+        </p:spPr>
+      </p:pic>
     </p:spTree>
     <p:extLst>
       <p:ext uri="{BB962C8B-B14F-4D97-AF65-F5344CB8AC3E}">
@@ -5451,6 +8137,185 @@
           <p:cNvPr id="2" name="Title 1">
             <a:extLst>
               <a:ext uri="{FF2B5EF4-FFF2-40B4-BE49-F238E27FC236}">
+                <a16:creationId xmlns:a16="http://schemas.microsoft.com/office/drawing/2014/main" id="{D613B222-E38F-08AD-9E48-1F18F38BF2EF}"/>
+              </a:ext>
+            </a:extLst>
+          </p:cNvPr>
+          <p:cNvSpPr>
+            <a:spLocks noGrp="1"/>
+          </p:cNvSpPr>
+          <p:nvPr>
+            <p:ph type="title"/>
+          </p:nvPr>
+        </p:nvSpPr>
+        <p:spPr/>
+        <p:txBody>
+          <a:bodyPr/>
+          <a:lstStyle/>
+          <a:p>
+            <a:r>
+              <a:rPr lang="en-US" dirty="0"/>
+              <a:t>Non-parametric Segmentation</a:t>
+            </a:r>
+          </a:p>
+        </p:txBody>
+      </p:sp>
+      <p:sp>
+        <p:nvSpPr>
+          <p:cNvPr id="3" name="Content Placeholder 2">
+            <a:extLst>
+              <a:ext uri="{FF2B5EF4-FFF2-40B4-BE49-F238E27FC236}">
+                <a16:creationId xmlns:a16="http://schemas.microsoft.com/office/drawing/2014/main" id="{7F724189-BEE0-0D77-674B-461A30C88C2C}"/>
+              </a:ext>
+            </a:extLst>
+          </p:cNvPr>
+          <p:cNvSpPr>
+            <a:spLocks noGrp="1"/>
+          </p:cNvSpPr>
+          <p:nvPr>
+            <p:ph idx="1"/>
+          </p:nvPr>
+        </p:nvSpPr>
+        <p:spPr/>
+        <p:txBody>
+          <a:bodyPr>
+            <a:normAutofit/>
+          </a:bodyPr>
+          <a:lstStyle/>
+          <a:p>
+            <a:endParaRPr lang="en-US" sz="1800" dirty="0"/>
+          </a:p>
+        </p:txBody>
+      </p:sp>
+    </p:spTree>
+    <p:extLst>
+      <p:ext uri="{BB962C8B-B14F-4D97-AF65-F5344CB8AC3E}">
+        <p14:creationId xmlns:p14="http://schemas.microsoft.com/office/powerpoint/2010/main" val="2369543794"/>
+      </p:ext>
+    </p:extLst>
+  </p:cSld>
+  <p:clrMapOvr>
+    <a:masterClrMapping/>
+  </p:clrMapOvr>
+</p:sld>
+</file>
+
+<file path=ppt/slides/slide7.xml><?xml version="1.0" encoding="utf-8"?>
+<p:sld xmlns:a="http://schemas.openxmlformats.org/drawingml/2006/main" xmlns:r="http://schemas.openxmlformats.org/officeDocument/2006/relationships" xmlns:p="http://schemas.openxmlformats.org/presentationml/2006/main">
+  <p:cSld>
+    <p:spTree>
+      <p:nvGrpSpPr>
+        <p:cNvPr id="1" name=""/>
+        <p:cNvGrpSpPr/>
+        <p:nvPr/>
+      </p:nvGrpSpPr>
+      <p:grpSpPr>
+        <a:xfrm>
+          <a:off x="0" y="0"/>
+          <a:ext cx="0" cy="0"/>
+          <a:chOff x="0" y="0"/>
+          <a:chExt cx="0" cy="0"/>
+        </a:xfrm>
+      </p:grpSpPr>
+      <p:sp>
+        <p:nvSpPr>
+          <p:cNvPr id="2" name="Title 1">
+            <a:extLst>
+              <a:ext uri="{FF2B5EF4-FFF2-40B4-BE49-F238E27FC236}">
+                <a16:creationId xmlns:a16="http://schemas.microsoft.com/office/drawing/2014/main" id="{B5413C62-8E5C-9947-5DF0-5EF45664443B}"/>
+              </a:ext>
+            </a:extLst>
+          </p:cNvPr>
+          <p:cNvSpPr>
+            <a:spLocks noGrp="1"/>
+          </p:cNvSpPr>
+          <p:nvPr>
+            <p:ph type="title"/>
+          </p:nvPr>
+        </p:nvSpPr>
+        <p:spPr/>
+        <p:txBody>
+          <a:bodyPr/>
+          <a:lstStyle/>
+          <a:p>
+            <a:r>
+              <a:rPr lang="en-US" dirty="0"/>
+              <a:t>Non-parametric Segmentation</a:t>
+            </a:r>
+          </a:p>
+        </p:txBody>
+      </p:sp>
+      <p:sp>
+        <p:nvSpPr>
+          <p:cNvPr id="3" name="Content Placeholder 2">
+            <a:extLst>
+              <a:ext uri="{FF2B5EF4-FFF2-40B4-BE49-F238E27FC236}">
+                <a16:creationId xmlns:a16="http://schemas.microsoft.com/office/drawing/2014/main" id="{04CE50CD-548B-0161-5EFE-560BF12C0A87}"/>
+              </a:ext>
+            </a:extLst>
+          </p:cNvPr>
+          <p:cNvSpPr>
+            <a:spLocks noGrp="1"/>
+          </p:cNvSpPr>
+          <p:nvPr>
+            <p:ph idx="1"/>
+          </p:nvPr>
+        </p:nvSpPr>
+        <p:spPr/>
+        <p:txBody>
+          <a:bodyPr>
+            <a:normAutofit/>
+          </a:bodyPr>
+          <a:lstStyle/>
+          <a:p>
+            <a:r>
+              <a:rPr lang="en-US" sz="1800" dirty="0"/>
+              <a:t>Next, we employ a parametric method in which properties from the region of interest (ROI) were used. Here I transformed first the RGB values into (NCC) to represent the image in terms of r and g values, and the mean and standard deviation of r and g shall be used to compute for the joint probabilistic map assuming a gaussian probability distribution [1]. Non-parametric method uses the histogram back-projection technique which was tackled in the previous activities [1]. The said method is non-computational since it treats histograms as just look-up tables [1]. </a:t>
+            </a:r>
+          </a:p>
+          <a:p>
+            <a:endParaRPr lang="en-US" sz="1800" dirty="0"/>
+          </a:p>
+          <a:p>
+            <a:endParaRPr lang="en-US" sz="1800" dirty="0"/>
+          </a:p>
+        </p:txBody>
+      </p:sp>
+    </p:spTree>
+    <p:extLst>
+      <p:ext uri="{BB962C8B-B14F-4D97-AF65-F5344CB8AC3E}">
+        <p14:creationId xmlns:p14="http://schemas.microsoft.com/office/powerpoint/2010/main" val="4255677490"/>
+      </p:ext>
+    </p:extLst>
+  </p:cSld>
+  <p:clrMapOvr>
+    <a:masterClrMapping/>
+  </p:clrMapOvr>
+</p:sld>
+</file>
+
+<file path=ppt/slides/slide8.xml><?xml version="1.0" encoding="utf-8"?>
+<p:sld xmlns:a="http://schemas.openxmlformats.org/drawingml/2006/main" xmlns:r="http://schemas.openxmlformats.org/officeDocument/2006/relationships" xmlns:p="http://schemas.openxmlformats.org/presentationml/2006/main">
+  <p:cSld>
+    <p:spTree>
+      <p:nvGrpSpPr>
+        <p:cNvPr id="1" name=""/>
+        <p:cNvGrpSpPr/>
+        <p:nvPr/>
+      </p:nvGrpSpPr>
+      <p:grpSpPr>
+        <a:xfrm>
+          <a:off x="0" y="0"/>
+          <a:ext cx="0" cy="0"/>
+          <a:chOff x="0" y="0"/>
+          <a:chExt cx="0" cy="0"/>
+        </a:xfrm>
+      </p:grpSpPr>
+      <p:sp>
+        <p:nvSpPr>
+          <p:cNvPr id="2" name="Title 1">
+            <a:extLst>
+              <a:ext uri="{FF2B5EF4-FFF2-40B4-BE49-F238E27FC236}">
                 <a16:creationId xmlns:a16="http://schemas.microsoft.com/office/drawing/2014/main" id="{8B19F19B-233D-F2F7-8213-ABA6BD16DC79}"/>
               </a:ext>
             </a:extLst>
@@ -5512,7 +8377,7 @@
 </p:sld>
 </file>
 
-<file path=ppt/slides/slide7.xml><?xml version="1.0" encoding="utf-8"?>
+<file path=ppt/slides/slide9.xml><?xml version="1.0" encoding="utf-8"?>
 <p:sld xmlns:a="http://schemas.openxmlformats.org/drawingml/2006/main" xmlns:r="http://schemas.openxmlformats.org/officeDocument/2006/relationships" xmlns:p="http://schemas.openxmlformats.org/presentationml/2006/main">
   <p:cSld>
     <p:spTree>
@@ -5633,307 +8498,6 @@
     <p:extLst>
       <p:ext uri="{BB962C8B-B14F-4D97-AF65-F5344CB8AC3E}">
         <p14:creationId xmlns:p14="http://schemas.microsoft.com/office/powerpoint/2010/main" val="1420461841"/>
-      </p:ext>
-    </p:extLst>
-  </p:cSld>
-  <p:clrMapOvr>
-    <a:masterClrMapping/>
-  </p:clrMapOvr>
-</p:sld>
-</file>
-
-<file path=ppt/slides/slide8.xml><?xml version="1.0" encoding="utf-8"?>
-<p:sld xmlns:a="http://schemas.openxmlformats.org/drawingml/2006/main" xmlns:r="http://schemas.openxmlformats.org/officeDocument/2006/relationships" xmlns:p="http://schemas.openxmlformats.org/presentationml/2006/main">
-  <p:cSld>
-    <p:spTree>
-      <p:nvGrpSpPr>
-        <p:cNvPr id="1" name=""/>
-        <p:cNvGrpSpPr/>
-        <p:nvPr/>
-      </p:nvGrpSpPr>
-      <p:grpSpPr>
-        <a:xfrm>
-          <a:off x="0" y="0"/>
-          <a:ext cx="0" cy="0"/>
-          <a:chOff x="0" y="0"/>
-          <a:chExt cx="0" cy="0"/>
-        </a:xfrm>
-      </p:grpSpPr>
-      <p:sp>
-        <p:nvSpPr>
-          <p:cNvPr id="2" name="Title 1">
-            <a:extLst>
-              <a:ext uri="{FF2B5EF4-FFF2-40B4-BE49-F238E27FC236}">
-                <a16:creationId xmlns:a16="http://schemas.microsoft.com/office/drawing/2014/main" id="{BEC55787-1874-66F9-DB71-FDEE7FC23BE0}"/>
-              </a:ext>
-            </a:extLst>
-          </p:cNvPr>
-          <p:cNvSpPr>
-            <a:spLocks noGrp="1"/>
-          </p:cNvSpPr>
-          <p:nvPr>
-            <p:ph type="title"/>
-          </p:nvPr>
-        </p:nvSpPr>
-        <p:spPr/>
-        <p:txBody>
-          <a:bodyPr/>
-          <a:lstStyle/>
-          <a:p>
-            <a:endParaRPr lang="en-US"/>
-          </a:p>
-        </p:txBody>
-      </p:sp>
-      <p:sp>
-        <p:nvSpPr>
-          <p:cNvPr id="3" name="Content Placeholder 2">
-            <a:extLst>
-              <a:ext uri="{FF2B5EF4-FFF2-40B4-BE49-F238E27FC236}">
-                <a16:creationId xmlns:a16="http://schemas.microsoft.com/office/drawing/2014/main" id="{67E040F4-0EC6-15C7-6F7A-CD69AE0D3CFF}"/>
-              </a:ext>
-            </a:extLst>
-          </p:cNvPr>
-          <p:cNvSpPr>
-            <a:spLocks noGrp="1"/>
-          </p:cNvSpPr>
-          <p:nvPr>
-            <p:ph idx="1"/>
-          </p:nvPr>
-        </p:nvSpPr>
-        <p:spPr/>
-        <p:txBody>
-          <a:bodyPr/>
-          <a:lstStyle/>
-          <a:p>
-            <a:endParaRPr lang="en-US"/>
-          </a:p>
-        </p:txBody>
-      </p:sp>
-      <p:pic>
-        <p:nvPicPr>
-          <p:cNvPr id="4098" name="Picture 2">
-            <a:extLst>
-              <a:ext uri="{FF2B5EF4-FFF2-40B4-BE49-F238E27FC236}">
-                <a16:creationId xmlns:a16="http://schemas.microsoft.com/office/drawing/2014/main" id="{15C4AF63-04CA-5110-CC28-EC6929B5845B}"/>
-              </a:ext>
-            </a:extLst>
-          </p:cNvPr>
-          <p:cNvPicPr>
-            <a:picLocks noChangeAspect="1" noChangeArrowheads="1"/>
-          </p:cNvPicPr>
-          <p:nvPr/>
-        </p:nvPicPr>
-        <p:blipFill>
-          <a:blip r:embed="rId2">
-            <a:extLst>
-              <a:ext uri="{28A0092B-C50C-407E-A947-70E740481C1C}">
-                <a14:useLocalDpi xmlns:a14="http://schemas.microsoft.com/office/drawing/2010/main" val="0"/>
-              </a:ext>
-            </a:extLst>
-          </a:blip>
-          <a:srcRect/>
-          <a:stretch>
-            <a:fillRect/>
-          </a:stretch>
-        </p:blipFill>
-        <p:spPr bwMode="auto">
-          <a:xfrm>
-            <a:off x="0" y="2220913"/>
-            <a:ext cx="9144000" cy="2414587"/>
-          </a:xfrm>
-          <a:prstGeom prst="rect">
-            <a:avLst/>
-          </a:prstGeom>
-          <a:noFill/>
-          <a:extLst>
-            <a:ext uri="{909E8E84-426E-40DD-AFC4-6F175D3DCCD1}">
-              <a14:hiddenFill xmlns:a14="http://schemas.microsoft.com/office/drawing/2010/main">
-                <a:solidFill>
-                  <a:srgbClr val="FFFFFF"/>
-                </a:solidFill>
-              </a14:hiddenFill>
-            </a:ext>
-          </a:extLst>
-        </p:spPr>
-      </p:pic>
-    </p:spTree>
-    <p:extLst>
-      <p:ext uri="{BB962C8B-B14F-4D97-AF65-F5344CB8AC3E}">
-        <p14:creationId xmlns:p14="http://schemas.microsoft.com/office/powerpoint/2010/main" val="878438591"/>
-      </p:ext>
-    </p:extLst>
-  </p:cSld>
-  <p:clrMapOvr>
-    <a:masterClrMapping/>
-  </p:clrMapOvr>
-</p:sld>
-</file>
-
-<file path=ppt/slides/slide9.xml><?xml version="1.0" encoding="utf-8"?>
-<p:sld xmlns:a="http://schemas.openxmlformats.org/drawingml/2006/main" xmlns:r="http://schemas.openxmlformats.org/officeDocument/2006/relationships" xmlns:p="http://schemas.openxmlformats.org/presentationml/2006/main">
-  <p:cSld>
-    <p:spTree>
-      <p:nvGrpSpPr>
-        <p:cNvPr id="1" name=""/>
-        <p:cNvGrpSpPr/>
-        <p:nvPr/>
-      </p:nvGrpSpPr>
-      <p:grpSpPr>
-        <a:xfrm>
-          <a:off x="0" y="0"/>
-          <a:ext cx="0" cy="0"/>
-          <a:chOff x="0" y="0"/>
-          <a:chExt cx="0" cy="0"/>
-        </a:xfrm>
-      </p:grpSpPr>
-      <p:sp>
-        <p:nvSpPr>
-          <p:cNvPr id="2" name="Title 1">
-            <a:extLst>
-              <a:ext uri="{FF2B5EF4-FFF2-40B4-BE49-F238E27FC236}">
-                <a16:creationId xmlns:a16="http://schemas.microsoft.com/office/drawing/2014/main" id="{D6F771FB-7C7F-9F7F-3772-DC1F42D859F1}"/>
-              </a:ext>
-            </a:extLst>
-          </p:cNvPr>
-          <p:cNvSpPr>
-            <a:spLocks noGrp="1"/>
-          </p:cNvSpPr>
-          <p:nvPr>
-            <p:ph type="title"/>
-          </p:nvPr>
-        </p:nvSpPr>
-        <p:spPr/>
-        <p:txBody>
-          <a:bodyPr/>
-          <a:lstStyle/>
-          <a:p>
-            <a:endParaRPr lang="en-US"/>
-          </a:p>
-        </p:txBody>
-      </p:sp>
-      <p:sp>
-        <p:nvSpPr>
-          <p:cNvPr id="3" name="Content Placeholder 2">
-            <a:extLst>
-              <a:ext uri="{FF2B5EF4-FFF2-40B4-BE49-F238E27FC236}">
-                <a16:creationId xmlns:a16="http://schemas.microsoft.com/office/drawing/2014/main" id="{ACAAB099-102F-2574-8A7D-C87175B8395A}"/>
-              </a:ext>
-            </a:extLst>
-          </p:cNvPr>
-          <p:cNvSpPr>
-            <a:spLocks noGrp="1"/>
-          </p:cNvSpPr>
-          <p:nvPr>
-            <p:ph idx="1"/>
-          </p:nvPr>
-        </p:nvSpPr>
-        <p:spPr/>
-        <p:txBody>
-          <a:bodyPr/>
-          <a:lstStyle/>
-          <a:p>
-            <a:endParaRPr lang="en-US"/>
-          </a:p>
-        </p:txBody>
-      </p:sp>
-      <p:pic>
-        <p:nvPicPr>
-          <p:cNvPr id="5122" name="Picture 2">
-            <a:extLst>
-              <a:ext uri="{FF2B5EF4-FFF2-40B4-BE49-F238E27FC236}">
-                <a16:creationId xmlns:a16="http://schemas.microsoft.com/office/drawing/2014/main" id="{12462F82-74BA-2273-D003-57E6C0FEC06D}"/>
-              </a:ext>
-            </a:extLst>
-          </p:cNvPr>
-          <p:cNvPicPr>
-            <a:picLocks noChangeAspect="1" noChangeArrowheads="1"/>
-          </p:cNvPicPr>
-          <p:nvPr/>
-        </p:nvPicPr>
-        <p:blipFill>
-          <a:blip r:embed="rId2">
-            <a:extLst>
-              <a:ext uri="{28A0092B-C50C-407E-A947-70E740481C1C}">
-                <a14:useLocalDpi xmlns:a14="http://schemas.microsoft.com/office/drawing/2010/main" val="0"/>
-              </a:ext>
-            </a:extLst>
-          </a:blip>
-          <a:srcRect/>
-          <a:stretch>
-            <a:fillRect/>
-          </a:stretch>
-        </p:blipFill>
-        <p:spPr bwMode="auto">
-          <a:xfrm>
-            <a:off x="354075" y="1738143"/>
-            <a:ext cx="8173411" cy="2286000"/>
-          </a:xfrm>
-          <a:prstGeom prst="rect">
-            <a:avLst/>
-          </a:prstGeom>
-          <a:noFill/>
-          <a:extLst>
-            <a:ext uri="{909E8E84-426E-40DD-AFC4-6F175D3DCCD1}">
-              <a14:hiddenFill xmlns:a14="http://schemas.microsoft.com/office/drawing/2010/main">
-                <a:solidFill>
-                  <a:srgbClr val="FFFFFF"/>
-                </a:solidFill>
-              </a14:hiddenFill>
-            </a:ext>
-          </a:extLst>
-        </p:spPr>
-      </p:pic>
-      <p:pic>
-        <p:nvPicPr>
-          <p:cNvPr id="5124" name="Picture 4">
-            <a:extLst>
-              <a:ext uri="{FF2B5EF4-FFF2-40B4-BE49-F238E27FC236}">
-                <a16:creationId xmlns:a16="http://schemas.microsoft.com/office/drawing/2014/main" id="{50DF4945-4466-A1C6-CD37-BC0B613AB725}"/>
-              </a:ext>
-            </a:extLst>
-          </p:cNvPr>
-          <p:cNvPicPr>
-            <a:picLocks noChangeAspect="1" noChangeArrowheads="1"/>
-          </p:cNvPicPr>
-          <p:nvPr/>
-        </p:nvPicPr>
-        <p:blipFill>
-          <a:blip r:embed="rId3">
-            <a:extLst>
-              <a:ext uri="{28A0092B-C50C-407E-A947-70E740481C1C}">
-                <a14:useLocalDpi xmlns:a14="http://schemas.microsoft.com/office/drawing/2010/main" val="0"/>
-              </a:ext>
-            </a:extLst>
-          </a:blip>
-          <a:srcRect/>
-          <a:stretch>
-            <a:fillRect/>
-          </a:stretch>
-        </p:blipFill>
-        <p:spPr bwMode="auto">
-          <a:xfrm>
-            <a:off x="628650" y="4127836"/>
-            <a:ext cx="7898836" cy="2286000"/>
-          </a:xfrm>
-          <a:prstGeom prst="rect">
-            <a:avLst/>
-          </a:prstGeom>
-          <a:noFill/>
-          <a:extLst>
-            <a:ext uri="{909E8E84-426E-40DD-AFC4-6F175D3DCCD1}">
-              <a14:hiddenFill xmlns:a14="http://schemas.microsoft.com/office/drawing/2010/main">
-                <a:solidFill>
-                  <a:srgbClr val="FFFFFF"/>
-                </a:solidFill>
-              </a14:hiddenFill>
-            </a:ext>
-          </a:extLst>
-        </p:spPr>
-      </p:pic>
-    </p:spTree>
-    <p:extLst>
-      <p:ext uri="{BB962C8B-B14F-4D97-AF65-F5344CB8AC3E}">
-        <p14:creationId xmlns:p14="http://schemas.microsoft.com/office/powerpoint/2010/main" val="3561003786"/>
       </p:ext>
     </p:extLst>
   </p:cSld>

</xml_diff>